<commit_message>
Update to the class diagram
</commit_message>
<xml_diff>
--- a/Class Diagram.pptx
+++ b/Class Diagram.pptx
@@ -2987,8 +2987,8 @@
         </p:nvSpPr>
         <p:spPr bwMode="auto">
           <a:xfrm>
-            <a:off x="2330865" y="2743836"/>
-            <a:ext cx="4879560" cy="3876674"/>
+            <a:off x="2914649" y="2743836"/>
+            <a:ext cx="4295775" cy="3876674"/>
           </a:xfrm>
           <a:prstGeom prst="rect">
             <a:avLst/>
@@ -3022,12 +3022,229 @@
               </a:spcAft>
             </a:pPr>
             <a:r>
+              <a:rPr lang="en-US" altLang="en-US" sz="1100" dirty="0">
+                <a:latin typeface="Calibri" panose="020F0502020204030204" pitchFamily="34" charset="0"/>
+                <a:ea typeface="Calibri" panose="020F0502020204030204" pitchFamily="34" charset="0"/>
+                <a:cs typeface="Times New Roman" panose="02020603050405020304" pitchFamily="18" charset="0"/>
+              </a:rPr>
+              <a:t>RoguelikeObject</a:t>
+            </a:r>
+          </a:p>
+          <a:p>
+            <a:pPr defTabSz="914400" eaLnBrk="0" fontAlgn="base" hangingPunct="0">
+              <a:spcBef>
+                <a:spcPct val="0"/>
+              </a:spcBef>
+              <a:spcAft>
+                <a:spcPct val="0"/>
+              </a:spcAft>
+            </a:pPr>
+            <a:r>
+              <a:rPr lang="en-US" altLang="en-US" sz="1100" dirty="0">
+                <a:latin typeface="Calibri" panose="020F0502020204030204" pitchFamily="34" charset="0"/>
+                <a:cs typeface="Times New Roman" panose="02020603050405020304" pitchFamily="18" charset="0"/>
+              </a:rPr>
+              <a:t>---------------------------------------------</a:t>
+            </a:r>
+          </a:p>
+          <a:p>
+            <a:pPr defTabSz="914400" eaLnBrk="0" fontAlgn="base" hangingPunct="0">
+              <a:spcBef>
+                <a:spcPct val="0"/>
+              </a:spcBef>
+              <a:spcAft>
+                <a:spcPct val="0"/>
+              </a:spcAft>
+            </a:pPr>
+            <a:r>
+              <a:rPr lang="en-US" altLang="en-US" sz="1100" dirty="0">
+                <a:latin typeface="Calibri" panose="020F0502020204030204" pitchFamily="34" charset="0"/>
+                <a:cs typeface="Times New Roman" panose="02020603050405020304" pitchFamily="18" charset="0"/>
+              </a:rPr>
+              <a:t>+ </a:t>
+            </a:r>
+            <a:r>
               <a:rPr lang="en-US" altLang="en-US" sz="1100" dirty="0" err="1">
                 <a:latin typeface="Calibri" panose="020F0502020204030204" pitchFamily="34" charset="0"/>
+                <a:cs typeface="Times New Roman" panose="02020603050405020304" pitchFamily="18" charset="0"/>
+              </a:rPr>
+              <a:t>enum</a:t>
+            </a:r>
+            <a:r>
+              <a:rPr lang="en-US" altLang="en-US" sz="1100" dirty="0">
+                <a:latin typeface="Calibri" panose="020F0502020204030204" pitchFamily="34" charset="0"/>
+                <a:cs typeface="Times New Roman" panose="02020603050405020304" pitchFamily="18" charset="0"/>
+              </a:rPr>
+              <a:t> </a:t>
+            </a:r>
+            <a:r>
+              <a:rPr lang="en-US" altLang="en-US" sz="1100" dirty="0" err="1">
+                <a:latin typeface="Calibri" panose="020F0502020204030204" pitchFamily="34" charset="0"/>
+                <a:cs typeface="Times New Roman" panose="02020603050405020304" pitchFamily="18" charset="0"/>
+              </a:rPr>
+              <a:t>TagEnum</a:t>
+            </a:r>
+            <a:endParaRPr lang="en-US" altLang="en-US" sz="1100" dirty="0">
+              <a:latin typeface="Calibri" panose="020F0502020204030204" pitchFamily="34" charset="0"/>
+              <a:cs typeface="Times New Roman" panose="02020603050405020304" pitchFamily="18" charset="0"/>
+            </a:endParaRPr>
+          </a:p>
+          <a:p>
+            <a:pPr defTabSz="914400" eaLnBrk="0" fontAlgn="base" hangingPunct="0">
+              <a:spcBef>
+                <a:spcPct val="0"/>
+              </a:spcBef>
+              <a:spcAft>
+                <a:spcPct val="0"/>
+              </a:spcAft>
+            </a:pPr>
+            <a:r>
+              <a:rPr lang="en-US" altLang="en-US" sz="1100" dirty="0">
+                <a:latin typeface="Calibri" panose="020F0502020204030204" pitchFamily="34" charset="0"/>
+                <a:cs typeface="Times New Roman" panose="02020603050405020304" pitchFamily="18" charset="0"/>
+              </a:rPr>
+              <a:t>+ List&lt;</a:t>
+            </a:r>
+            <a:r>
+              <a:rPr lang="en-US" altLang="en-US" sz="1100" dirty="0" err="1">
+                <a:latin typeface="Calibri" panose="020F0502020204030204" pitchFamily="34" charset="0"/>
+                <a:cs typeface="Times New Roman" panose="02020603050405020304" pitchFamily="18" charset="0"/>
+              </a:rPr>
+              <a:t>TagEnum</a:t>
+            </a:r>
+            <a:r>
+              <a:rPr lang="en-US" altLang="en-US" sz="1100" dirty="0">
+                <a:latin typeface="Calibri" panose="020F0502020204030204" pitchFamily="34" charset="0"/>
+                <a:cs typeface="Times New Roman" panose="02020603050405020304" pitchFamily="18" charset="0"/>
+              </a:rPr>
+              <a:t>&gt; tags</a:t>
+            </a:r>
+            <a:endParaRPr lang="en-US" altLang="en-US" sz="800" dirty="0"/>
+          </a:p>
+          <a:p>
+            <a:pPr defTabSz="914400" eaLnBrk="0" fontAlgn="base" hangingPunct="0">
+              <a:spcBef>
+                <a:spcPct val="0"/>
+              </a:spcBef>
+              <a:spcAft>
+                <a:spcPct val="0"/>
+              </a:spcAft>
+            </a:pPr>
+            <a:r>
+              <a:rPr lang="en-US" altLang="en-US" sz="1100" dirty="0">
+                <a:latin typeface="Calibri" panose="020F0502020204030204" pitchFamily="34" charset="0"/>
                 <a:ea typeface="Calibri" panose="020F0502020204030204" pitchFamily="34" charset="0"/>
                 <a:cs typeface="Times New Roman" panose="02020603050405020304" pitchFamily="18" charset="0"/>
               </a:rPr>
-              <a:t>RoguelikeObject</a:t>
+              <a:t>+ string </a:t>
+            </a:r>
+            <a:r>
+              <a:rPr lang="en-US" altLang="en-US" sz="1100" dirty="0" err="1">
+                <a:latin typeface="Calibri" panose="020F0502020204030204" pitchFamily="34" charset="0"/>
+                <a:ea typeface="Calibri" panose="020F0502020204030204" pitchFamily="34" charset="0"/>
+                <a:cs typeface="Times New Roman" panose="02020603050405020304" pitchFamily="18" charset="0"/>
+              </a:rPr>
+              <a:t>objectName</a:t>
+            </a:r>
+            <a:endParaRPr lang="en-US" altLang="en-US" sz="800" dirty="0"/>
+          </a:p>
+          <a:p>
+            <a:pPr defTabSz="914400" eaLnBrk="0" fontAlgn="base" hangingPunct="0">
+              <a:spcBef>
+                <a:spcPct val="0"/>
+              </a:spcBef>
+              <a:spcAft>
+                <a:spcPct val="0"/>
+              </a:spcAft>
+            </a:pPr>
+            <a:r>
+              <a:rPr lang="en-US" altLang="en-US" sz="1100" dirty="0">
+                <a:latin typeface="Calibri" panose="020F0502020204030204" pitchFamily="34" charset="0"/>
+                <a:ea typeface="Calibri" panose="020F0502020204030204" pitchFamily="34" charset="0"/>
+                <a:cs typeface="Times New Roman" panose="02020603050405020304" pitchFamily="18" charset="0"/>
+              </a:rPr>
+              <a:t>+ string description</a:t>
+            </a:r>
+            <a:endParaRPr lang="en-US" altLang="en-US" sz="800" dirty="0"/>
+          </a:p>
+          <a:p>
+            <a:pPr defTabSz="914400" eaLnBrk="0" fontAlgn="base" hangingPunct="0">
+              <a:spcBef>
+                <a:spcPct val="0"/>
+              </a:spcBef>
+              <a:spcAft>
+                <a:spcPct val="0"/>
+              </a:spcAft>
+            </a:pPr>
+            <a:r>
+              <a:rPr lang="en-US" altLang="en-US" sz="1100" dirty="0">
+                <a:latin typeface="Calibri" panose="020F0502020204030204" pitchFamily="34" charset="0"/>
+                <a:ea typeface="Calibri" panose="020F0502020204030204" pitchFamily="34" charset="0"/>
+                <a:cs typeface="Times New Roman" panose="02020603050405020304" pitchFamily="18" charset="0"/>
+              </a:rPr>
+              <a:t>+ int </a:t>
+            </a:r>
+            <a:r>
+              <a:rPr lang="en-US" altLang="en-US" sz="1100" dirty="0" err="1">
+                <a:latin typeface="Calibri" panose="020F0502020204030204" pitchFamily="34" charset="0"/>
+                <a:ea typeface="Calibri" panose="020F0502020204030204" pitchFamily="34" charset="0"/>
+                <a:cs typeface="Times New Roman" panose="02020603050405020304" pitchFamily="18" charset="0"/>
+              </a:rPr>
+              <a:t>stackSize</a:t>
+            </a:r>
+            <a:endParaRPr lang="en-US" altLang="en-US" sz="800" dirty="0"/>
+          </a:p>
+          <a:p>
+            <a:pPr defTabSz="914400" eaLnBrk="0" fontAlgn="base" hangingPunct="0">
+              <a:spcBef>
+                <a:spcPct val="0"/>
+              </a:spcBef>
+              <a:spcAft>
+                <a:spcPct val="0"/>
+              </a:spcAft>
+            </a:pPr>
+            <a:r>
+              <a:rPr lang="en-US" altLang="en-US" sz="1100" dirty="0">
+                <a:latin typeface="Calibri" panose="020F0502020204030204" pitchFamily="34" charset="0"/>
+                <a:ea typeface="Calibri" panose="020F0502020204030204" pitchFamily="34" charset="0"/>
+                <a:cs typeface="Times New Roman" panose="02020603050405020304" pitchFamily="18" charset="0"/>
+              </a:rPr>
+              <a:t>+ int </a:t>
+            </a:r>
+            <a:r>
+              <a:rPr lang="en-US" altLang="en-US" sz="1100" dirty="0" err="1">
+                <a:latin typeface="Calibri" panose="020F0502020204030204" pitchFamily="34" charset="0"/>
+                <a:ea typeface="Calibri" panose="020F0502020204030204" pitchFamily="34" charset="0"/>
+                <a:cs typeface="Times New Roman" panose="02020603050405020304" pitchFamily="18" charset="0"/>
+              </a:rPr>
+              <a:t>maxStackSize</a:t>
+            </a:r>
+            <a:endParaRPr lang="en-US" altLang="en-US" sz="800" dirty="0"/>
+          </a:p>
+          <a:p>
+            <a:pPr defTabSz="914400" eaLnBrk="0" fontAlgn="base" hangingPunct="0">
+              <a:spcBef>
+                <a:spcPct val="0"/>
+              </a:spcBef>
+              <a:spcAft>
+                <a:spcPct val="0"/>
+              </a:spcAft>
+            </a:pPr>
+            <a:r>
+              <a:rPr lang="en-US" altLang="en-US" sz="1100" dirty="0">
+                <a:latin typeface="Calibri" panose="020F0502020204030204" pitchFamily="34" charset="0"/>
+                <a:ea typeface="Calibri" panose="020F0502020204030204" pitchFamily="34" charset="0"/>
+                <a:cs typeface="Times New Roman" panose="02020603050405020304" pitchFamily="18" charset="0"/>
+              </a:rPr>
+              <a:t>+ int </a:t>
+            </a:r>
+            <a:r>
+              <a:rPr lang="en-US" altLang="en-US" sz="1100" dirty="0" err="1">
+                <a:latin typeface="Calibri" panose="020F0502020204030204" pitchFamily="34" charset="0"/>
+                <a:ea typeface="Calibri" panose="020F0502020204030204" pitchFamily="34" charset="0"/>
+                <a:cs typeface="Times New Roman" panose="02020603050405020304" pitchFamily="18" charset="0"/>
+              </a:rPr>
+              <a:t>goldValue</a:t>
             </a:r>
             <a:endParaRPr lang="en-US" altLang="en-US" sz="1100" dirty="0">
               <a:latin typeface="Calibri" panose="020F0502020204030204" pitchFamily="34" charset="0"/>
@@ -3047,11 +3264,11 @@
             <a:r>
               <a:rPr lang="en-US" altLang="en-US" sz="1100" dirty="0">
                 <a:latin typeface="Calibri" panose="020F0502020204030204" pitchFamily="34" charset="0"/>
-                <a:cs typeface="Times New Roman" panose="02020603050405020304" pitchFamily="18" charset="0"/>
-              </a:rPr>
-              <a:t>---------------------------------------------</a:t>
-            </a:r>
-            <a:endParaRPr lang="en-US" altLang="en-US" sz="800" dirty="0"/>
+                <a:ea typeface="Calibri" panose="020F0502020204030204" pitchFamily="34" charset="0"/>
+                <a:cs typeface="Times New Roman" panose="02020603050405020304" pitchFamily="18" charset="0"/>
+              </a:rPr>
+              <a:t>+ int weight</a:t>
+            </a:r>
           </a:p>
           <a:p>
             <a:pPr defTabSz="914400" eaLnBrk="0" fontAlgn="base" hangingPunct="0">
@@ -3068,9 +3285,8 @@
                 <a:ea typeface="Calibri" panose="020F0502020204030204" pitchFamily="34" charset="0"/>
                 <a:cs typeface="Times New Roman" panose="02020603050405020304" pitchFamily="18" charset="0"/>
               </a:rPr>
-              <a:t>+ string name</a:t>
-            </a:r>
-            <a:endParaRPr lang="en-US" altLang="en-US" sz="800" dirty="0"/>
+              <a:t>+ bool flammable</a:t>
+            </a:r>
           </a:p>
           <a:p>
             <a:pPr defTabSz="914400" eaLnBrk="0" fontAlgn="base" hangingPunct="0">
@@ -3087,9 +3303,21 @@
                 <a:ea typeface="Calibri" panose="020F0502020204030204" pitchFamily="34" charset="0"/>
                 <a:cs typeface="Times New Roman" panose="02020603050405020304" pitchFamily="18" charset="0"/>
               </a:rPr>
-              <a:t>+ string description</a:t>
-            </a:r>
-            <a:endParaRPr lang="en-US" altLang="en-US" sz="800" dirty="0"/>
+              <a:t>- int </a:t>
+            </a:r>
+            <a:r>
+              <a:rPr lang="en-US" altLang="en-US" sz="1100" u="sng" dirty="0" err="1">
+                <a:latin typeface="Calibri" panose="020F0502020204030204" pitchFamily="34" charset="0"/>
+                <a:ea typeface="Calibri" panose="020F0502020204030204" pitchFamily="34" charset="0"/>
+                <a:cs typeface="Times New Roman" panose="02020603050405020304" pitchFamily="18" charset="0"/>
+              </a:rPr>
+              <a:t>fireAmountMax</a:t>
+            </a:r>
+            <a:endParaRPr lang="en-US" altLang="en-US" sz="1100" u="sng" dirty="0">
+              <a:latin typeface="Calibri" panose="020F0502020204030204" pitchFamily="34" charset="0"/>
+              <a:ea typeface="Calibri" panose="020F0502020204030204" pitchFamily="34" charset="0"/>
+              <a:cs typeface="Times New Roman" panose="02020603050405020304" pitchFamily="18" charset="0"/>
+            </a:endParaRPr>
           </a:p>
           <a:p>
             <a:pPr defTabSz="914400" eaLnBrk="0" fontAlgn="base" hangingPunct="0">
@@ -3114,9 +3342,13 @@
                 <a:ea typeface="Calibri" panose="020F0502020204030204" pitchFamily="34" charset="0"/>
                 <a:cs typeface="Times New Roman" panose="02020603050405020304" pitchFamily="18" charset="0"/>
               </a:rPr>
-              <a:t>stackSize</a:t>
-            </a:r>
-            <a:endParaRPr lang="en-US" altLang="en-US" sz="800" dirty="0"/>
+              <a:t>fireAmount</a:t>
+            </a:r>
+            <a:endParaRPr lang="en-US" altLang="en-US" sz="1100" dirty="0">
+              <a:latin typeface="Calibri" panose="020F0502020204030204" pitchFamily="34" charset="0"/>
+              <a:ea typeface="Calibri" panose="020F0502020204030204" pitchFamily="34" charset="0"/>
+              <a:cs typeface="Times New Roman" panose="02020603050405020304" pitchFamily="18" charset="0"/>
+            </a:endParaRPr>
           </a:p>
           <a:p>
             <a:pPr defTabSz="914400" eaLnBrk="0" fontAlgn="base" hangingPunct="0">
@@ -3133,71 +3365,30 @@
                 <a:ea typeface="Calibri" panose="020F0502020204030204" pitchFamily="34" charset="0"/>
                 <a:cs typeface="Times New Roman" panose="02020603050405020304" pitchFamily="18" charset="0"/>
               </a:rPr>
-              <a:t>+ int </a:t>
-            </a:r>
-            <a:r>
-              <a:rPr lang="en-US" altLang="en-US" sz="1100" dirty="0" err="1">
-                <a:latin typeface="Calibri" panose="020F0502020204030204" pitchFamily="34" charset="0"/>
+              <a:t>+ int explosive</a:t>
+            </a:r>
+          </a:p>
+          <a:p>
+            <a:pPr defTabSz="914400" eaLnBrk="0" fontAlgn="base" hangingPunct="0">
+              <a:spcBef>
+                <a:spcPct val="0"/>
+              </a:spcBef>
+              <a:spcAft>
+                <a:spcPct val="0"/>
+              </a:spcAft>
+            </a:pPr>
+            <a:r>
+              <a:rPr lang="en-US" altLang="en-US" sz="1100" dirty="0">
                 <a:ea typeface="Calibri" panose="020F0502020204030204" pitchFamily="34" charset="0"/>
                 <a:cs typeface="Times New Roman" panose="02020603050405020304" pitchFamily="18" charset="0"/>
               </a:rPr>
-              <a:t>maxStackSize</a:t>
-            </a:r>
-            <a:endParaRPr lang="en-US" altLang="en-US" sz="800" dirty="0"/>
-          </a:p>
-          <a:p>
-            <a:pPr defTabSz="914400" eaLnBrk="0" fontAlgn="base" hangingPunct="0">
-              <a:spcBef>
-                <a:spcPct val="0"/>
-              </a:spcBef>
-              <a:spcAft>
-                <a:spcPct val="0"/>
-              </a:spcAft>
-            </a:pPr>
-            <a:r>
-              <a:rPr lang="en-US" altLang="en-US" sz="1100" dirty="0">
-                <a:latin typeface="Calibri" panose="020F0502020204030204" pitchFamily="34" charset="0"/>
-                <a:ea typeface="Calibri" panose="020F0502020204030204" pitchFamily="34" charset="0"/>
-                <a:cs typeface="Times New Roman" panose="02020603050405020304" pitchFamily="18" charset="0"/>
-              </a:rPr>
-              <a:t>+ int value</a:t>
-            </a:r>
-            <a:endParaRPr lang="en-US" altLang="en-US" sz="800" dirty="0"/>
-          </a:p>
-          <a:p>
-            <a:pPr defTabSz="914400" eaLnBrk="0" fontAlgn="base" hangingPunct="0">
-              <a:spcBef>
-                <a:spcPct val="0"/>
-              </a:spcBef>
-              <a:spcAft>
-                <a:spcPct val="0"/>
-              </a:spcAft>
-            </a:pPr>
-            <a:r>
-              <a:rPr lang="en-US" altLang="en-US" sz="1100" dirty="0">
-                <a:latin typeface="Calibri" panose="020F0502020204030204" pitchFamily="34" charset="0"/>
-                <a:ea typeface="Calibri" panose="020F0502020204030204" pitchFamily="34" charset="0"/>
-                <a:cs typeface="Times New Roman" panose="02020603050405020304" pitchFamily="18" charset="0"/>
-              </a:rPr>
-              <a:t>+ List&lt;string&gt; tags (</a:t>
-            </a:r>
-            <a:r>
-              <a:rPr lang="en-US" altLang="en-US" sz="1100" dirty="0" err="1">
-                <a:latin typeface="Calibri" panose="020F0502020204030204" pitchFamily="34" charset="0"/>
-                <a:ea typeface="Calibri" panose="020F0502020204030204" pitchFamily="34" charset="0"/>
-                <a:cs typeface="Times New Roman" panose="02020603050405020304" pitchFamily="18" charset="0"/>
-              </a:rPr>
-              <a:t>enum</a:t>
-            </a:r>
-            <a:r>
-              <a:rPr lang="en-US" altLang="en-US" sz="1100" dirty="0">
-                <a:latin typeface="Calibri" panose="020F0502020204030204" pitchFamily="34" charset="0"/>
-                <a:ea typeface="Calibri" panose="020F0502020204030204" pitchFamily="34" charset="0"/>
-                <a:cs typeface="Times New Roman" panose="02020603050405020304" pitchFamily="18" charset="0"/>
-              </a:rPr>
-              <a:t>?)</a:t>
-            </a:r>
-            <a:endParaRPr lang="en-US" altLang="en-US" sz="800" dirty="0"/>
+              <a:t>+ bool exposed</a:t>
+            </a:r>
+            <a:endParaRPr lang="en-US" altLang="en-US" sz="1100" dirty="0">
+              <a:latin typeface="Calibri" panose="020F0502020204030204" pitchFamily="34" charset="0"/>
+              <a:ea typeface="Calibri" panose="020F0502020204030204" pitchFamily="34" charset="0"/>
+              <a:cs typeface="Times New Roman" panose="02020603050405020304" pitchFamily="18" charset="0"/>
+            </a:endParaRPr>
           </a:p>
           <a:p>
             <a:pPr defTabSz="914400" eaLnBrk="0" fontAlgn="base" hangingPunct="0">
@@ -3241,45 +3432,31 @@
                 <a:ea typeface="Calibri" panose="020F0502020204030204" pitchFamily="34" charset="0"/>
                 <a:cs typeface="Times New Roman" panose="02020603050405020304" pitchFamily="18" charset="0"/>
               </a:rPr>
-              <a:t>+ bool exposed</a:t>
-            </a:r>
-          </a:p>
-          <a:p>
-            <a:pPr defTabSz="914400" eaLnBrk="0" fontAlgn="base" hangingPunct="0">
-              <a:spcBef>
-                <a:spcPct val="0"/>
-              </a:spcBef>
-              <a:spcAft>
-                <a:spcPct val="0"/>
-              </a:spcAft>
-            </a:pPr>
+              <a:t>- </a:t>
+            </a:r>
+            <a:r>
+              <a:rPr lang="en-US" altLang="en-US" sz="1100" dirty="0" err="1">
+                <a:latin typeface="Calibri" panose="020F0502020204030204" pitchFamily="34" charset="0"/>
+                <a:ea typeface="Calibri" panose="020F0502020204030204" pitchFamily="34" charset="0"/>
+                <a:cs typeface="Times New Roman" panose="02020603050405020304" pitchFamily="18" charset="0"/>
+              </a:rPr>
+              <a:t>ItemSpriteRenderer</a:t>
+            </a:r>
             <a:r>
               <a:rPr lang="en-US" altLang="en-US" sz="1100" dirty="0">
+                <a:latin typeface="Calibri" panose="020F0502020204030204" pitchFamily="34" charset="0"/>
                 <a:ea typeface="Calibri" panose="020F0502020204030204" pitchFamily="34" charset="0"/>
                 <a:cs typeface="Times New Roman" panose="02020603050405020304" pitchFamily="18" charset="0"/>
               </a:rPr>
-              <a:t>- </a:t>
+              <a:t> </a:t>
             </a:r>
             <a:r>
               <a:rPr lang="en-US" altLang="en-US" sz="1100" dirty="0" err="1">
+                <a:latin typeface="Calibri" panose="020F0502020204030204" pitchFamily="34" charset="0"/>
                 <a:ea typeface="Calibri" panose="020F0502020204030204" pitchFamily="34" charset="0"/>
                 <a:cs typeface="Times New Roman" panose="02020603050405020304" pitchFamily="18" charset="0"/>
               </a:rPr>
-              <a:t>SpriteRenderer</a:t>
-            </a:r>
-            <a:r>
-              <a:rPr lang="en-US" altLang="en-US" sz="1100" dirty="0">
-                <a:ea typeface="Calibri" panose="020F0502020204030204" pitchFamily="34" charset="0"/>
-                <a:cs typeface="Times New Roman" panose="02020603050405020304" pitchFamily="18" charset="0"/>
-              </a:rPr>
-              <a:t> </a:t>
-            </a:r>
-            <a:r>
-              <a:rPr lang="en-US" altLang="en-US" sz="1100" dirty="0" err="1">
-                <a:ea typeface="Calibri" panose="020F0502020204030204" pitchFamily="34" charset="0"/>
-                <a:cs typeface="Times New Roman" panose="02020603050405020304" pitchFamily="18" charset="0"/>
-              </a:rPr>
-              <a:t>mySpriteRenderer</a:t>
+              <a:t>myItemSpriteRenderer</a:t>
             </a:r>
             <a:endParaRPr lang="en-US" altLang="en-US" sz="1100" dirty="0">
               <a:ea typeface="Calibri" panose="020F0502020204030204" pitchFamily="34" charset="0"/>
@@ -3296,113 +3473,12 @@
               </a:spcAft>
             </a:pPr>
             <a:r>
-              <a:rPr lang="en-US" altLang="en-US" sz="1100" dirty="0"/>
-              <a:t>- Dropped</a:t>
-            </a:r>
-          </a:p>
-          <a:p>
-            <a:pPr defTabSz="914400" eaLnBrk="0" fontAlgn="base" hangingPunct="0">
-              <a:spcBef>
-                <a:spcPct val="0"/>
-              </a:spcBef>
-              <a:spcAft>
-                <a:spcPct val="0"/>
-              </a:spcAft>
-            </a:pPr>
-            <a:r>
               <a:rPr lang="en-US" altLang="en-US" sz="1100" dirty="0">
                 <a:latin typeface="Calibri" panose="020F0502020204030204" pitchFamily="34" charset="0"/>
                 <a:ea typeface="Calibri" panose="020F0502020204030204" pitchFamily="34" charset="0"/>
                 <a:cs typeface="Times New Roman" panose="02020603050405020304" pitchFamily="18" charset="0"/>
               </a:rPr>
               <a:t>--------------------------------------------</a:t>
-            </a:r>
-          </a:p>
-          <a:p>
-            <a:pPr eaLnBrk="0" fontAlgn="base" hangingPunct="0">
-              <a:spcBef>
-                <a:spcPct val="0"/>
-              </a:spcBef>
-              <a:spcAft>
-                <a:spcPct val="0"/>
-              </a:spcAft>
-            </a:pPr>
-            <a:r>
-              <a:rPr lang="en-US" altLang="en-US" sz="1100" strike="sngStrike" dirty="0">
-                <a:latin typeface="Calibri" panose="020F0502020204030204" pitchFamily="34" charset="0"/>
-                <a:ea typeface="Calibri" panose="020F0502020204030204" pitchFamily="34" charset="0"/>
-                <a:cs typeface="Times New Roman" panose="02020603050405020304" pitchFamily="18" charset="0"/>
-              </a:rPr>
-              <a:t>+ Obtain</a:t>
-            </a:r>
-            <a:r>
-              <a:rPr lang="en-US" altLang="en-US" sz="1100" dirty="0">
-                <a:latin typeface="Calibri" panose="020F0502020204030204" pitchFamily="34" charset="0"/>
-                <a:ea typeface="Calibri" panose="020F0502020204030204" pitchFamily="34" charset="0"/>
-                <a:cs typeface="Times New Roman" panose="02020603050405020304" pitchFamily="18" charset="0"/>
-              </a:rPr>
-              <a:t> (now handled by the exposed property)</a:t>
-            </a:r>
-          </a:p>
-          <a:p>
-            <a:pPr lvl="0" eaLnBrk="0" fontAlgn="base" hangingPunct="0">
-              <a:spcBef>
-                <a:spcPct val="0"/>
-              </a:spcBef>
-              <a:spcAft>
-                <a:spcPct val="0"/>
-              </a:spcAft>
-            </a:pPr>
-            <a:r>
-              <a:rPr lang="en-US" altLang="en-US" sz="1100" strike="sngStrike" dirty="0">
-                <a:latin typeface="Calibri" panose="020F0502020204030204" pitchFamily="34" charset="0"/>
-                <a:ea typeface="Calibri" panose="020F0502020204030204" pitchFamily="34" charset="0"/>
-                <a:cs typeface="Times New Roman" panose="02020603050405020304" pitchFamily="18" charset="0"/>
-              </a:rPr>
-              <a:t>+ Drop</a:t>
-            </a:r>
-            <a:r>
-              <a:rPr lang="en-US" altLang="en-US" sz="1100" dirty="0">
-                <a:latin typeface="Calibri" panose="020F0502020204030204" pitchFamily="34" charset="0"/>
-                <a:ea typeface="Calibri" panose="020F0502020204030204" pitchFamily="34" charset="0"/>
-                <a:cs typeface="Times New Roman" panose="02020603050405020304" pitchFamily="18" charset="0"/>
-              </a:rPr>
-              <a:t> (now handled by the exposed property)</a:t>
-            </a:r>
-            <a:endParaRPr lang="en-US" altLang="en-US" sz="800" strike="sngStrike" dirty="0"/>
-          </a:p>
-          <a:p>
-            <a:pPr defTabSz="914400" eaLnBrk="0" fontAlgn="base" hangingPunct="0">
-              <a:spcBef>
-                <a:spcPct val="0"/>
-              </a:spcBef>
-              <a:spcAft>
-                <a:spcPct val="0"/>
-              </a:spcAft>
-            </a:pPr>
-            <a:r>
-              <a:rPr lang="en-US" altLang="en-US" sz="1100" strike="sngStrike" dirty="0">
-                <a:latin typeface="Calibri" panose="020F0502020204030204" pitchFamily="34" charset="0"/>
-                <a:ea typeface="Calibri" panose="020F0502020204030204" pitchFamily="34" charset="0"/>
-                <a:cs typeface="Times New Roman" panose="02020603050405020304" pitchFamily="18" charset="0"/>
-              </a:rPr>
-              <a:t>+ </a:t>
-            </a:r>
-            <a:r>
-              <a:rPr lang="en-US" altLang="en-US" sz="1100" strike="sngStrike" dirty="0" err="1">
-                <a:latin typeface="Calibri" panose="020F0502020204030204" pitchFamily="34" charset="0"/>
-                <a:ea typeface="Calibri" panose="020F0502020204030204" pitchFamily="34" charset="0"/>
-                <a:cs typeface="Times New Roman" panose="02020603050405020304" pitchFamily="18" charset="0"/>
-              </a:rPr>
-              <a:t>SetStackSize</a:t>
-            </a:r>
-            <a:r>
-              <a:rPr lang="en-US" altLang="en-US" sz="1100" dirty="0">
-                <a:latin typeface="Calibri" panose="020F0502020204030204" pitchFamily="34" charset="0"/>
-                <a:ea typeface="Calibri" panose="020F0502020204030204" pitchFamily="34" charset="0"/>
-                <a:cs typeface="Times New Roman" panose="02020603050405020304" pitchFamily="18" charset="0"/>
-              </a:rPr>
-              <a:t> (now handled by a property)</a:t>
             </a:r>
           </a:p>
           <a:p>
@@ -3578,66 +3654,74 @@
               </a:spcAft>
             </a:pPr>
             <a:r>
-              <a:rPr lang="en-US" altLang="en-US" sz="1100" dirty="0">
-                <a:latin typeface="Calibri" panose="020F0502020204030204" pitchFamily="34" charset="0"/>
-                <a:ea typeface="Calibri" panose="020F0502020204030204" pitchFamily="34" charset="0"/>
-                <a:cs typeface="Times New Roman" panose="02020603050405020304" pitchFamily="18" charset="0"/>
-              </a:rPr>
-              <a:t>+ Place</a:t>
-            </a:r>
-            <a:endParaRPr lang="en-US" altLang="en-US" dirty="0">
+              <a:rPr lang="en-US" altLang="en-US" sz="800" dirty="0">
+                <a:latin typeface="Arial" panose="020B0604020202020204" pitchFamily="34" charset="0"/>
+                <a:cs typeface="Times New Roman" panose="02020603050405020304" pitchFamily="18" charset="0"/>
+              </a:rPr>
+              <a:t>--------</a:t>
+            </a:r>
+          </a:p>
+          <a:p>
+            <a:pPr defTabSz="914400" eaLnBrk="0" fontAlgn="base" hangingPunct="0">
+              <a:spcBef>
+                <a:spcPct val="0"/>
+              </a:spcBef>
+              <a:spcAft>
+                <a:spcPct val="0"/>
+              </a:spcAft>
+            </a:pPr>
+            <a:r>
+              <a:rPr lang="en-US" altLang="en-US" sz="800" dirty="0">
+                <a:latin typeface="Arial" panose="020B0604020202020204" pitchFamily="34" charset="0"/>
+                <a:cs typeface="Times New Roman" panose="02020603050405020304" pitchFamily="18" charset="0"/>
+              </a:rPr>
+              <a:t>+ Abstract bool </a:t>
+            </a:r>
+            <a:r>
+              <a:rPr lang="en-US" altLang="en-US" sz="800" dirty="0" err="1">
+                <a:latin typeface="Arial" panose="020B0604020202020204" pitchFamily="34" charset="0"/>
+                <a:cs typeface="Times New Roman" panose="02020603050405020304" pitchFamily="18" charset="0"/>
+              </a:rPr>
+              <a:t>isSpaceFree</a:t>
+            </a:r>
+            <a:r>
+              <a:rPr lang="en-US" altLang="en-US" sz="800" dirty="0">
+                <a:latin typeface="Arial" panose="020B0604020202020204" pitchFamily="34" charset="0"/>
+                <a:cs typeface="Times New Roman" panose="02020603050405020304" pitchFamily="18" charset="0"/>
+              </a:rPr>
+              <a:t>(Vector2 position)</a:t>
+            </a:r>
+          </a:p>
+          <a:p>
+            <a:pPr defTabSz="914400" eaLnBrk="0" fontAlgn="base" hangingPunct="0">
+              <a:spcBef>
+                <a:spcPct val="0"/>
+              </a:spcBef>
+              <a:spcAft>
+                <a:spcPct val="0"/>
+              </a:spcAft>
+            </a:pPr>
+            <a:r>
+              <a:rPr lang="en-US" altLang="en-US" sz="800" dirty="0">
+                <a:latin typeface="Arial" panose="020B0604020202020204" pitchFamily="34" charset="0"/>
+                <a:cs typeface="Times New Roman" panose="02020603050405020304" pitchFamily="18" charset="0"/>
+              </a:rPr>
+              <a:t>+ bool Place(Vector2 position)</a:t>
+            </a:r>
+          </a:p>
+          <a:p>
+            <a:pPr defTabSz="914400" eaLnBrk="0" fontAlgn="base" hangingPunct="0">
+              <a:spcBef>
+                <a:spcPct val="0"/>
+              </a:spcBef>
+              <a:spcAft>
+                <a:spcPct val="0"/>
+              </a:spcAft>
+            </a:pPr>
+            <a:endParaRPr lang="en-US" altLang="en-US" sz="800" dirty="0">
               <a:latin typeface="Arial" panose="020B0604020202020204" pitchFamily="34" charset="0"/>
-              <a:ea typeface="Calibri" panose="020F0502020204030204" pitchFamily="34" charset="0"/>
               <a:cs typeface="Times New Roman" panose="02020603050405020304" pitchFamily="18" charset="0"/>
             </a:endParaRPr>
-          </a:p>
-          <a:p>
-            <a:pPr defTabSz="914400" eaLnBrk="0" fontAlgn="base" hangingPunct="0">
-              <a:spcBef>
-                <a:spcPct val="0"/>
-              </a:spcBef>
-              <a:spcAft>
-                <a:spcPct val="0"/>
-              </a:spcAft>
-            </a:pPr>
-            <a:r>
-              <a:rPr lang="en-US" altLang="en-US" sz="800" dirty="0">
-                <a:latin typeface="Arial" panose="020B0604020202020204" pitchFamily="34" charset="0"/>
-                <a:cs typeface="Times New Roman" panose="02020603050405020304" pitchFamily="18" charset="0"/>
-              </a:rPr>
-              <a:t>--------</a:t>
-            </a:r>
-          </a:p>
-          <a:p>
-            <a:pPr defTabSz="914400" eaLnBrk="0" fontAlgn="base" hangingPunct="0">
-              <a:spcBef>
-                <a:spcPct val="0"/>
-              </a:spcBef>
-              <a:spcAft>
-                <a:spcPct val="0"/>
-              </a:spcAft>
-            </a:pPr>
-            <a:r>
-              <a:rPr lang="en-US" altLang="en-US" sz="800" dirty="0">
-                <a:latin typeface="Arial" panose="020B0604020202020204" pitchFamily="34" charset="0"/>
-                <a:cs typeface="Times New Roman" panose="02020603050405020304" pitchFamily="18" charset="0"/>
-              </a:rPr>
-              <a:t>Abstract bool </a:t>
-            </a:r>
-            <a:r>
-              <a:rPr lang="en-US" altLang="en-US" sz="800" dirty="0" err="1">
-                <a:latin typeface="Arial" panose="020B0604020202020204" pitchFamily="34" charset="0"/>
-                <a:cs typeface="Times New Roman" panose="02020603050405020304" pitchFamily="18" charset="0"/>
-              </a:rPr>
-              <a:t>isSpaceFree</a:t>
-            </a:r>
-            <a:r>
-              <a:rPr lang="en-US" altLang="en-US" sz="800" dirty="0">
-                <a:latin typeface="Arial" panose="020B0604020202020204" pitchFamily="34" charset="0"/>
-                <a:cs typeface="Times New Roman" panose="02020603050405020304" pitchFamily="18" charset="0"/>
-              </a:rPr>
-              <a:t>(Vector2 position)</a:t>
-            </a:r>
           </a:p>
           <a:p>
             <a:pPr defTabSz="914400" eaLnBrk="0" fontAlgn="base" hangingPunct="0">
@@ -3970,8 +4054,8 @@
         </p:nvCxnSpPr>
         <p:spPr>
           <a:xfrm flipV="1">
-            <a:off x="7210425" y="4398639"/>
-            <a:ext cx="962024" cy="283534"/>
+            <a:off x="7210424" y="4398639"/>
+            <a:ext cx="962025" cy="283534"/>
           </a:xfrm>
           <a:prstGeom prst="bentConnector3">
             <a:avLst/>
@@ -4297,8 +4381,8 @@
         </p:nvCxnSpPr>
         <p:spPr>
           <a:xfrm rot="5400000">
-            <a:off x="2468094" y="5274605"/>
-            <a:ext cx="956647" cy="3648456"/>
+            <a:off x="2614040" y="5128659"/>
+            <a:ext cx="956647" cy="3940348"/>
           </a:xfrm>
           <a:prstGeom prst="bentConnector3">
             <a:avLst/>
@@ -4340,11 +4424,13 @@
         </p:nvCxnSpPr>
         <p:spPr>
           <a:xfrm rot="5400000">
-            <a:off x="3029935" y="5831702"/>
-            <a:ext cx="951903" cy="2529519"/>
+            <a:off x="3175881" y="5685756"/>
+            <a:ext cx="951903" cy="2821411"/>
           </a:xfrm>
           <a:prstGeom prst="bentConnector3">
-            <a:avLst/>
+            <a:avLst>
+              <a:gd name="adj1" fmla="val 50000"/>
+            </a:avLst>
           </a:prstGeom>
           <a:ln>
             <a:tailEnd type="triangle"/>
@@ -4383,11 +4469,13 @@
         </p:nvCxnSpPr>
         <p:spPr>
           <a:xfrm rot="5400000">
-            <a:off x="3667058" y="6459339"/>
-            <a:ext cx="942416" cy="1264759"/>
+            <a:off x="3813004" y="6313393"/>
+            <a:ext cx="942416" cy="1556651"/>
           </a:xfrm>
           <a:prstGeom prst="bentConnector3">
-            <a:avLst/>
+            <a:avLst>
+              <a:gd name="adj1" fmla="val 50000"/>
+            </a:avLst>
           </a:prstGeom>
           <a:ln>
             <a:tailEnd type="triangle"/>
@@ -4720,7 +4808,7 @@
         </p:nvSpPr>
         <p:spPr bwMode="auto">
           <a:xfrm>
-            <a:off x="13731651" y="7070873"/>
+            <a:off x="13621568" y="7073580"/>
             <a:ext cx="1533525" cy="711201"/>
           </a:xfrm>
           <a:prstGeom prst="rect">
@@ -4835,8 +4923,8 @@
         </p:nvCxnSpPr>
         <p:spPr>
           <a:xfrm rot="5400000">
-            <a:off x="14762441" y="6567132"/>
-            <a:ext cx="239713" cy="767766"/>
+            <a:off x="14706046" y="6513445"/>
+            <a:ext cx="242421" cy="877849"/>
           </a:xfrm>
           <a:prstGeom prst="bentConnector3">
             <a:avLst/>
@@ -5194,7 +5282,7 @@
         </p:nvSpPr>
         <p:spPr bwMode="auto">
           <a:xfrm>
-            <a:off x="4457162" y="7558237"/>
+            <a:off x="5825233" y="7572413"/>
             <a:ext cx="745958" cy="600075"/>
           </a:xfrm>
           <a:prstGeom prst="rect">
@@ -5263,21 +5351,290 @@
           </p:cNvPr>
           <p:cNvCxnSpPr>
             <a:cxnSpLocks/>
+            <a:stCxn id="4" idx="2"/>
             <a:endCxn id="56" idx="0"/>
           </p:cNvCxnSpPr>
           <p:nvPr/>
         </p:nvCxnSpPr>
         <p:spPr>
           <a:xfrm rot="16200000" flipH="1">
-            <a:off x="4331530" y="7059626"/>
-            <a:ext cx="937726" cy="59496"/>
+            <a:off x="5154423" y="6528623"/>
+            <a:ext cx="951903" cy="1135675"/>
           </a:xfrm>
           <a:prstGeom prst="bentConnector3">
             <a:avLst>
-              <a:gd name="adj1" fmla="val 51016"/>
+              <a:gd name="adj1" fmla="val 50000"/>
             </a:avLst>
           </a:prstGeom>
           <a:ln>
+            <a:tailEnd type="triangle"/>
+          </a:ln>
+        </p:spPr>
+        <p:style>
+          <a:lnRef idx="1">
+            <a:schemeClr val="accent1"/>
+          </a:lnRef>
+          <a:fillRef idx="0">
+            <a:schemeClr val="accent1"/>
+          </a:fillRef>
+          <a:effectRef idx="0">
+            <a:schemeClr val="accent1"/>
+          </a:effectRef>
+          <a:fontRef idx="minor">
+            <a:schemeClr val="tx1"/>
+          </a:fontRef>
+        </p:style>
+      </p:cxnSp>
+      <p:sp>
+        <p:nvSpPr>
+          <p:cNvPr id="113" name="Text Box 2">
+            <a:extLst>
+              <a:ext uri="{FF2B5EF4-FFF2-40B4-BE49-F238E27FC236}">
+                <a16:creationId xmlns:a16="http://schemas.microsoft.com/office/drawing/2014/main" id="{3677A67A-F659-48F1-B76A-4472B505B111}"/>
+              </a:ext>
+            </a:extLst>
+          </p:cNvPr>
+          <p:cNvSpPr txBox="1">
+            <a:spLocks noChangeArrowheads="1"/>
+          </p:cNvSpPr>
+          <p:nvPr/>
+        </p:nvSpPr>
+        <p:spPr bwMode="auto">
+          <a:xfrm>
+            <a:off x="138856" y="139084"/>
+            <a:ext cx="2712623" cy="1352494"/>
+          </a:xfrm>
+          <a:prstGeom prst="rect">
+            <a:avLst/>
+          </a:prstGeom>
+          <a:solidFill>
+            <a:srgbClr val="FFFFFF"/>
+          </a:solidFill>
+          <a:ln w="9525">
+            <a:solidFill>
+              <a:srgbClr val="000000"/>
+            </a:solidFill>
+            <a:miter lim="800000"/>
+            <a:headEnd/>
+            <a:tailEnd/>
+          </a:ln>
+        </p:spPr>
+        <p:txBody>
+          <a:bodyPr vert="horz" wrap="square" lIns="91440" tIns="45720" rIns="91440" bIns="45720" numCol="1" anchor="t" anchorCtr="0" compatLnSpc="1">
+            <a:prstTxWarp prst="textNoShape">
+              <a:avLst/>
+            </a:prstTxWarp>
+          </a:bodyPr>
+          <a:lstStyle/>
+          <a:p>
+            <a:pPr defTabSz="914400" eaLnBrk="0" fontAlgn="base" hangingPunct="0">
+              <a:spcBef>
+                <a:spcPct val="0"/>
+              </a:spcBef>
+              <a:spcAft>
+                <a:spcPct val="0"/>
+              </a:spcAft>
+            </a:pPr>
+            <a:r>
+              <a:rPr lang="en-US" altLang="en-US" sz="1100" dirty="0" err="1">
+                <a:latin typeface="Calibri" panose="020F0502020204030204" pitchFamily="34" charset="0"/>
+                <a:ea typeface="Calibri" panose="020F0502020204030204" pitchFamily="34" charset="0"/>
+                <a:cs typeface="Times New Roman" panose="02020603050405020304" pitchFamily="18" charset="0"/>
+              </a:rPr>
+              <a:t>ItemSpriteRenderer</a:t>
+            </a:r>
+            <a:endParaRPr lang="en-US" altLang="en-US" sz="1100" dirty="0">
+              <a:latin typeface="Calibri" panose="020F0502020204030204" pitchFamily="34" charset="0"/>
+              <a:ea typeface="Calibri" panose="020F0502020204030204" pitchFamily="34" charset="0"/>
+              <a:cs typeface="Times New Roman" panose="02020603050405020304" pitchFamily="18" charset="0"/>
+            </a:endParaRPr>
+          </a:p>
+          <a:p>
+            <a:pPr defTabSz="914400" eaLnBrk="0" fontAlgn="base" hangingPunct="0">
+              <a:spcBef>
+                <a:spcPct val="0"/>
+              </a:spcBef>
+              <a:spcAft>
+                <a:spcPct val="0"/>
+              </a:spcAft>
+            </a:pPr>
+            <a:r>
+              <a:rPr lang="en-US" altLang="en-US" sz="1100" dirty="0">
+                <a:latin typeface="Calibri" panose="020F0502020204030204" pitchFamily="34" charset="0"/>
+                <a:cs typeface="Times New Roman" panose="02020603050405020304" pitchFamily="18" charset="0"/>
+              </a:rPr>
+              <a:t>---------------------------------------------</a:t>
+            </a:r>
+          </a:p>
+          <a:p>
+            <a:pPr marL="171450" indent="-171450" defTabSz="914400" eaLnBrk="0" fontAlgn="base" hangingPunct="0">
+              <a:spcBef>
+                <a:spcPct val="0"/>
+              </a:spcBef>
+              <a:spcAft>
+                <a:spcPct val="0"/>
+              </a:spcAft>
+              <a:buFontTx/>
+              <a:buChar char="-"/>
+            </a:pPr>
+            <a:r>
+              <a:rPr lang="en-US" altLang="en-US" sz="1100" dirty="0" err="1">
+                <a:ea typeface="Calibri" panose="020F0502020204030204" pitchFamily="34" charset="0"/>
+                <a:cs typeface="Times New Roman" panose="02020603050405020304" pitchFamily="18" charset="0"/>
+              </a:rPr>
+              <a:t>SpriteRenderer</a:t>
+            </a:r>
+            <a:r>
+              <a:rPr lang="en-US" altLang="en-US" sz="1100" dirty="0">
+                <a:ea typeface="Calibri" panose="020F0502020204030204" pitchFamily="34" charset="0"/>
+                <a:cs typeface="Times New Roman" panose="02020603050405020304" pitchFamily="18" charset="0"/>
+              </a:rPr>
+              <a:t> </a:t>
+            </a:r>
+            <a:r>
+              <a:rPr lang="en-US" altLang="en-US" sz="1100" dirty="0" err="1">
+                <a:ea typeface="Calibri" panose="020F0502020204030204" pitchFamily="34" charset="0"/>
+                <a:cs typeface="Times New Roman" panose="02020603050405020304" pitchFamily="18" charset="0"/>
+              </a:rPr>
+              <a:t>mySpriteRenderer</a:t>
+            </a:r>
+            <a:endParaRPr lang="en-US" altLang="en-US" sz="1100" dirty="0">
+              <a:ea typeface="Calibri" panose="020F0502020204030204" pitchFamily="34" charset="0"/>
+              <a:cs typeface="Times New Roman" panose="02020603050405020304" pitchFamily="18" charset="0"/>
+            </a:endParaRPr>
+          </a:p>
+          <a:p>
+            <a:pPr marL="171450" indent="-171450" defTabSz="914400" eaLnBrk="0" fontAlgn="base" hangingPunct="0">
+              <a:spcBef>
+                <a:spcPct val="0"/>
+              </a:spcBef>
+              <a:spcAft>
+                <a:spcPct val="0"/>
+              </a:spcAft>
+              <a:buFontTx/>
+              <a:buChar char="-"/>
+            </a:pPr>
+            <a:r>
+              <a:rPr lang="en-US" altLang="en-US" sz="1100" dirty="0">
+                <a:ea typeface="Calibri" panose="020F0502020204030204" pitchFamily="34" charset="0"/>
+                <a:cs typeface="Times New Roman" panose="02020603050405020304" pitchFamily="18" charset="0"/>
+              </a:rPr>
+              <a:t>Entry </a:t>
+            </a:r>
+            <a:r>
+              <a:rPr lang="en-US" altLang="en-US" sz="1100" dirty="0" err="1">
+                <a:ea typeface="Calibri" panose="020F0502020204030204" pitchFamily="34" charset="0"/>
+                <a:cs typeface="Times New Roman" panose="02020603050405020304" pitchFamily="18" charset="0"/>
+              </a:rPr>
+              <a:t>stackNumberEntry</a:t>
+            </a:r>
+            <a:endParaRPr lang="en-US" altLang="en-US" sz="1100" dirty="0">
+              <a:ea typeface="Calibri" panose="020F0502020204030204" pitchFamily="34" charset="0"/>
+              <a:cs typeface="Times New Roman" panose="02020603050405020304" pitchFamily="18" charset="0"/>
+            </a:endParaRPr>
+          </a:p>
+          <a:p>
+            <a:pPr defTabSz="914400" eaLnBrk="0" fontAlgn="base" hangingPunct="0">
+              <a:spcBef>
+                <a:spcPct val="0"/>
+              </a:spcBef>
+              <a:spcAft>
+                <a:spcPct val="0"/>
+              </a:spcAft>
+            </a:pPr>
+            <a:r>
+              <a:rPr lang="en-US" altLang="en-US" sz="1100" dirty="0">
+                <a:ea typeface="Calibri" panose="020F0502020204030204" pitchFamily="34" charset="0"/>
+                <a:cs typeface="Times New Roman" panose="02020603050405020304" pitchFamily="18" charset="0"/>
+              </a:rPr>
+              <a:t>+ Sprite </a:t>
+            </a:r>
+            <a:r>
+              <a:rPr lang="en-US" altLang="en-US" sz="1100" dirty="0" err="1">
+                <a:ea typeface="Calibri" panose="020F0502020204030204" pitchFamily="34" charset="0"/>
+                <a:cs typeface="Times New Roman" panose="02020603050405020304" pitchFamily="18" charset="0"/>
+              </a:rPr>
+              <a:t>itemSprite</a:t>
+            </a:r>
+            <a:endParaRPr lang="en-US" altLang="en-US" sz="1100" dirty="0">
+              <a:ea typeface="Calibri" panose="020F0502020204030204" pitchFamily="34" charset="0"/>
+              <a:cs typeface="Times New Roman" panose="02020603050405020304" pitchFamily="18" charset="0"/>
+            </a:endParaRPr>
+          </a:p>
+          <a:p>
+            <a:pPr defTabSz="914400" eaLnBrk="0" fontAlgn="base" hangingPunct="0">
+              <a:spcBef>
+                <a:spcPct val="0"/>
+              </a:spcBef>
+              <a:spcAft>
+                <a:spcPct val="0"/>
+              </a:spcAft>
+            </a:pPr>
+            <a:r>
+              <a:rPr lang="en-US" altLang="en-US" sz="1100" dirty="0">
+                <a:ea typeface="Calibri" panose="020F0502020204030204" pitchFamily="34" charset="0"/>
+                <a:cs typeface="Times New Roman" panose="02020603050405020304" pitchFamily="18" charset="0"/>
+              </a:rPr>
+              <a:t>+ int </a:t>
+            </a:r>
+            <a:r>
+              <a:rPr lang="en-US" altLang="en-US" sz="1100" dirty="0" err="1">
+                <a:ea typeface="Calibri" panose="020F0502020204030204" pitchFamily="34" charset="0"/>
+                <a:cs typeface="Times New Roman" panose="02020603050405020304" pitchFamily="18" charset="0"/>
+              </a:rPr>
+              <a:t>stackSize</a:t>
+            </a:r>
+            <a:endParaRPr lang="en-US" altLang="en-US" sz="1100" dirty="0">
+              <a:ea typeface="Calibri" panose="020F0502020204030204" pitchFamily="34" charset="0"/>
+              <a:cs typeface="Times New Roman" panose="02020603050405020304" pitchFamily="18" charset="0"/>
+            </a:endParaRPr>
+          </a:p>
+          <a:p>
+            <a:pPr defTabSz="914400" eaLnBrk="0" fontAlgn="base" hangingPunct="0">
+              <a:spcBef>
+                <a:spcPct val="0"/>
+              </a:spcBef>
+              <a:spcAft>
+                <a:spcPct val="0"/>
+              </a:spcAft>
+            </a:pPr>
+            <a:r>
+              <a:rPr lang="en-US" altLang="en-US" sz="1100" dirty="0">
+                <a:latin typeface="Calibri" panose="020F0502020204030204" pitchFamily="34" charset="0"/>
+                <a:ea typeface="Calibri" panose="020F0502020204030204" pitchFamily="34" charset="0"/>
+                <a:cs typeface="Times New Roman" panose="02020603050405020304" pitchFamily="18" charset="0"/>
+              </a:rPr>
+              <a:t>--------------------------------------------</a:t>
+            </a:r>
+          </a:p>
+        </p:txBody>
+      </p:sp>
+      <p:cxnSp>
+        <p:nvCxnSpPr>
+          <p:cNvPr id="117" name="Connector: Elbow 116">
+            <a:extLst>
+              <a:ext uri="{FF2B5EF4-FFF2-40B4-BE49-F238E27FC236}">
+                <a16:creationId xmlns:a16="http://schemas.microsoft.com/office/drawing/2014/main" id="{47AC32E2-595F-4439-97F3-E9586ED11B19}"/>
+              </a:ext>
+            </a:extLst>
+          </p:cNvPr>
+          <p:cNvCxnSpPr>
+            <a:cxnSpLocks/>
+            <a:stCxn id="113" idx="2"/>
+            <a:endCxn id="4" idx="1"/>
+          </p:cNvCxnSpPr>
+          <p:nvPr/>
+        </p:nvCxnSpPr>
+        <p:spPr>
+          <a:xfrm rot="16200000" flipH="1">
+            <a:off x="609611" y="2377134"/>
+            <a:ext cx="3190595" cy="1419481"/>
+          </a:xfrm>
+          <a:prstGeom prst="bentConnector2">
+            <a:avLst/>
+          </a:prstGeom>
+          <a:ln w="12700">
+            <a:prstDash val="lgDash"/>
             <a:tailEnd type="triangle"/>
           </a:ln>
         </p:spPr>

</xml_diff>

<commit_message>
ItemSpriteRenderers and RoguelikeObjects have been initially intergrated into the inventories.
</commit_message>
<xml_diff>
--- a/Class Diagram.pptx
+++ b/Class Diagram.pptx
@@ -243,7 +243,7 @@
           <a:p>
             <a:fld id="{DFA429E4-E4A0-4FCB-B57B-5790209CB571}" type="datetimeFigureOut">
               <a:rPr lang="en-US" smtClean="0"/>
-              <a:t>8/8/2019</a:t>
+              <a:t>8/10/2019</a:t>
             </a:fld>
             <a:endParaRPr lang="en-US"/>
           </a:p>
@@ -413,7 +413,7 @@
           <a:p>
             <a:fld id="{DFA429E4-E4A0-4FCB-B57B-5790209CB571}" type="datetimeFigureOut">
               <a:rPr lang="en-US" smtClean="0"/>
-              <a:t>8/8/2019</a:t>
+              <a:t>8/10/2019</a:t>
             </a:fld>
             <a:endParaRPr lang="en-US"/>
           </a:p>
@@ -593,7 +593,7 @@
           <a:p>
             <a:fld id="{DFA429E4-E4A0-4FCB-B57B-5790209CB571}" type="datetimeFigureOut">
               <a:rPr lang="en-US" smtClean="0"/>
-              <a:t>8/8/2019</a:t>
+              <a:t>8/10/2019</a:t>
             </a:fld>
             <a:endParaRPr lang="en-US"/>
           </a:p>
@@ -763,7 +763,7 @@
           <a:p>
             <a:fld id="{DFA429E4-E4A0-4FCB-B57B-5790209CB571}" type="datetimeFigureOut">
               <a:rPr lang="en-US" smtClean="0"/>
-              <a:t>8/8/2019</a:t>
+              <a:t>8/10/2019</a:t>
             </a:fld>
             <a:endParaRPr lang="en-US"/>
           </a:p>
@@ -1007,7 +1007,7 @@
           <a:p>
             <a:fld id="{DFA429E4-E4A0-4FCB-B57B-5790209CB571}" type="datetimeFigureOut">
               <a:rPr lang="en-US" smtClean="0"/>
-              <a:t>8/8/2019</a:t>
+              <a:t>8/10/2019</a:t>
             </a:fld>
             <a:endParaRPr lang="en-US"/>
           </a:p>
@@ -1239,7 +1239,7 @@
           <a:p>
             <a:fld id="{DFA429E4-E4A0-4FCB-B57B-5790209CB571}" type="datetimeFigureOut">
               <a:rPr lang="en-US" smtClean="0"/>
-              <a:t>8/8/2019</a:t>
+              <a:t>8/10/2019</a:t>
             </a:fld>
             <a:endParaRPr lang="en-US"/>
           </a:p>
@@ -1606,7 +1606,7 @@
           <a:p>
             <a:fld id="{DFA429E4-E4A0-4FCB-B57B-5790209CB571}" type="datetimeFigureOut">
               <a:rPr lang="en-US" smtClean="0"/>
-              <a:t>8/8/2019</a:t>
+              <a:t>8/10/2019</a:t>
             </a:fld>
             <a:endParaRPr lang="en-US"/>
           </a:p>
@@ -1724,7 +1724,7 @@
           <a:p>
             <a:fld id="{DFA429E4-E4A0-4FCB-B57B-5790209CB571}" type="datetimeFigureOut">
               <a:rPr lang="en-US" smtClean="0"/>
-              <a:t>8/8/2019</a:t>
+              <a:t>8/10/2019</a:t>
             </a:fld>
             <a:endParaRPr lang="en-US"/>
           </a:p>
@@ -1819,7 +1819,7 @@
           <a:p>
             <a:fld id="{DFA429E4-E4A0-4FCB-B57B-5790209CB571}" type="datetimeFigureOut">
               <a:rPr lang="en-US" smtClean="0"/>
-              <a:t>8/8/2019</a:t>
+              <a:t>8/10/2019</a:t>
             </a:fld>
             <a:endParaRPr lang="en-US"/>
           </a:p>
@@ -2096,7 +2096,7 @@
           <a:p>
             <a:fld id="{DFA429E4-E4A0-4FCB-B57B-5790209CB571}" type="datetimeFigureOut">
               <a:rPr lang="en-US" smtClean="0"/>
-              <a:t>8/8/2019</a:t>
+              <a:t>8/10/2019</a:t>
             </a:fld>
             <a:endParaRPr lang="en-US"/>
           </a:p>
@@ -2353,7 +2353,7 @@
           <a:p>
             <a:fld id="{DFA429E4-E4A0-4FCB-B57B-5790209CB571}" type="datetimeFigureOut">
               <a:rPr lang="en-US" smtClean="0"/>
-              <a:t>8/8/2019</a:t>
+              <a:t>8/10/2019</a:t>
             </a:fld>
             <a:endParaRPr lang="en-US"/>
           </a:p>
@@ -2566,7 +2566,7 @@
           <a:p>
             <a:fld id="{DFA429E4-E4A0-4FCB-B57B-5790209CB571}" type="datetimeFigureOut">
               <a:rPr lang="en-US" smtClean="0"/>
-              <a:t>8/8/2019</a:t>
+              <a:t>8/10/2019</a:t>
             </a:fld>
             <a:endParaRPr lang="en-US"/>
           </a:p>
@@ -2987,8 +2987,8 @@
         </p:nvSpPr>
         <p:spPr bwMode="auto">
           <a:xfrm>
-            <a:off x="2914649" y="2743836"/>
-            <a:ext cx="4295775" cy="3876674"/>
+            <a:off x="2914649" y="2743835"/>
+            <a:ext cx="3516731" cy="4327037"/>
           </a:xfrm>
           <a:prstGeom prst="rect">
             <a:avLst/>
@@ -3119,6 +3119,30 @@
               </a:rPr>
               <a:t>&gt; tags</a:t>
             </a:r>
+          </a:p>
+          <a:p>
+            <a:pPr defTabSz="914400" eaLnBrk="0" fontAlgn="base" hangingPunct="0">
+              <a:spcBef>
+                <a:spcPct val="0"/>
+              </a:spcBef>
+              <a:spcAft>
+                <a:spcPct val="0"/>
+              </a:spcAft>
+            </a:pPr>
+            <a:r>
+              <a:rPr lang="en-US" altLang="en-US" sz="1100" dirty="0">
+                <a:latin typeface="Calibri" panose="020F0502020204030204" pitchFamily="34" charset="0"/>
+                <a:cs typeface="Times New Roman" panose="02020603050405020304" pitchFamily="18" charset="0"/>
+              </a:rPr>
+              <a:t>+ string </a:t>
+            </a:r>
+            <a:r>
+              <a:rPr lang="en-US" altLang="en-US" sz="1100" dirty="0" err="1">
+                <a:latin typeface="Calibri" panose="020F0502020204030204" pitchFamily="34" charset="0"/>
+                <a:cs typeface="Times New Roman" panose="02020603050405020304" pitchFamily="18" charset="0"/>
+              </a:rPr>
+              <a:t>UniqueID</a:t>
+            </a:r>
             <a:endParaRPr lang="en-US" altLang="en-US" sz="800" dirty="0"/>
           </a:p>
           <a:p>
@@ -3164,6 +3188,30 @@
                 <a:cs typeface="Times New Roman" panose="02020603050405020304" pitchFamily="18" charset="0"/>
               </a:rPr>
               <a:t>+ string description</a:t>
+            </a:r>
+          </a:p>
+          <a:p>
+            <a:pPr defTabSz="914400" eaLnBrk="0" fontAlgn="base" hangingPunct="0">
+              <a:spcBef>
+                <a:spcPct val="0"/>
+              </a:spcBef>
+              <a:spcAft>
+                <a:spcPct val="0"/>
+              </a:spcAft>
+            </a:pPr>
+            <a:r>
+              <a:rPr lang="en-US" altLang="en-US" sz="1100" dirty="0">
+                <a:latin typeface="Calibri" panose="020F0502020204030204" pitchFamily="34" charset="0"/>
+                <a:cs typeface="Times New Roman" panose="02020603050405020304" pitchFamily="18" charset="0"/>
+              </a:rPr>
+              <a:t>+ Inventory </a:t>
+            </a:r>
+            <a:r>
+              <a:rPr lang="en-US" altLang="en-US" sz="1100" dirty="0" err="1">
+                <a:latin typeface="Calibri" panose="020F0502020204030204" pitchFamily="34" charset="0"/>
+                <a:cs typeface="Times New Roman" panose="02020603050405020304" pitchFamily="18" charset="0"/>
+              </a:rPr>
+              <a:t>myInventory</a:t>
             </a:r>
             <a:endParaRPr lang="en-US" altLang="en-US" sz="800" dirty="0"/>
           </a:p>
@@ -3493,6 +3541,24 @@
             <a:r>
               <a:rPr lang="en-US" altLang="en-US" sz="1100" dirty="0">
                 <a:latin typeface="Calibri" panose="020F0502020204030204" pitchFamily="34" charset="0"/>
+                <a:ea typeface="Calibri" panose="020F0502020204030204" pitchFamily="34" charset="0"/>
+                <a:cs typeface="Times New Roman" panose="02020603050405020304" pitchFamily="18" charset="0"/>
+              </a:rPr>
+              <a:t>+ void Initialize();</a:t>
+            </a:r>
+          </a:p>
+          <a:p>
+            <a:pPr defTabSz="914400" eaLnBrk="0" fontAlgn="base" hangingPunct="0">
+              <a:spcBef>
+                <a:spcPct val="0"/>
+              </a:spcBef>
+              <a:spcAft>
+                <a:spcPct val="0"/>
+              </a:spcAft>
+            </a:pPr>
+            <a:r>
+              <a:rPr lang="en-US" altLang="en-US" sz="1100" dirty="0">
+                <a:latin typeface="Calibri" panose="020F0502020204030204" pitchFamily="34" charset="0"/>
                 <a:cs typeface="Times New Roman" panose="02020603050405020304" pitchFamily="18" charset="0"/>
               </a:rPr>
               <a:t>+ string </a:t>
@@ -3509,7 +3575,7 @@
                 <a:latin typeface="Calibri" panose="020F0502020204030204" pitchFamily="34" charset="0"/>
                 <a:cs typeface="Times New Roman" panose="02020603050405020304" pitchFamily="18" charset="0"/>
               </a:rPr>
-              <a:t>()</a:t>
+              <a:t>();</a:t>
             </a:r>
           </a:p>
           <a:p>
@@ -3563,7 +3629,7 @@
         <p:spPr bwMode="auto">
           <a:xfrm>
             <a:off x="8172449" y="2556669"/>
-            <a:ext cx="4391025" cy="3683940"/>
+            <a:ext cx="2978151" cy="3683940"/>
           </a:xfrm>
           <a:prstGeom prst="rect">
             <a:avLst/>
@@ -4054,8 +4120,8 @@
         </p:nvCxnSpPr>
         <p:spPr>
           <a:xfrm flipV="1">
-            <a:off x="7210424" y="4398639"/>
-            <a:ext cx="962025" cy="283534"/>
+            <a:off x="6431380" y="4398639"/>
+            <a:ext cx="1741069" cy="508715"/>
           </a:xfrm>
           <a:prstGeom prst="bentConnector3">
             <a:avLst/>
@@ -4097,12 +4163,12 @@
         </p:nvCxnSpPr>
         <p:spPr>
           <a:xfrm>
-            <a:off x="12563474" y="4398639"/>
-            <a:ext cx="1983568" cy="2137245"/>
+            <a:off x="11150600" y="4398639"/>
+            <a:ext cx="3396442" cy="2137245"/>
           </a:xfrm>
           <a:prstGeom prst="bentConnector3">
             <a:avLst>
-              <a:gd name="adj1" fmla="val 16386"/>
+              <a:gd name="adj1" fmla="val 32800"/>
             </a:avLst>
           </a:prstGeom>
           <a:ln>
@@ -4142,12 +4208,12 @@
         </p:nvCxnSpPr>
         <p:spPr>
           <a:xfrm flipV="1">
-            <a:off x="12563474" y="1971999"/>
-            <a:ext cx="1982564" cy="2426640"/>
+            <a:off x="11150600" y="1971999"/>
+            <a:ext cx="3395438" cy="2426640"/>
           </a:xfrm>
           <a:prstGeom prst="bentConnector3">
             <a:avLst>
-              <a:gd name="adj1" fmla="val 16369"/>
+              <a:gd name="adj1" fmla="val 32421"/>
             </a:avLst>
           </a:prstGeom>
           <a:ln>
@@ -4187,8 +4253,8 @@
         </p:nvCxnSpPr>
         <p:spPr>
           <a:xfrm rot="16200000" flipH="1">
-            <a:off x="9932911" y="6675660"/>
-            <a:ext cx="1541465" cy="671362"/>
+            <a:off x="9579692" y="6322441"/>
+            <a:ext cx="1541465" cy="1377799"/>
           </a:xfrm>
           <a:prstGeom prst="bentConnector3">
             <a:avLst>
@@ -4381,8 +4447,8 @@
         </p:nvCxnSpPr>
         <p:spPr>
           <a:xfrm rot="5400000">
-            <a:off x="2614040" y="5128659"/>
-            <a:ext cx="956647" cy="3940348"/>
+            <a:off x="2644460" y="5548601"/>
+            <a:ext cx="506285" cy="3550826"/>
           </a:xfrm>
           <a:prstGeom prst="bentConnector3">
             <a:avLst/>
@@ -4424,8 +4490,8 @@
         </p:nvCxnSpPr>
         <p:spPr>
           <a:xfrm rot="5400000">
-            <a:off x="3175881" y="5685756"/>
-            <a:ext cx="951903" cy="2821411"/>
+            <a:off x="3206301" y="6105698"/>
+            <a:ext cx="501541" cy="2431889"/>
           </a:xfrm>
           <a:prstGeom prst="bentConnector3">
             <a:avLst>
@@ -4469,8 +4535,8 @@
         </p:nvCxnSpPr>
         <p:spPr>
           <a:xfrm rot="5400000">
-            <a:off x="3813004" y="6313393"/>
-            <a:ext cx="942416" cy="1556651"/>
+            <a:off x="3843424" y="6733335"/>
+            <a:ext cx="492054" cy="1167129"/>
           </a:xfrm>
           <a:prstGeom prst="bentConnector3">
             <a:avLst>
@@ -5358,8 +5424,8 @@
         </p:nvCxnSpPr>
         <p:spPr>
           <a:xfrm rot="16200000" flipH="1">
-            <a:off x="5154423" y="6528623"/>
-            <a:ext cx="951903" cy="1135675"/>
+            <a:off x="5184843" y="6559043"/>
+            <a:ext cx="501541" cy="1525197"/>
           </a:xfrm>
           <a:prstGeom prst="bentConnector3">
             <a:avLst>
@@ -5627,8 +5693,8 @@
         </p:nvCxnSpPr>
         <p:spPr>
           <a:xfrm rot="16200000" flipH="1">
-            <a:off x="609611" y="2377134"/>
-            <a:ext cx="3190595" cy="1419481"/>
+            <a:off x="497020" y="2489725"/>
+            <a:ext cx="3415776" cy="1419481"/>
           </a:xfrm>
           <a:prstGeom prst="bentConnector2">
             <a:avLst/>

</xml_diff>

<commit_message>
WorldObjects, Wall2s, WallConnecteds, RogueSpriteRenderers and more have been updated.
The Map Controller is no longer being used. It has been replaced by the WallController. The units and pathfinding code has been updatd to use the WallController and the Wall2 objects now.
RogueSpriteRenderers now have a default sprite to use in place of using null.
WallConnected objects have been implemented and now pick their sprite based on the number and positions of walls around themselves.
GameController now has a reference to a temporary inventory which can be used for putting WorldObjects into before Placing them (should probably make a MakeAndPlace function under WorldObject that immediately places the object into the world inventory).
</commit_message>
<xml_diff>
--- a/Class Diagram.pptx
+++ b/Class Diagram.pptx
@@ -243,7 +243,7 @@
           <a:p>
             <a:fld id="{DFA429E4-E4A0-4FCB-B57B-5790209CB571}" type="datetimeFigureOut">
               <a:rPr lang="en-US" smtClean="0"/>
-              <a:t>8/10/2019</a:t>
+              <a:t>8/13/2019</a:t>
             </a:fld>
             <a:endParaRPr lang="en-US"/>
           </a:p>
@@ -413,7 +413,7 @@
           <a:p>
             <a:fld id="{DFA429E4-E4A0-4FCB-B57B-5790209CB571}" type="datetimeFigureOut">
               <a:rPr lang="en-US" smtClean="0"/>
-              <a:t>8/10/2019</a:t>
+              <a:t>8/13/2019</a:t>
             </a:fld>
             <a:endParaRPr lang="en-US"/>
           </a:p>
@@ -593,7 +593,7 @@
           <a:p>
             <a:fld id="{DFA429E4-E4A0-4FCB-B57B-5790209CB571}" type="datetimeFigureOut">
               <a:rPr lang="en-US" smtClean="0"/>
-              <a:t>8/10/2019</a:t>
+              <a:t>8/13/2019</a:t>
             </a:fld>
             <a:endParaRPr lang="en-US"/>
           </a:p>
@@ -763,7 +763,7 @@
           <a:p>
             <a:fld id="{DFA429E4-E4A0-4FCB-B57B-5790209CB571}" type="datetimeFigureOut">
               <a:rPr lang="en-US" smtClean="0"/>
-              <a:t>8/10/2019</a:t>
+              <a:t>8/13/2019</a:t>
             </a:fld>
             <a:endParaRPr lang="en-US"/>
           </a:p>
@@ -1007,7 +1007,7 @@
           <a:p>
             <a:fld id="{DFA429E4-E4A0-4FCB-B57B-5790209CB571}" type="datetimeFigureOut">
               <a:rPr lang="en-US" smtClean="0"/>
-              <a:t>8/10/2019</a:t>
+              <a:t>8/13/2019</a:t>
             </a:fld>
             <a:endParaRPr lang="en-US"/>
           </a:p>
@@ -1239,7 +1239,7 @@
           <a:p>
             <a:fld id="{DFA429E4-E4A0-4FCB-B57B-5790209CB571}" type="datetimeFigureOut">
               <a:rPr lang="en-US" smtClean="0"/>
-              <a:t>8/10/2019</a:t>
+              <a:t>8/13/2019</a:t>
             </a:fld>
             <a:endParaRPr lang="en-US"/>
           </a:p>
@@ -1606,7 +1606,7 @@
           <a:p>
             <a:fld id="{DFA429E4-E4A0-4FCB-B57B-5790209CB571}" type="datetimeFigureOut">
               <a:rPr lang="en-US" smtClean="0"/>
-              <a:t>8/10/2019</a:t>
+              <a:t>8/13/2019</a:t>
             </a:fld>
             <a:endParaRPr lang="en-US"/>
           </a:p>
@@ -1724,7 +1724,7 @@
           <a:p>
             <a:fld id="{DFA429E4-E4A0-4FCB-B57B-5790209CB571}" type="datetimeFigureOut">
               <a:rPr lang="en-US" smtClean="0"/>
-              <a:t>8/10/2019</a:t>
+              <a:t>8/13/2019</a:t>
             </a:fld>
             <a:endParaRPr lang="en-US"/>
           </a:p>
@@ -1819,7 +1819,7 @@
           <a:p>
             <a:fld id="{DFA429E4-E4A0-4FCB-B57B-5790209CB571}" type="datetimeFigureOut">
               <a:rPr lang="en-US" smtClean="0"/>
-              <a:t>8/10/2019</a:t>
+              <a:t>8/13/2019</a:t>
             </a:fld>
             <a:endParaRPr lang="en-US"/>
           </a:p>
@@ -2096,7 +2096,7 @@
           <a:p>
             <a:fld id="{DFA429E4-E4A0-4FCB-B57B-5790209CB571}" type="datetimeFigureOut">
               <a:rPr lang="en-US" smtClean="0"/>
-              <a:t>8/10/2019</a:t>
+              <a:t>8/13/2019</a:t>
             </a:fld>
             <a:endParaRPr lang="en-US"/>
           </a:p>
@@ -2353,7 +2353,7 @@
           <a:p>
             <a:fld id="{DFA429E4-E4A0-4FCB-B57B-5790209CB571}" type="datetimeFigureOut">
               <a:rPr lang="en-US" smtClean="0"/>
-              <a:t>8/10/2019</a:t>
+              <a:t>8/13/2019</a:t>
             </a:fld>
             <a:endParaRPr lang="en-US"/>
           </a:p>
@@ -2566,7 +2566,7 @@
           <a:p>
             <a:fld id="{DFA429E4-E4A0-4FCB-B57B-5790209CB571}" type="datetimeFigureOut">
               <a:rPr lang="en-US" smtClean="0"/>
-              <a:t>8/10/2019</a:t>
+              <a:t>8/13/2019</a:t>
             </a:fld>
             <a:endParaRPr lang="en-US"/>
           </a:p>
@@ -2987,8 +2987,8 @@
         </p:nvSpPr>
         <p:spPr bwMode="auto">
           <a:xfrm>
-            <a:off x="2914649" y="2743835"/>
-            <a:ext cx="3516731" cy="4327037"/>
+            <a:off x="1691640" y="2743835"/>
+            <a:ext cx="4133593" cy="4857116"/>
           </a:xfrm>
           <a:prstGeom prst="rect">
             <a:avLst/>
@@ -3022,7 +3022,10 @@
               </a:spcAft>
             </a:pPr>
             <a:r>
-              <a:rPr lang="en-US" altLang="en-US" sz="1100" dirty="0">
+              <a:rPr lang="en-US" altLang="en-US" sz="1100" i="1" dirty="0">
+                <a:highlight>
+                  <a:srgbClr val="00FF00"/>
+                </a:highlight>
                 <a:latin typeface="Calibri" panose="020F0502020204030204" pitchFamily="34" charset="0"/>
                 <a:ea typeface="Calibri" panose="020F0502020204030204" pitchFamily="34" charset="0"/>
                 <a:cs typeface="Times New Roman" panose="02020603050405020304" pitchFamily="18" charset="0"/>
@@ -3041,23 +3044,29 @@
             </a:pPr>
             <a:r>
               <a:rPr lang="en-US" altLang="en-US" sz="1100" dirty="0">
-                <a:latin typeface="Calibri" panose="020F0502020204030204" pitchFamily="34" charset="0"/>
-                <a:cs typeface="Times New Roman" panose="02020603050405020304" pitchFamily="18" charset="0"/>
-              </a:rPr>
-              <a:t>---------------------------------------------</a:t>
-            </a:r>
-          </a:p>
-          <a:p>
-            <a:pPr defTabSz="914400" eaLnBrk="0" fontAlgn="base" hangingPunct="0">
-              <a:spcBef>
-                <a:spcPct val="0"/>
-              </a:spcBef>
-              <a:spcAft>
-                <a:spcPct val="0"/>
-              </a:spcAft>
-            </a:pPr>
-            <a:r>
-              <a:rPr lang="en-US" altLang="en-US" sz="1100" dirty="0">
+                <a:highlight>
+                  <a:srgbClr val="00FF00"/>
+                </a:highlight>
+                <a:latin typeface="Calibri" panose="020F0502020204030204" pitchFamily="34" charset="0"/>
+                <a:cs typeface="Times New Roman" panose="02020603050405020304" pitchFamily="18" charset="0"/>
+              </a:rPr>
+              <a:t>--------------------------------------------------------------------------------------------</a:t>
+            </a:r>
+          </a:p>
+          <a:p>
+            <a:pPr defTabSz="914400" eaLnBrk="0" fontAlgn="base" hangingPunct="0">
+              <a:spcBef>
+                <a:spcPct val="0"/>
+              </a:spcBef>
+              <a:spcAft>
+                <a:spcPct val="0"/>
+              </a:spcAft>
+            </a:pPr>
+            <a:r>
+              <a:rPr lang="en-US" altLang="en-US" sz="1100" dirty="0">
+                <a:highlight>
+                  <a:srgbClr val="00FF00"/>
+                </a:highlight>
                 <a:latin typeface="Calibri" panose="020F0502020204030204" pitchFamily="34" charset="0"/>
                 <a:cs typeface="Times New Roman" panose="02020603050405020304" pitchFamily="18" charset="0"/>
               </a:rPr>
@@ -3065,6 +3074,29 @@
             </a:r>
             <a:r>
               <a:rPr lang="en-US" altLang="en-US" sz="1100" dirty="0" err="1">
+                <a:highlight>
+                  <a:srgbClr val="00FF00"/>
+                </a:highlight>
+                <a:latin typeface="Calibri" panose="020F0502020204030204" pitchFamily="34" charset="0"/>
+                <a:cs typeface="Times New Roman" panose="02020603050405020304" pitchFamily="18" charset="0"/>
+              </a:rPr>
+              <a:t>TagEnum</a:t>
+            </a:r>
+            <a:r>
+              <a:rPr lang="en-US" altLang="en-US" sz="1100" dirty="0">
+                <a:highlight>
+                  <a:srgbClr val="00FF00"/>
+                </a:highlight>
+                <a:latin typeface="Calibri" panose="020F0502020204030204" pitchFamily="34" charset="0"/>
+                <a:cs typeface="Times New Roman" panose="02020603050405020304" pitchFamily="18" charset="0"/>
+              </a:rPr>
+              <a:t> : </a:t>
+            </a:r>
+            <a:r>
+              <a:rPr lang="en-US" altLang="en-US" sz="1100" dirty="0" err="1">
+                <a:highlight>
+                  <a:srgbClr val="00FF00"/>
+                </a:highlight>
                 <a:latin typeface="Calibri" panose="020F0502020204030204" pitchFamily="34" charset="0"/>
                 <a:cs typeface="Times New Roman" panose="02020603050405020304" pitchFamily="18" charset="0"/>
               </a:rPr>
@@ -3072,229 +3104,182 @@
             </a:r>
             <a:r>
               <a:rPr lang="en-US" altLang="en-US" sz="1100" dirty="0">
+                <a:highlight>
+                  <a:srgbClr val="00FF00"/>
+                </a:highlight>
                 <a:latin typeface="Calibri" panose="020F0502020204030204" pitchFamily="34" charset="0"/>
                 <a:cs typeface="Times New Roman" panose="02020603050405020304" pitchFamily="18" charset="0"/>
               </a:rPr>
               <a:t> </a:t>
             </a:r>
+          </a:p>
+          <a:p>
+            <a:pPr defTabSz="914400" eaLnBrk="0" fontAlgn="base" hangingPunct="0">
+              <a:spcBef>
+                <a:spcPct val="0"/>
+              </a:spcBef>
+              <a:spcAft>
+                <a:spcPct val="0"/>
+              </a:spcAft>
+            </a:pPr>
+            <a:r>
+              <a:rPr lang="en-US" altLang="en-US" sz="1100" dirty="0">
+                <a:highlight>
+                  <a:srgbClr val="00FF00"/>
+                </a:highlight>
+                <a:latin typeface="Calibri" panose="020F0502020204030204" pitchFamily="34" charset="0"/>
+                <a:cs typeface="Times New Roman" panose="02020603050405020304" pitchFamily="18" charset="0"/>
+              </a:rPr>
+              <a:t>+ tags : List&lt;</a:t>
+            </a:r>
             <a:r>
               <a:rPr lang="en-US" altLang="en-US" sz="1100" dirty="0" err="1">
+                <a:highlight>
+                  <a:srgbClr val="00FF00"/>
+                </a:highlight>
                 <a:latin typeface="Calibri" panose="020F0502020204030204" pitchFamily="34" charset="0"/>
                 <a:cs typeface="Times New Roman" panose="02020603050405020304" pitchFamily="18" charset="0"/>
               </a:rPr>
               <a:t>TagEnum</a:t>
             </a:r>
+            <a:r>
+              <a:rPr lang="en-US" altLang="en-US" sz="1100" dirty="0">
+                <a:highlight>
+                  <a:srgbClr val="00FF00"/>
+                </a:highlight>
+                <a:latin typeface="Calibri" panose="020F0502020204030204" pitchFamily="34" charset="0"/>
+                <a:cs typeface="Times New Roman" panose="02020603050405020304" pitchFamily="18" charset="0"/>
+              </a:rPr>
+              <a:t>&gt;</a:t>
+            </a:r>
+          </a:p>
+          <a:p>
+            <a:pPr defTabSz="914400" eaLnBrk="0" fontAlgn="base" hangingPunct="0">
+              <a:spcBef>
+                <a:spcPct val="0"/>
+              </a:spcBef>
+              <a:spcAft>
+                <a:spcPct val="0"/>
+              </a:spcAft>
+            </a:pPr>
+            <a:r>
+              <a:rPr lang="en-US" altLang="en-US" sz="1100" dirty="0">
+                <a:highlight>
+                  <a:srgbClr val="00FF00"/>
+                </a:highlight>
+                <a:latin typeface="Calibri" panose="020F0502020204030204" pitchFamily="34" charset="0"/>
+                <a:cs typeface="Times New Roman" panose="02020603050405020304" pitchFamily="18" charset="0"/>
+              </a:rPr>
+              <a:t>+ </a:t>
+            </a:r>
+            <a:r>
+              <a:rPr lang="en-US" altLang="en-US" sz="1100" dirty="0" err="1">
+                <a:highlight>
+                  <a:srgbClr val="00FF00"/>
+                </a:highlight>
+                <a:latin typeface="Calibri" panose="020F0502020204030204" pitchFamily="34" charset="0"/>
+                <a:cs typeface="Times New Roman" panose="02020603050405020304" pitchFamily="18" charset="0"/>
+              </a:rPr>
+              <a:t>UniqueID</a:t>
+            </a:r>
+            <a:r>
+              <a:rPr lang="en-US" altLang="en-US" sz="1100" dirty="0">
+                <a:highlight>
+                  <a:srgbClr val="00FF00"/>
+                </a:highlight>
+                <a:latin typeface="Calibri" panose="020F0502020204030204" pitchFamily="34" charset="0"/>
+                <a:cs typeface="Times New Roman" panose="02020603050405020304" pitchFamily="18" charset="0"/>
+              </a:rPr>
+              <a:t> : string </a:t>
+            </a:r>
+            <a:endParaRPr lang="en-US" altLang="en-US" sz="800" dirty="0">
+              <a:highlight>
+                <a:srgbClr val="00FF00"/>
+              </a:highlight>
+            </a:endParaRPr>
+          </a:p>
+          <a:p>
+            <a:pPr defTabSz="914400" eaLnBrk="0" fontAlgn="base" hangingPunct="0">
+              <a:spcBef>
+                <a:spcPct val="0"/>
+              </a:spcBef>
+              <a:spcAft>
+                <a:spcPct val="0"/>
+              </a:spcAft>
+            </a:pPr>
+            <a:r>
+              <a:rPr lang="en-US" altLang="en-US" sz="1100" dirty="0">
+                <a:highlight>
+                  <a:srgbClr val="00FF00"/>
+                </a:highlight>
+                <a:latin typeface="Calibri" panose="020F0502020204030204" pitchFamily="34" charset="0"/>
+                <a:ea typeface="Calibri" panose="020F0502020204030204" pitchFamily="34" charset="0"/>
+                <a:cs typeface="Times New Roman" panose="02020603050405020304" pitchFamily="18" charset="0"/>
+              </a:rPr>
+              <a:t>+ </a:t>
+            </a:r>
+            <a:r>
+              <a:rPr lang="en-US" altLang="en-US" sz="1100" dirty="0" err="1">
+                <a:highlight>
+                  <a:srgbClr val="00FF00"/>
+                </a:highlight>
+                <a:latin typeface="Calibri" panose="020F0502020204030204" pitchFamily="34" charset="0"/>
+                <a:ea typeface="Calibri" panose="020F0502020204030204" pitchFamily="34" charset="0"/>
+                <a:cs typeface="Times New Roman" panose="02020603050405020304" pitchFamily="18" charset="0"/>
+              </a:rPr>
+              <a:t>objectName</a:t>
+            </a:r>
+            <a:r>
+              <a:rPr lang="en-US" altLang="en-US" sz="1100" dirty="0">
+                <a:highlight>
+                  <a:srgbClr val="00FF00"/>
+                </a:highlight>
+                <a:latin typeface="Calibri" panose="020F0502020204030204" pitchFamily="34" charset="0"/>
+                <a:ea typeface="Calibri" panose="020F0502020204030204" pitchFamily="34" charset="0"/>
+                <a:cs typeface="Times New Roman" panose="02020603050405020304" pitchFamily="18" charset="0"/>
+              </a:rPr>
+              <a:t> : string </a:t>
+            </a:r>
+            <a:endParaRPr lang="en-US" altLang="en-US" sz="800" dirty="0">
+              <a:highlight>
+                <a:srgbClr val="00FF00"/>
+              </a:highlight>
+            </a:endParaRPr>
+          </a:p>
+          <a:p>
+            <a:pPr defTabSz="914400" eaLnBrk="0" fontAlgn="base" hangingPunct="0">
+              <a:spcBef>
+                <a:spcPct val="0"/>
+              </a:spcBef>
+              <a:spcAft>
+                <a:spcPct val="0"/>
+              </a:spcAft>
+            </a:pPr>
+            <a:r>
+              <a:rPr lang="en-US" altLang="en-US" sz="1100" dirty="0">
+                <a:highlight>
+                  <a:srgbClr val="00FF00"/>
+                </a:highlight>
+                <a:latin typeface="Calibri" panose="020F0502020204030204" pitchFamily="34" charset="0"/>
+                <a:ea typeface="Calibri" panose="020F0502020204030204" pitchFamily="34" charset="0"/>
+                <a:cs typeface="Times New Roman" panose="02020603050405020304" pitchFamily="18" charset="0"/>
+              </a:rPr>
+              <a:t>+ description</a:t>
+            </a:r>
+            <a:r>
+              <a:rPr lang="en-US" altLang="en-US" sz="1100" dirty="0">
+                <a:highlight>
+                  <a:srgbClr val="00FF00"/>
+                </a:highlight>
+                <a:latin typeface="Calibri" panose="020F0502020204030204" pitchFamily="34" charset="0"/>
+                <a:cs typeface="Times New Roman" panose="02020603050405020304" pitchFamily="18" charset="0"/>
+              </a:rPr>
+              <a:t> : string </a:t>
+            </a:r>
             <a:endParaRPr lang="en-US" altLang="en-US" sz="1100" dirty="0">
-              <a:latin typeface="Calibri" panose="020F0502020204030204" pitchFamily="34" charset="0"/>
-              <a:cs typeface="Times New Roman" panose="02020603050405020304" pitchFamily="18" charset="0"/>
-            </a:endParaRPr>
-          </a:p>
-          <a:p>
-            <a:pPr defTabSz="914400" eaLnBrk="0" fontAlgn="base" hangingPunct="0">
-              <a:spcBef>
-                <a:spcPct val="0"/>
-              </a:spcBef>
-              <a:spcAft>
-                <a:spcPct val="0"/>
-              </a:spcAft>
-            </a:pPr>
-            <a:r>
-              <a:rPr lang="en-US" altLang="en-US" sz="1100" dirty="0">
-                <a:latin typeface="Calibri" panose="020F0502020204030204" pitchFamily="34" charset="0"/>
-                <a:cs typeface="Times New Roman" panose="02020603050405020304" pitchFamily="18" charset="0"/>
-              </a:rPr>
-              <a:t>+ List&lt;</a:t>
-            </a:r>
-            <a:r>
-              <a:rPr lang="en-US" altLang="en-US" sz="1100" dirty="0" err="1">
-                <a:latin typeface="Calibri" panose="020F0502020204030204" pitchFamily="34" charset="0"/>
-                <a:cs typeface="Times New Roman" panose="02020603050405020304" pitchFamily="18" charset="0"/>
-              </a:rPr>
-              <a:t>TagEnum</a:t>
-            </a:r>
-            <a:r>
-              <a:rPr lang="en-US" altLang="en-US" sz="1100" dirty="0">
-                <a:latin typeface="Calibri" panose="020F0502020204030204" pitchFamily="34" charset="0"/>
-                <a:cs typeface="Times New Roman" panose="02020603050405020304" pitchFamily="18" charset="0"/>
-              </a:rPr>
-              <a:t>&gt; tags</a:t>
-            </a:r>
-          </a:p>
-          <a:p>
-            <a:pPr defTabSz="914400" eaLnBrk="0" fontAlgn="base" hangingPunct="0">
-              <a:spcBef>
-                <a:spcPct val="0"/>
-              </a:spcBef>
-              <a:spcAft>
-                <a:spcPct val="0"/>
-              </a:spcAft>
-            </a:pPr>
-            <a:r>
-              <a:rPr lang="en-US" altLang="en-US" sz="1100" dirty="0">
-                <a:latin typeface="Calibri" panose="020F0502020204030204" pitchFamily="34" charset="0"/>
-                <a:cs typeface="Times New Roman" panose="02020603050405020304" pitchFamily="18" charset="0"/>
-              </a:rPr>
-              <a:t>+ string </a:t>
-            </a:r>
-            <a:r>
-              <a:rPr lang="en-US" altLang="en-US" sz="1100" dirty="0" err="1">
-                <a:latin typeface="Calibri" panose="020F0502020204030204" pitchFamily="34" charset="0"/>
-                <a:cs typeface="Times New Roman" panose="02020603050405020304" pitchFamily="18" charset="0"/>
-              </a:rPr>
-              <a:t>UniqueID</a:t>
-            </a:r>
-            <a:endParaRPr lang="en-US" altLang="en-US" sz="800" dirty="0"/>
-          </a:p>
-          <a:p>
-            <a:pPr defTabSz="914400" eaLnBrk="0" fontAlgn="base" hangingPunct="0">
-              <a:spcBef>
-                <a:spcPct val="0"/>
-              </a:spcBef>
-              <a:spcAft>
-                <a:spcPct val="0"/>
-              </a:spcAft>
-            </a:pPr>
-            <a:r>
-              <a:rPr lang="en-US" altLang="en-US" sz="1100" dirty="0">
-                <a:latin typeface="Calibri" panose="020F0502020204030204" pitchFamily="34" charset="0"/>
-                <a:ea typeface="Calibri" panose="020F0502020204030204" pitchFamily="34" charset="0"/>
-                <a:cs typeface="Times New Roman" panose="02020603050405020304" pitchFamily="18" charset="0"/>
-              </a:rPr>
-              <a:t>+ string </a:t>
-            </a:r>
-            <a:r>
-              <a:rPr lang="en-US" altLang="en-US" sz="1100" dirty="0" err="1">
-                <a:latin typeface="Calibri" panose="020F0502020204030204" pitchFamily="34" charset="0"/>
-                <a:ea typeface="Calibri" panose="020F0502020204030204" pitchFamily="34" charset="0"/>
-                <a:cs typeface="Times New Roman" panose="02020603050405020304" pitchFamily="18" charset="0"/>
-              </a:rPr>
-              <a:t>objectName</a:t>
-            </a:r>
-            <a:endParaRPr lang="en-US" altLang="en-US" sz="800" dirty="0"/>
-          </a:p>
-          <a:p>
-            <a:pPr defTabSz="914400" eaLnBrk="0" fontAlgn="base" hangingPunct="0">
-              <a:spcBef>
-                <a:spcPct val="0"/>
-              </a:spcBef>
-              <a:spcAft>
-                <a:spcPct val="0"/>
-              </a:spcAft>
-            </a:pPr>
-            <a:r>
-              <a:rPr lang="en-US" altLang="en-US" sz="1100" dirty="0">
-                <a:latin typeface="Calibri" panose="020F0502020204030204" pitchFamily="34" charset="0"/>
-                <a:ea typeface="Calibri" panose="020F0502020204030204" pitchFamily="34" charset="0"/>
-                <a:cs typeface="Times New Roman" panose="02020603050405020304" pitchFamily="18" charset="0"/>
-              </a:rPr>
-              <a:t>+ string description</a:t>
-            </a:r>
-          </a:p>
-          <a:p>
-            <a:pPr defTabSz="914400" eaLnBrk="0" fontAlgn="base" hangingPunct="0">
-              <a:spcBef>
-                <a:spcPct val="0"/>
-              </a:spcBef>
-              <a:spcAft>
-                <a:spcPct val="0"/>
-              </a:spcAft>
-            </a:pPr>
-            <a:r>
-              <a:rPr lang="en-US" altLang="en-US" sz="1100" dirty="0">
-                <a:latin typeface="Calibri" panose="020F0502020204030204" pitchFamily="34" charset="0"/>
-                <a:cs typeface="Times New Roman" panose="02020603050405020304" pitchFamily="18" charset="0"/>
-              </a:rPr>
-              <a:t>+ Inventory </a:t>
-            </a:r>
-            <a:r>
-              <a:rPr lang="en-US" altLang="en-US" sz="1100" dirty="0" err="1">
-                <a:latin typeface="Calibri" panose="020F0502020204030204" pitchFamily="34" charset="0"/>
-                <a:cs typeface="Times New Roman" panose="02020603050405020304" pitchFamily="18" charset="0"/>
-              </a:rPr>
-              <a:t>myInventory</a:t>
-            </a:r>
-            <a:endParaRPr lang="en-US" altLang="en-US" sz="800" dirty="0"/>
-          </a:p>
-          <a:p>
-            <a:pPr defTabSz="914400" eaLnBrk="0" fontAlgn="base" hangingPunct="0">
-              <a:spcBef>
-                <a:spcPct val="0"/>
-              </a:spcBef>
-              <a:spcAft>
-                <a:spcPct val="0"/>
-              </a:spcAft>
-            </a:pPr>
-            <a:r>
-              <a:rPr lang="en-US" altLang="en-US" sz="1100" dirty="0">
-                <a:latin typeface="Calibri" panose="020F0502020204030204" pitchFamily="34" charset="0"/>
-                <a:ea typeface="Calibri" panose="020F0502020204030204" pitchFamily="34" charset="0"/>
-                <a:cs typeface="Times New Roman" panose="02020603050405020304" pitchFamily="18" charset="0"/>
-              </a:rPr>
-              <a:t>+ int </a:t>
-            </a:r>
-            <a:r>
-              <a:rPr lang="en-US" altLang="en-US" sz="1100" dirty="0" err="1">
-                <a:latin typeface="Calibri" panose="020F0502020204030204" pitchFamily="34" charset="0"/>
-                <a:ea typeface="Calibri" panose="020F0502020204030204" pitchFamily="34" charset="0"/>
-                <a:cs typeface="Times New Roman" panose="02020603050405020304" pitchFamily="18" charset="0"/>
-              </a:rPr>
-              <a:t>stackSize</a:t>
-            </a:r>
-            <a:endParaRPr lang="en-US" altLang="en-US" sz="800" dirty="0"/>
-          </a:p>
-          <a:p>
-            <a:pPr defTabSz="914400" eaLnBrk="0" fontAlgn="base" hangingPunct="0">
-              <a:spcBef>
-                <a:spcPct val="0"/>
-              </a:spcBef>
-              <a:spcAft>
-                <a:spcPct val="0"/>
-              </a:spcAft>
-            </a:pPr>
-            <a:r>
-              <a:rPr lang="en-US" altLang="en-US" sz="1100" dirty="0">
-                <a:latin typeface="Calibri" panose="020F0502020204030204" pitchFamily="34" charset="0"/>
-                <a:ea typeface="Calibri" panose="020F0502020204030204" pitchFamily="34" charset="0"/>
-                <a:cs typeface="Times New Roman" panose="02020603050405020304" pitchFamily="18" charset="0"/>
-              </a:rPr>
-              <a:t>+ int </a:t>
-            </a:r>
-            <a:r>
-              <a:rPr lang="en-US" altLang="en-US" sz="1100" dirty="0" err="1">
-                <a:latin typeface="Calibri" panose="020F0502020204030204" pitchFamily="34" charset="0"/>
-                <a:ea typeface="Calibri" panose="020F0502020204030204" pitchFamily="34" charset="0"/>
-                <a:cs typeface="Times New Roman" panose="02020603050405020304" pitchFamily="18" charset="0"/>
-              </a:rPr>
-              <a:t>maxStackSize</a:t>
-            </a:r>
-            <a:endParaRPr lang="en-US" altLang="en-US" sz="800" dirty="0"/>
-          </a:p>
-          <a:p>
-            <a:pPr defTabSz="914400" eaLnBrk="0" fontAlgn="base" hangingPunct="0">
-              <a:spcBef>
-                <a:spcPct val="0"/>
-              </a:spcBef>
-              <a:spcAft>
-                <a:spcPct val="0"/>
-              </a:spcAft>
-            </a:pPr>
-            <a:r>
-              <a:rPr lang="en-US" altLang="en-US" sz="1100" dirty="0">
-                <a:latin typeface="Calibri" panose="020F0502020204030204" pitchFamily="34" charset="0"/>
-                <a:ea typeface="Calibri" panose="020F0502020204030204" pitchFamily="34" charset="0"/>
-                <a:cs typeface="Times New Roman" panose="02020603050405020304" pitchFamily="18" charset="0"/>
-              </a:rPr>
-              <a:t>+ int </a:t>
-            </a:r>
-            <a:r>
-              <a:rPr lang="en-US" altLang="en-US" sz="1100" dirty="0" err="1">
-                <a:latin typeface="Calibri" panose="020F0502020204030204" pitchFamily="34" charset="0"/>
-                <a:ea typeface="Calibri" panose="020F0502020204030204" pitchFamily="34" charset="0"/>
-                <a:cs typeface="Times New Roman" panose="02020603050405020304" pitchFamily="18" charset="0"/>
-              </a:rPr>
-              <a:t>goldValue</a:t>
-            </a:r>
-            <a:endParaRPr lang="en-US" altLang="en-US" sz="1100" dirty="0">
+              <a:highlight>
+                <a:srgbClr val="00FF00"/>
+              </a:highlight>
               <a:latin typeface="Calibri" panose="020F0502020204030204" pitchFamily="34" charset="0"/>
               <a:ea typeface="Calibri" panose="020F0502020204030204" pitchFamily="34" charset="0"/>
               <a:cs typeface="Times New Roman" panose="02020603050405020304" pitchFamily="18" charset="0"/>
@@ -3311,57 +3296,415 @@
             </a:pPr>
             <a:r>
               <a:rPr lang="en-US" altLang="en-US" sz="1100" dirty="0">
+                <a:highlight>
+                  <a:srgbClr val="00FF00"/>
+                </a:highlight>
+                <a:latin typeface="Calibri" panose="020F0502020204030204" pitchFamily="34" charset="0"/>
+                <a:cs typeface="Times New Roman" panose="02020603050405020304" pitchFamily="18" charset="0"/>
+              </a:rPr>
+              <a:t>+ </a:t>
+            </a:r>
+            <a:r>
+              <a:rPr lang="en-US" altLang="en-US" sz="1100" dirty="0" err="1">
+                <a:highlight>
+                  <a:srgbClr val="00FF00"/>
+                </a:highlight>
+                <a:latin typeface="Calibri" panose="020F0502020204030204" pitchFamily="34" charset="0"/>
+                <a:cs typeface="Times New Roman" panose="02020603050405020304" pitchFamily="18" charset="0"/>
+              </a:rPr>
+              <a:t>myInventory</a:t>
+            </a:r>
+            <a:r>
+              <a:rPr lang="en-US" altLang="en-US" sz="1100" dirty="0">
+                <a:highlight>
+                  <a:srgbClr val="00FF00"/>
+                </a:highlight>
+                <a:latin typeface="Calibri" panose="020F0502020204030204" pitchFamily="34" charset="0"/>
+                <a:cs typeface="Times New Roman" panose="02020603050405020304" pitchFamily="18" charset="0"/>
+              </a:rPr>
+              <a:t> : Inventory</a:t>
+            </a:r>
+            <a:endParaRPr lang="en-US" altLang="en-US" sz="800" dirty="0">
+              <a:highlight>
+                <a:srgbClr val="00FF00"/>
+              </a:highlight>
+            </a:endParaRPr>
+          </a:p>
+          <a:p>
+            <a:pPr defTabSz="914400" eaLnBrk="0" fontAlgn="base" hangingPunct="0">
+              <a:spcBef>
+                <a:spcPct val="0"/>
+              </a:spcBef>
+              <a:spcAft>
+                <a:spcPct val="0"/>
+              </a:spcAft>
+            </a:pPr>
+            <a:r>
+              <a:rPr lang="en-US" altLang="en-US" sz="1100" dirty="0">
+                <a:highlight>
+                  <a:srgbClr val="00FF00"/>
+                </a:highlight>
                 <a:latin typeface="Calibri" panose="020F0502020204030204" pitchFamily="34" charset="0"/>
                 <a:ea typeface="Calibri" panose="020F0502020204030204" pitchFamily="34" charset="0"/>
                 <a:cs typeface="Times New Roman" panose="02020603050405020304" pitchFamily="18" charset="0"/>
               </a:rPr>
-              <a:t>+ int weight</a:t>
-            </a:r>
-          </a:p>
-          <a:p>
-            <a:pPr defTabSz="914400" eaLnBrk="0" fontAlgn="base" hangingPunct="0">
-              <a:spcBef>
-                <a:spcPct val="0"/>
-              </a:spcBef>
-              <a:spcAft>
-                <a:spcPct val="0"/>
-              </a:spcAft>
-            </a:pPr>
-            <a:r>
-              <a:rPr lang="en-US" altLang="en-US" sz="1100" dirty="0">
+              <a:t>+ </a:t>
+            </a:r>
+            <a:r>
+              <a:rPr lang="en-US" altLang="en-US" sz="1100" dirty="0" err="1">
+                <a:highlight>
+                  <a:srgbClr val="00FF00"/>
+                </a:highlight>
                 <a:latin typeface="Calibri" panose="020F0502020204030204" pitchFamily="34" charset="0"/>
                 <a:ea typeface="Calibri" panose="020F0502020204030204" pitchFamily="34" charset="0"/>
                 <a:cs typeface="Times New Roman" panose="02020603050405020304" pitchFamily="18" charset="0"/>
               </a:rPr>
-              <a:t>+ bool flammable</a:t>
-            </a:r>
-          </a:p>
-          <a:p>
-            <a:pPr defTabSz="914400" eaLnBrk="0" fontAlgn="base" hangingPunct="0">
-              <a:spcBef>
-                <a:spcPct val="0"/>
-              </a:spcBef>
-              <a:spcAft>
-                <a:spcPct val="0"/>
-              </a:spcAft>
-            </a:pPr>
-            <a:r>
-              <a:rPr lang="en-US" altLang="en-US" sz="1100" dirty="0">
+              <a:t>stackSize</a:t>
+            </a:r>
+            <a:r>
+              <a:rPr lang="en-US" altLang="en-US" sz="1100" dirty="0">
+                <a:highlight>
+                  <a:srgbClr val="00FF00"/>
+                </a:highlight>
                 <a:latin typeface="Calibri" panose="020F0502020204030204" pitchFamily="34" charset="0"/>
                 <a:ea typeface="Calibri" panose="020F0502020204030204" pitchFamily="34" charset="0"/>
                 <a:cs typeface="Times New Roman" panose="02020603050405020304" pitchFamily="18" charset="0"/>
               </a:rPr>
-              <a:t>- int </a:t>
+              <a:t> : int</a:t>
+            </a:r>
+            <a:endParaRPr lang="en-US" altLang="en-US" sz="800" dirty="0">
+              <a:highlight>
+                <a:srgbClr val="00FF00"/>
+              </a:highlight>
+            </a:endParaRPr>
+          </a:p>
+          <a:p>
+            <a:pPr defTabSz="914400" eaLnBrk="0" fontAlgn="base" hangingPunct="0">
+              <a:spcBef>
+                <a:spcPct val="0"/>
+              </a:spcBef>
+              <a:spcAft>
+                <a:spcPct val="0"/>
+              </a:spcAft>
+            </a:pPr>
+            <a:r>
+              <a:rPr lang="en-US" altLang="en-US" sz="1100" dirty="0">
+                <a:highlight>
+                  <a:srgbClr val="00FF00"/>
+                </a:highlight>
+                <a:latin typeface="Calibri" panose="020F0502020204030204" pitchFamily="34" charset="0"/>
+                <a:ea typeface="Calibri" panose="020F0502020204030204" pitchFamily="34" charset="0"/>
+                <a:cs typeface="Times New Roman" panose="02020603050405020304" pitchFamily="18" charset="0"/>
+              </a:rPr>
+              <a:t>+ </a:t>
+            </a:r>
+            <a:r>
+              <a:rPr lang="en-US" altLang="en-US" sz="1100" dirty="0" err="1">
+                <a:highlight>
+                  <a:srgbClr val="00FF00"/>
+                </a:highlight>
+                <a:latin typeface="Calibri" panose="020F0502020204030204" pitchFamily="34" charset="0"/>
+                <a:ea typeface="Calibri" panose="020F0502020204030204" pitchFamily="34" charset="0"/>
+                <a:cs typeface="Times New Roman" panose="02020603050405020304" pitchFamily="18" charset="0"/>
+              </a:rPr>
+              <a:t>maxStackSize</a:t>
+            </a:r>
+            <a:r>
+              <a:rPr lang="en-US" altLang="en-US" sz="1100" dirty="0">
+                <a:highlight>
+                  <a:srgbClr val="00FF00"/>
+                </a:highlight>
+                <a:latin typeface="Calibri" panose="020F0502020204030204" pitchFamily="34" charset="0"/>
+                <a:ea typeface="Calibri" panose="020F0502020204030204" pitchFamily="34" charset="0"/>
+                <a:cs typeface="Times New Roman" panose="02020603050405020304" pitchFamily="18" charset="0"/>
+              </a:rPr>
+              <a:t> : int</a:t>
+            </a:r>
+            <a:endParaRPr lang="en-US" altLang="en-US" sz="800" dirty="0">
+              <a:highlight>
+                <a:srgbClr val="00FF00"/>
+              </a:highlight>
+            </a:endParaRPr>
+          </a:p>
+          <a:p>
+            <a:pPr defTabSz="914400" eaLnBrk="0" fontAlgn="base" hangingPunct="0">
+              <a:spcBef>
+                <a:spcPct val="0"/>
+              </a:spcBef>
+              <a:spcAft>
+                <a:spcPct val="0"/>
+              </a:spcAft>
+            </a:pPr>
+            <a:r>
+              <a:rPr lang="en-US" altLang="en-US" sz="1100" dirty="0">
+                <a:highlight>
+                  <a:srgbClr val="00FF00"/>
+                </a:highlight>
+                <a:latin typeface="Calibri" panose="020F0502020204030204" pitchFamily="34" charset="0"/>
+                <a:ea typeface="Calibri" panose="020F0502020204030204" pitchFamily="34" charset="0"/>
+                <a:cs typeface="Times New Roman" panose="02020603050405020304" pitchFamily="18" charset="0"/>
+              </a:rPr>
+              <a:t>+ </a:t>
+            </a:r>
+            <a:r>
+              <a:rPr lang="en-US" altLang="en-US" sz="1100" dirty="0" err="1">
+                <a:highlight>
+                  <a:srgbClr val="00FF00"/>
+                </a:highlight>
+                <a:latin typeface="Calibri" panose="020F0502020204030204" pitchFamily="34" charset="0"/>
+                <a:ea typeface="Calibri" panose="020F0502020204030204" pitchFamily="34" charset="0"/>
+                <a:cs typeface="Times New Roman" panose="02020603050405020304" pitchFamily="18" charset="0"/>
+              </a:rPr>
+              <a:t>goldValue</a:t>
+            </a:r>
+            <a:r>
+              <a:rPr lang="en-US" altLang="en-US" sz="1100" dirty="0">
+                <a:highlight>
+                  <a:srgbClr val="00FF00"/>
+                </a:highlight>
+                <a:latin typeface="Calibri" panose="020F0502020204030204" pitchFamily="34" charset="0"/>
+                <a:ea typeface="Calibri" panose="020F0502020204030204" pitchFamily="34" charset="0"/>
+                <a:cs typeface="Times New Roman" panose="02020603050405020304" pitchFamily="18" charset="0"/>
+              </a:rPr>
+              <a:t> : int</a:t>
+            </a:r>
+          </a:p>
+          <a:p>
+            <a:pPr defTabSz="914400" eaLnBrk="0" fontAlgn="base" hangingPunct="0">
+              <a:spcBef>
+                <a:spcPct val="0"/>
+              </a:spcBef>
+              <a:spcAft>
+                <a:spcPct val="0"/>
+              </a:spcAft>
+            </a:pPr>
+            <a:r>
+              <a:rPr lang="en-US" altLang="en-US" sz="1100" dirty="0">
+                <a:highlight>
+                  <a:srgbClr val="00FF00"/>
+                </a:highlight>
+                <a:latin typeface="Calibri" panose="020F0502020204030204" pitchFamily="34" charset="0"/>
+                <a:ea typeface="Calibri" panose="020F0502020204030204" pitchFamily="34" charset="0"/>
+                <a:cs typeface="Times New Roman" panose="02020603050405020304" pitchFamily="18" charset="0"/>
+              </a:rPr>
+              <a:t>+ </a:t>
+            </a:r>
+            <a:r>
+              <a:rPr lang="en-US" altLang="en-US" sz="1100" dirty="0" err="1">
+                <a:highlight>
+                  <a:srgbClr val="00FF00"/>
+                </a:highlight>
+                <a:latin typeface="Calibri" panose="020F0502020204030204" pitchFamily="34" charset="0"/>
+                <a:ea typeface="Calibri" panose="020F0502020204030204" pitchFamily="34" charset="0"/>
+                <a:cs typeface="Times New Roman" panose="02020603050405020304" pitchFamily="18" charset="0"/>
+              </a:rPr>
+              <a:t>healthMax</a:t>
+            </a:r>
+            <a:r>
+              <a:rPr lang="en-US" altLang="en-US" sz="1100" dirty="0">
+                <a:highlight>
+                  <a:srgbClr val="00FF00"/>
+                </a:highlight>
+                <a:latin typeface="Calibri" panose="020F0502020204030204" pitchFamily="34" charset="0"/>
+                <a:ea typeface="Calibri" panose="020F0502020204030204" pitchFamily="34" charset="0"/>
+                <a:cs typeface="Times New Roman" panose="02020603050405020304" pitchFamily="18" charset="0"/>
+              </a:rPr>
+              <a:t> : int</a:t>
+            </a:r>
+          </a:p>
+          <a:p>
+            <a:pPr defTabSz="914400" eaLnBrk="0" fontAlgn="base" hangingPunct="0">
+              <a:spcBef>
+                <a:spcPct val="0"/>
+              </a:spcBef>
+              <a:spcAft>
+                <a:spcPct val="0"/>
+              </a:spcAft>
+            </a:pPr>
+            <a:r>
+              <a:rPr lang="en-US" altLang="en-US" sz="1100" dirty="0">
+                <a:highlight>
+                  <a:srgbClr val="00FF00"/>
+                </a:highlight>
+                <a:latin typeface="Calibri" panose="020F0502020204030204" pitchFamily="34" charset="0"/>
+                <a:ea typeface="Calibri" panose="020F0502020204030204" pitchFamily="34" charset="0"/>
+                <a:cs typeface="Times New Roman" panose="02020603050405020304" pitchFamily="18" charset="0"/>
+              </a:rPr>
+              <a:t>+ health : int</a:t>
+            </a:r>
+          </a:p>
+          <a:p>
+            <a:pPr defTabSz="914400" eaLnBrk="0" fontAlgn="base" hangingPunct="0">
+              <a:spcBef>
+                <a:spcPct val="0"/>
+              </a:spcBef>
+              <a:spcAft>
+                <a:spcPct val="0"/>
+              </a:spcAft>
+            </a:pPr>
+            <a:r>
+              <a:rPr lang="en-US" altLang="en-US" sz="1100" dirty="0">
+                <a:highlight>
+                  <a:srgbClr val="00FF00"/>
+                </a:highlight>
+                <a:latin typeface="Calibri" panose="020F0502020204030204" pitchFamily="34" charset="0"/>
+                <a:ea typeface="Calibri" panose="020F0502020204030204" pitchFamily="34" charset="0"/>
+                <a:cs typeface="Times New Roman" panose="02020603050405020304" pitchFamily="18" charset="0"/>
+              </a:rPr>
+              <a:t>+ weight : int</a:t>
+            </a:r>
+          </a:p>
+          <a:p>
+            <a:pPr defTabSz="914400" eaLnBrk="0" fontAlgn="base" hangingPunct="0">
+              <a:spcBef>
+                <a:spcPct val="0"/>
+              </a:spcBef>
+              <a:spcAft>
+                <a:spcPct val="0"/>
+              </a:spcAft>
+            </a:pPr>
+            <a:r>
+              <a:rPr lang="en-US" altLang="en-US" sz="1100" dirty="0">
+                <a:highlight>
+                  <a:srgbClr val="00FF00"/>
+                </a:highlight>
+                <a:latin typeface="Calibri" panose="020F0502020204030204" pitchFamily="34" charset="0"/>
+                <a:ea typeface="Calibri" panose="020F0502020204030204" pitchFamily="34" charset="0"/>
+                <a:cs typeface="Times New Roman" panose="02020603050405020304" pitchFamily="18" charset="0"/>
+              </a:rPr>
+              <a:t>+ flammable : bool</a:t>
+            </a:r>
+          </a:p>
+          <a:p>
+            <a:pPr defTabSz="914400" eaLnBrk="0" fontAlgn="base" hangingPunct="0">
+              <a:spcBef>
+                <a:spcPct val="0"/>
+              </a:spcBef>
+              <a:spcAft>
+                <a:spcPct val="0"/>
+              </a:spcAft>
+            </a:pPr>
+            <a:r>
+              <a:rPr lang="en-US" altLang="en-US" sz="1100" dirty="0">
+                <a:highlight>
+                  <a:srgbClr val="00FF00"/>
+                </a:highlight>
+                <a:latin typeface="Calibri" panose="020F0502020204030204" pitchFamily="34" charset="0"/>
+                <a:ea typeface="Calibri" panose="020F0502020204030204" pitchFamily="34" charset="0"/>
+                <a:cs typeface="Times New Roman" panose="02020603050405020304" pitchFamily="18" charset="0"/>
+              </a:rPr>
+              <a:t>- </a:t>
             </a:r>
             <a:r>
               <a:rPr lang="en-US" altLang="en-US" sz="1100" u="sng" dirty="0" err="1">
+                <a:highlight>
+                  <a:srgbClr val="00FF00"/>
+                </a:highlight>
                 <a:latin typeface="Calibri" panose="020F0502020204030204" pitchFamily="34" charset="0"/>
                 <a:ea typeface="Calibri" panose="020F0502020204030204" pitchFamily="34" charset="0"/>
                 <a:cs typeface="Times New Roman" panose="02020603050405020304" pitchFamily="18" charset="0"/>
               </a:rPr>
               <a:t>fireAmountMax</a:t>
             </a:r>
-            <a:endParaRPr lang="en-US" altLang="en-US" sz="1100" u="sng" dirty="0">
+            <a:r>
+              <a:rPr lang="en-US" altLang="en-US" sz="1100" u="sng" dirty="0">
+                <a:highlight>
+                  <a:srgbClr val="00FF00"/>
+                </a:highlight>
+                <a:latin typeface="Calibri" panose="020F0502020204030204" pitchFamily="34" charset="0"/>
+                <a:ea typeface="Calibri" panose="020F0502020204030204" pitchFamily="34" charset="0"/>
+                <a:cs typeface="Times New Roman" panose="02020603050405020304" pitchFamily="18" charset="0"/>
+              </a:rPr>
+              <a:t> : int</a:t>
+            </a:r>
+          </a:p>
+          <a:p>
+            <a:pPr defTabSz="914400" eaLnBrk="0" fontAlgn="base" hangingPunct="0">
+              <a:spcBef>
+                <a:spcPct val="0"/>
+              </a:spcBef>
+              <a:spcAft>
+                <a:spcPct val="0"/>
+              </a:spcAft>
+            </a:pPr>
+            <a:r>
+              <a:rPr lang="en-US" altLang="en-US" sz="1100" dirty="0">
+                <a:highlight>
+                  <a:srgbClr val="00FF00"/>
+                </a:highlight>
+                <a:latin typeface="Calibri" panose="020F0502020204030204" pitchFamily="34" charset="0"/>
+                <a:ea typeface="Calibri" panose="020F0502020204030204" pitchFamily="34" charset="0"/>
+                <a:cs typeface="Times New Roman" panose="02020603050405020304" pitchFamily="18" charset="0"/>
+              </a:rPr>
+              <a:t>+ </a:t>
+            </a:r>
+            <a:r>
+              <a:rPr lang="en-US" altLang="en-US" sz="1100" dirty="0" err="1">
+                <a:highlight>
+                  <a:srgbClr val="00FF00"/>
+                </a:highlight>
+                <a:latin typeface="Calibri" panose="020F0502020204030204" pitchFamily="34" charset="0"/>
+                <a:ea typeface="Calibri" panose="020F0502020204030204" pitchFamily="34" charset="0"/>
+                <a:cs typeface="Times New Roman" panose="02020603050405020304" pitchFamily="18" charset="0"/>
+              </a:rPr>
+              <a:t>fireAmount</a:t>
+            </a:r>
+            <a:r>
+              <a:rPr lang="en-US" altLang="en-US" sz="1100" dirty="0">
+                <a:highlight>
+                  <a:srgbClr val="00FF00"/>
+                </a:highlight>
+                <a:latin typeface="Calibri" panose="020F0502020204030204" pitchFamily="34" charset="0"/>
+                <a:ea typeface="Calibri" panose="020F0502020204030204" pitchFamily="34" charset="0"/>
+                <a:cs typeface="Times New Roman" panose="02020603050405020304" pitchFamily="18" charset="0"/>
+              </a:rPr>
+              <a:t> : int</a:t>
+            </a:r>
+          </a:p>
+          <a:p>
+            <a:pPr defTabSz="914400" eaLnBrk="0" fontAlgn="base" hangingPunct="0">
+              <a:spcBef>
+                <a:spcPct val="0"/>
+              </a:spcBef>
+              <a:spcAft>
+                <a:spcPct val="0"/>
+              </a:spcAft>
+            </a:pPr>
+            <a:r>
+              <a:rPr lang="en-US" altLang="en-US" sz="1100" dirty="0">
+                <a:highlight>
+                  <a:srgbClr val="00FF00"/>
+                </a:highlight>
+                <a:latin typeface="Calibri" panose="020F0502020204030204" pitchFamily="34" charset="0"/>
+                <a:ea typeface="Calibri" panose="020F0502020204030204" pitchFamily="34" charset="0"/>
+                <a:cs typeface="Times New Roman" panose="02020603050405020304" pitchFamily="18" charset="0"/>
+              </a:rPr>
+              <a:t>+ explosive : int</a:t>
+            </a:r>
+          </a:p>
+          <a:p>
+            <a:pPr defTabSz="914400" eaLnBrk="0" fontAlgn="base" hangingPunct="0">
+              <a:spcBef>
+                <a:spcPct val="0"/>
+              </a:spcBef>
+              <a:spcAft>
+                <a:spcPct val="0"/>
+              </a:spcAft>
+            </a:pPr>
+            <a:r>
+              <a:rPr lang="en-US" altLang="en-US" sz="1100" dirty="0">
+                <a:highlight>
+                  <a:srgbClr val="00FF00"/>
+                </a:highlight>
+                <a:ea typeface="Calibri" panose="020F0502020204030204" pitchFamily="34" charset="0"/>
+                <a:cs typeface="Times New Roman" panose="02020603050405020304" pitchFamily="18" charset="0"/>
+              </a:rPr>
+              <a:t>+ exposed : bool</a:t>
+            </a:r>
+            <a:endParaRPr lang="en-US" altLang="en-US" sz="1100" dirty="0">
+              <a:highlight>
+                <a:srgbClr val="00FF00"/>
+              </a:highlight>
               <a:latin typeface="Calibri" panose="020F0502020204030204" pitchFamily="34" charset="0"/>
               <a:ea typeface="Calibri" panose="020F0502020204030204" pitchFamily="34" charset="0"/>
               <a:cs typeface="Times New Roman" panose="02020603050405020304" pitchFamily="18" charset="0"/>
@@ -3378,21 +3721,118 @@
             </a:pPr>
             <a:r>
               <a:rPr lang="en-US" altLang="en-US" sz="1100" dirty="0">
-                <a:latin typeface="Calibri" panose="020F0502020204030204" pitchFamily="34" charset="0"/>
+                <a:highlight>
+                  <a:srgbClr val="00FF00"/>
+                </a:highlight>
                 <a:ea typeface="Calibri" panose="020F0502020204030204" pitchFamily="34" charset="0"/>
                 <a:cs typeface="Times New Roman" panose="02020603050405020304" pitchFamily="18" charset="0"/>
               </a:rPr>
-              <a:t>+ int </a:t>
+              <a:t>+ </a:t>
             </a:r>
             <a:r>
               <a:rPr lang="en-US" altLang="en-US" sz="1100" dirty="0" err="1">
-                <a:latin typeface="Calibri" panose="020F0502020204030204" pitchFamily="34" charset="0"/>
+                <a:highlight>
+                  <a:srgbClr val="00FF00"/>
+                </a:highlight>
                 <a:ea typeface="Calibri" panose="020F0502020204030204" pitchFamily="34" charset="0"/>
                 <a:cs typeface="Times New Roman" panose="02020603050405020304" pitchFamily="18" charset="0"/>
               </a:rPr>
-              <a:t>fireAmount</a:t>
+              <a:t>itemSprite</a:t>
+            </a:r>
+            <a:r>
+              <a:rPr lang="en-US" altLang="en-US" sz="1100" dirty="0">
+                <a:highlight>
+                  <a:srgbClr val="00FF00"/>
+                </a:highlight>
+                <a:ea typeface="Calibri" panose="020F0502020204030204" pitchFamily="34" charset="0"/>
+                <a:cs typeface="Times New Roman" panose="02020603050405020304" pitchFamily="18" charset="0"/>
+              </a:rPr>
+              <a:t> : Sprite</a:t>
+            </a:r>
+          </a:p>
+          <a:p>
+            <a:pPr defTabSz="914400" eaLnBrk="0" fontAlgn="base" hangingPunct="0">
+              <a:spcBef>
+                <a:spcPct val="0"/>
+              </a:spcBef>
+              <a:spcAft>
+                <a:spcPct val="0"/>
+              </a:spcAft>
+            </a:pPr>
+            <a:r>
+              <a:rPr lang="en-US" altLang="en-US" sz="1100" dirty="0">
+                <a:highlight>
+                  <a:srgbClr val="00FF00"/>
+                </a:highlight>
+                <a:ea typeface="Calibri" panose="020F0502020204030204" pitchFamily="34" charset="0"/>
+                <a:cs typeface="Times New Roman" panose="02020603050405020304" pitchFamily="18" charset="0"/>
+              </a:rPr>
+              <a:t># </a:t>
+            </a:r>
+            <a:r>
+              <a:rPr lang="en-US" altLang="en-US" sz="1100" dirty="0" err="1">
+                <a:highlight>
+                  <a:srgbClr val="00FF00"/>
+                </a:highlight>
+                <a:latin typeface="Calibri" panose="020F0502020204030204" pitchFamily="34" charset="0"/>
+                <a:ea typeface="Calibri" panose="020F0502020204030204" pitchFamily="34" charset="0"/>
+                <a:cs typeface="Times New Roman" panose="02020603050405020304" pitchFamily="18" charset="0"/>
+              </a:rPr>
+              <a:t>myRogueSpriteRenderer</a:t>
+            </a:r>
+            <a:r>
+              <a:rPr lang="en-US" altLang="en-US" sz="1100" dirty="0">
+                <a:highlight>
+                  <a:srgbClr val="00FF00"/>
+                </a:highlight>
+                <a:latin typeface="Calibri" panose="020F0502020204030204" pitchFamily="34" charset="0"/>
+                <a:ea typeface="Calibri" panose="020F0502020204030204" pitchFamily="34" charset="0"/>
+                <a:cs typeface="Times New Roman" panose="02020603050405020304" pitchFamily="18" charset="0"/>
+              </a:rPr>
+              <a:t> : </a:t>
+            </a:r>
+            <a:r>
+              <a:rPr lang="en-US" altLang="en-US" sz="1100" dirty="0" err="1">
+                <a:highlight>
+                  <a:srgbClr val="00FF00"/>
+                </a:highlight>
+                <a:latin typeface="Calibri" panose="020F0502020204030204" pitchFamily="34" charset="0"/>
+                <a:ea typeface="Calibri" panose="020F0502020204030204" pitchFamily="34" charset="0"/>
+                <a:cs typeface="Times New Roman" panose="02020603050405020304" pitchFamily="18" charset="0"/>
+              </a:rPr>
+              <a:t>RogueSpriteRenderer</a:t>
             </a:r>
             <a:endParaRPr lang="en-US" altLang="en-US" sz="1100" dirty="0">
+              <a:highlight>
+                <a:srgbClr val="00FF00"/>
+              </a:highlight>
+              <a:ea typeface="Calibri" panose="020F0502020204030204" pitchFamily="34" charset="0"/>
+              <a:cs typeface="Times New Roman" panose="02020603050405020304" pitchFamily="18" charset="0"/>
+            </a:endParaRPr>
+          </a:p>
+          <a:p>
+            <a:pPr defTabSz="914400" eaLnBrk="0" fontAlgn="base" hangingPunct="0">
+              <a:spcBef>
+                <a:spcPct val="0"/>
+              </a:spcBef>
+              <a:spcAft>
+                <a:spcPct val="0"/>
+              </a:spcAft>
+            </a:pPr>
+            <a:r>
+              <a:rPr lang="en-US" altLang="en-US" sz="1100" dirty="0">
+                <a:highlight>
+                  <a:srgbClr val="00FF00"/>
+                </a:highlight>
+                <a:latin typeface="Calibri" panose="020F0502020204030204" pitchFamily="34" charset="0"/>
+                <a:cs typeface="Times New Roman" panose="02020603050405020304" pitchFamily="18" charset="0"/>
+              </a:rPr>
+              <a:t>--------------------------------------------------------------------------------------------</a:t>
+            </a:r>
+            <a:endParaRPr lang="en-US" altLang="en-US" sz="1100" dirty="0">
+              <a:highlight>
+                <a:srgbClr val="00FF00"/>
+              </a:highlight>
               <a:latin typeface="Calibri" panose="020F0502020204030204" pitchFamily="34" charset="0"/>
               <a:ea typeface="Calibri" panose="020F0502020204030204" pitchFamily="34" charset="0"/>
               <a:cs typeface="Times New Roman" panose="02020603050405020304" pitchFamily="18" charset="0"/>
@@ -3408,207 +3848,251 @@
               </a:spcAft>
             </a:pPr>
             <a:r>
-              <a:rPr lang="en-US" altLang="en-US" sz="1100" dirty="0">
+              <a:rPr lang="en-US" altLang="en-US" sz="1100" i="1" dirty="0">
+                <a:highlight>
+                  <a:srgbClr val="00FF00"/>
+                </a:highlight>
                 <a:latin typeface="Calibri" panose="020F0502020204030204" pitchFamily="34" charset="0"/>
                 <a:ea typeface="Calibri" panose="020F0502020204030204" pitchFamily="34" charset="0"/>
                 <a:cs typeface="Times New Roman" panose="02020603050405020304" pitchFamily="18" charset="0"/>
               </a:rPr>
-              <a:t>+ int explosive</a:t>
-            </a:r>
-          </a:p>
-          <a:p>
-            <a:pPr defTabSz="914400" eaLnBrk="0" fontAlgn="base" hangingPunct="0">
-              <a:spcBef>
-                <a:spcPct val="0"/>
-              </a:spcBef>
-              <a:spcAft>
-                <a:spcPct val="0"/>
-              </a:spcAft>
-            </a:pPr>
-            <a:r>
-              <a:rPr lang="en-US" altLang="en-US" sz="1100" dirty="0">
-                <a:ea typeface="Calibri" panose="020F0502020204030204" pitchFamily="34" charset="0"/>
-                <a:cs typeface="Times New Roman" panose="02020603050405020304" pitchFamily="18" charset="0"/>
-              </a:rPr>
-              <a:t>+ bool exposed</a:t>
-            </a:r>
-            <a:endParaRPr lang="en-US" altLang="en-US" sz="1100" dirty="0">
-              <a:latin typeface="Calibri" panose="020F0502020204030204" pitchFamily="34" charset="0"/>
-              <a:ea typeface="Calibri" panose="020F0502020204030204" pitchFamily="34" charset="0"/>
-              <a:cs typeface="Times New Roman" panose="02020603050405020304" pitchFamily="18" charset="0"/>
+              <a:t>+ Initialize() : void</a:t>
+            </a:r>
+          </a:p>
+          <a:p>
+            <a:pPr defTabSz="914400" eaLnBrk="0" fontAlgn="base" hangingPunct="0">
+              <a:spcBef>
+                <a:spcPct val="0"/>
+              </a:spcBef>
+              <a:spcAft>
+                <a:spcPct val="0"/>
+              </a:spcAft>
+            </a:pPr>
+            <a:r>
+              <a:rPr lang="en-US" altLang="en-US" sz="1100" i="1" dirty="0">
+                <a:highlight>
+                  <a:srgbClr val="00FF00"/>
+                </a:highlight>
+                <a:latin typeface="Calibri" panose="020F0502020204030204" pitchFamily="34" charset="0"/>
+                <a:cs typeface="Times New Roman" panose="02020603050405020304" pitchFamily="18" charset="0"/>
+              </a:rPr>
+              <a:t>+ </a:t>
+            </a:r>
+            <a:r>
+              <a:rPr lang="en-US" altLang="en-US" sz="1100" i="1" dirty="0" err="1">
+                <a:highlight>
+                  <a:srgbClr val="00FF00"/>
+                </a:highlight>
+                <a:latin typeface="Calibri" panose="020F0502020204030204" pitchFamily="34" charset="0"/>
+                <a:cs typeface="Times New Roman" panose="02020603050405020304" pitchFamily="18" charset="0"/>
+              </a:rPr>
+              <a:t>GetFullName</a:t>
+            </a:r>
+            <a:r>
+              <a:rPr lang="en-US" altLang="en-US" sz="1100" i="1" dirty="0">
+                <a:highlight>
+                  <a:srgbClr val="00FF00"/>
+                </a:highlight>
+                <a:latin typeface="Calibri" panose="020F0502020204030204" pitchFamily="34" charset="0"/>
+                <a:cs typeface="Times New Roman" panose="02020603050405020304" pitchFamily="18" charset="0"/>
+              </a:rPr>
+              <a:t>() : string</a:t>
+            </a:r>
+          </a:p>
+          <a:p>
+            <a:pPr defTabSz="914400" eaLnBrk="0" fontAlgn="base" hangingPunct="0">
+              <a:spcBef>
+                <a:spcPct val="0"/>
+              </a:spcBef>
+              <a:spcAft>
+                <a:spcPct val="0"/>
+              </a:spcAft>
+            </a:pPr>
+            <a:r>
+              <a:rPr lang="en-US" altLang="en-US" sz="1100" dirty="0">
+                <a:highlight>
+                  <a:srgbClr val="00FF00"/>
+                </a:highlight>
+                <a:latin typeface="Calibri" panose="020F0502020204030204" pitchFamily="34" charset="0"/>
+                <a:cs typeface="Times New Roman" panose="02020603050405020304" pitchFamily="18" charset="0"/>
+              </a:rPr>
+              <a:t>+ </a:t>
+            </a:r>
+            <a:r>
+              <a:rPr lang="en-US" altLang="en-US" sz="1100" dirty="0" err="1">
+                <a:highlight>
+                  <a:srgbClr val="00FF00"/>
+                </a:highlight>
+                <a:latin typeface="Calibri" panose="020F0502020204030204" pitchFamily="34" charset="0"/>
+                <a:cs typeface="Times New Roman" panose="02020603050405020304" pitchFamily="18" charset="0"/>
+              </a:rPr>
+              <a:t>UpdateRogueSpriteRenderer</a:t>
+            </a:r>
+            <a:r>
+              <a:rPr lang="en-US" altLang="en-US" sz="1100" dirty="0">
+                <a:highlight>
+                  <a:srgbClr val="00FF00"/>
+                </a:highlight>
+                <a:latin typeface="Calibri" panose="020F0502020204030204" pitchFamily="34" charset="0"/>
+                <a:cs typeface="Times New Roman" panose="02020603050405020304" pitchFamily="18" charset="0"/>
+              </a:rPr>
+              <a:t>() : void</a:t>
+            </a:r>
+          </a:p>
+          <a:p>
+            <a:pPr defTabSz="914400" eaLnBrk="0" fontAlgn="base" hangingPunct="0">
+              <a:spcBef>
+                <a:spcPct val="0"/>
+              </a:spcBef>
+              <a:spcAft>
+                <a:spcPct val="0"/>
+              </a:spcAft>
+            </a:pPr>
+            <a:r>
+              <a:rPr lang="en-US" altLang="en-US" sz="1100" i="1" dirty="0">
+                <a:highlight>
+                  <a:srgbClr val="00FF00"/>
+                </a:highlight>
+                <a:latin typeface="Calibri" panose="020F0502020204030204" pitchFamily="34" charset="0"/>
+                <a:cs typeface="Times New Roman" panose="02020603050405020304" pitchFamily="18" charset="0"/>
+              </a:rPr>
+              <a:t>+ </a:t>
+            </a:r>
+            <a:r>
+              <a:rPr lang="en-US" altLang="en-US" sz="1100" i="1" dirty="0" err="1">
+                <a:highlight>
+                  <a:srgbClr val="00FF00"/>
+                </a:highlight>
+                <a:latin typeface="Calibri" panose="020F0502020204030204" pitchFamily="34" charset="0"/>
+                <a:cs typeface="Times New Roman" panose="02020603050405020304" pitchFamily="18" charset="0"/>
+              </a:rPr>
+              <a:t>GetCurrentSprite</a:t>
+            </a:r>
+            <a:r>
+              <a:rPr lang="en-US" altLang="en-US" sz="1100" i="1" dirty="0">
+                <a:highlight>
+                  <a:srgbClr val="00FF00"/>
+                </a:highlight>
+                <a:latin typeface="Calibri" panose="020F0502020204030204" pitchFamily="34" charset="0"/>
+                <a:cs typeface="Times New Roman" panose="02020603050405020304" pitchFamily="18" charset="0"/>
+              </a:rPr>
+              <a:t>() : Sprite</a:t>
+            </a:r>
+          </a:p>
+          <a:p>
+            <a:pPr defTabSz="914400" eaLnBrk="0" fontAlgn="base" hangingPunct="0">
+              <a:spcBef>
+                <a:spcPct val="0"/>
+              </a:spcBef>
+              <a:spcAft>
+                <a:spcPct val="0"/>
+              </a:spcAft>
+            </a:pPr>
+            <a:r>
+              <a:rPr lang="en-US" altLang="en-US" sz="1100" i="1" dirty="0">
+                <a:highlight>
+                  <a:srgbClr val="00FF00"/>
+                </a:highlight>
+                <a:latin typeface="Calibri" panose="020F0502020204030204" pitchFamily="34" charset="0"/>
+                <a:cs typeface="Times New Roman" panose="02020603050405020304" pitchFamily="18" charset="0"/>
+              </a:rPr>
+              <a:t># </a:t>
+            </a:r>
+            <a:r>
+              <a:rPr lang="en-US" altLang="en-US" sz="1100" i="1" dirty="0" err="1">
+                <a:highlight>
+                  <a:srgbClr val="00FF00"/>
+                </a:highlight>
+                <a:latin typeface="Calibri" panose="020F0502020204030204" pitchFamily="34" charset="0"/>
+                <a:cs typeface="Times New Roman" panose="02020603050405020304" pitchFamily="18" charset="0"/>
+              </a:rPr>
+              <a:t>DestroyObject</a:t>
+            </a:r>
+            <a:r>
+              <a:rPr lang="en-US" altLang="en-US" sz="1100" i="1" dirty="0">
+                <a:highlight>
+                  <a:srgbClr val="00FF00"/>
+                </a:highlight>
+                <a:latin typeface="Calibri" panose="020F0502020204030204" pitchFamily="34" charset="0"/>
+                <a:cs typeface="Times New Roman" panose="02020603050405020304" pitchFamily="18" charset="0"/>
+              </a:rPr>
+              <a:t>() : bool</a:t>
+            </a:r>
+          </a:p>
+          <a:p>
+            <a:pPr defTabSz="914400" eaLnBrk="0" fontAlgn="base" hangingPunct="0">
+              <a:spcBef>
+                <a:spcPct val="0"/>
+              </a:spcBef>
+              <a:spcAft>
+                <a:spcPct val="0"/>
+              </a:spcAft>
+            </a:pPr>
+            <a:r>
+              <a:rPr lang="en-US" altLang="en-US" sz="1100" dirty="0">
+                <a:highlight>
+                  <a:srgbClr val="00FF00"/>
+                </a:highlight>
+                <a:latin typeface="Calibri" panose="020F0502020204030204" pitchFamily="34" charset="0"/>
+                <a:cs typeface="Times New Roman" panose="02020603050405020304" pitchFamily="18" charset="0"/>
+              </a:rPr>
+              <a:t>+ </a:t>
+            </a:r>
+            <a:r>
+              <a:rPr lang="en-US" altLang="en-US" sz="1100" dirty="0" err="1">
+                <a:highlight>
+                  <a:srgbClr val="00FF00"/>
+                </a:highlight>
+                <a:latin typeface="Calibri" panose="020F0502020204030204" pitchFamily="34" charset="0"/>
+                <a:cs typeface="Times New Roman" panose="02020603050405020304" pitchFamily="18" charset="0"/>
+              </a:rPr>
+              <a:t>MakeItem</a:t>
+            </a:r>
+            <a:r>
+              <a:rPr lang="en-US" altLang="en-US" sz="1100" dirty="0">
+                <a:highlight>
+                  <a:srgbClr val="00FF00"/>
+                </a:highlight>
+                <a:latin typeface="Calibri" panose="020F0502020204030204" pitchFamily="34" charset="0"/>
+                <a:cs typeface="Times New Roman" panose="02020603050405020304" pitchFamily="18" charset="0"/>
+              </a:rPr>
+              <a:t>(</a:t>
+            </a:r>
+            <a:r>
+              <a:rPr lang="en-US" altLang="en-US" sz="1100" dirty="0" err="1">
+                <a:highlight>
+                  <a:srgbClr val="00FF00"/>
+                </a:highlight>
+                <a:latin typeface="Calibri" panose="020F0502020204030204" pitchFamily="34" charset="0"/>
+                <a:cs typeface="Times New Roman" panose="02020603050405020304" pitchFamily="18" charset="0"/>
+              </a:rPr>
+              <a:t>RoguelikeObject</a:t>
+            </a:r>
+            <a:r>
+              <a:rPr lang="en-US" altLang="en-US" sz="1100" dirty="0">
+                <a:highlight>
+                  <a:srgbClr val="00FF00"/>
+                </a:highlight>
+                <a:latin typeface="Calibri" panose="020F0502020204030204" pitchFamily="34" charset="0"/>
+                <a:cs typeface="Times New Roman" panose="02020603050405020304" pitchFamily="18" charset="0"/>
+              </a:rPr>
+              <a:t>, int, Inventory, int) : </a:t>
+            </a:r>
+            <a:r>
+              <a:rPr lang="en-US" altLang="en-US" sz="1100" dirty="0" err="1">
+                <a:highlight>
+                  <a:srgbClr val="00FF00"/>
+                </a:highlight>
+                <a:latin typeface="Calibri" panose="020F0502020204030204" pitchFamily="34" charset="0"/>
+                <a:cs typeface="Times New Roman" panose="02020603050405020304" pitchFamily="18" charset="0"/>
+              </a:rPr>
+              <a:t>RoguelikeObject</a:t>
+            </a:r>
+            <a:endParaRPr lang="en-US" altLang="en-US" sz="800" dirty="0">
+              <a:highlight>
+                <a:srgbClr val="00FF00"/>
+              </a:highlight>
             </a:endParaRPr>
-          </a:p>
-          <a:p>
-            <a:pPr defTabSz="914400" eaLnBrk="0" fontAlgn="base" hangingPunct="0">
-              <a:spcBef>
-                <a:spcPct val="0"/>
-              </a:spcBef>
-              <a:spcAft>
-                <a:spcPct val="0"/>
-              </a:spcAft>
-            </a:pPr>
-            <a:r>
-              <a:rPr lang="en-US" altLang="en-US" sz="1100" dirty="0">
-                <a:ea typeface="Calibri" panose="020F0502020204030204" pitchFamily="34" charset="0"/>
-                <a:cs typeface="Times New Roman" panose="02020603050405020304" pitchFamily="18" charset="0"/>
-              </a:rPr>
-              <a:t>+ Sprite </a:t>
-            </a:r>
-            <a:r>
-              <a:rPr lang="en-US" altLang="en-US" sz="1100" dirty="0" err="1">
-                <a:ea typeface="Calibri" panose="020F0502020204030204" pitchFamily="34" charset="0"/>
-                <a:cs typeface="Times New Roman" panose="02020603050405020304" pitchFamily="18" charset="0"/>
-              </a:rPr>
-              <a:t>itemSprite</a:t>
-            </a:r>
-            <a:endParaRPr lang="en-US" altLang="en-US" sz="1100" dirty="0">
-              <a:ea typeface="Calibri" panose="020F0502020204030204" pitchFamily="34" charset="0"/>
-              <a:cs typeface="Times New Roman" panose="02020603050405020304" pitchFamily="18" charset="0"/>
-            </a:endParaRPr>
-          </a:p>
-          <a:p>
-            <a:pPr defTabSz="914400" eaLnBrk="0" fontAlgn="base" hangingPunct="0">
-              <a:spcBef>
-                <a:spcPct val="0"/>
-              </a:spcBef>
-              <a:spcAft>
-                <a:spcPct val="0"/>
-              </a:spcAft>
-            </a:pPr>
-            <a:r>
-              <a:rPr lang="en-US" altLang="en-US" sz="1100" dirty="0">
-                <a:ea typeface="Calibri" panose="020F0502020204030204" pitchFamily="34" charset="0"/>
-                <a:cs typeface="Times New Roman" panose="02020603050405020304" pitchFamily="18" charset="0"/>
-              </a:rPr>
-              <a:t>- </a:t>
-            </a:r>
-            <a:r>
-              <a:rPr lang="en-US" altLang="en-US" sz="1100" dirty="0" err="1">
-                <a:latin typeface="Calibri" panose="020F0502020204030204" pitchFamily="34" charset="0"/>
-                <a:ea typeface="Calibri" panose="020F0502020204030204" pitchFamily="34" charset="0"/>
-                <a:cs typeface="Times New Roman" panose="02020603050405020304" pitchFamily="18" charset="0"/>
-              </a:rPr>
-              <a:t>ItemSpriteRenderer</a:t>
-            </a:r>
-            <a:r>
-              <a:rPr lang="en-US" altLang="en-US" sz="1100" dirty="0">
-                <a:latin typeface="Calibri" panose="020F0502020204030204" pitchFamily="34" charset="0"/>
-                <a:ea typeface="Calibri" panose="020F0502020204030204" pitchFamily="34" charset="0"/>
-                <a:cs typeface="Times New Roman" panose="02020603050405020304" pitchFamily="18" charset="0"/>
-              </a:rPr>
-              <a:t> </a:t>
-            </a:r>
-            <a:r>
-              <a:rPr lang="en-US" altLang="en-US" sz="1100" dirty="0" err="1">
-                <a:latin typeface="Calibri" panose="020F0502020204030204" pitchFamily="34" charset="0"/>
-                <a:ea typeface="Calibri" panose="020F0502020204030204" pitchFamily="34" charset="0"/>
-                <a:cs typeface="Times New Roman" panose="02020603050405020304" pitchFamily="18" charset="0"/>
-              </a:rPr>
-              <a:t>myItemSpriteRenderer</a:t>
-            </a:r>
-            <a:endParaRPr lang="en-US" altLang="en-US" sz="1100" dirty="0">
-              <a:ea typeface="Calibri" panose="020F0502020204030204" pitchFamily="34" charset="0"/>
-              <a:cs typeface="Times New Roman" panose="02020603050405020304" pitchFamily="18" charset="0"/>
-            </a:endParaRPr>
-          </a:p>
-          <a:p>
-            <a:pPr defTabSz="914400" eaLnBrk="0" fontAlgn="base" hangingPunct="0">
-              <a:spcBef>
-                <a:spcPct val="0"/>
-              </a:spcBef>
-              <a:spcAft>
-                <a:spcPct val="0"/>
-              </a:spcAft>
-            </a:pPr>
-            <a:r>
-              <a:rPr lang="en-US" altLang="en-US" sz="1100" dirty="0">
-                <a:latin typeface="Calibri" panose="020F0502020204030204" pitchFamily="34" charset="0"/>
-                <a:ea typeface="Calibri" panose="020F0502020204030204" pitchFamily="34" charset="0"/>
-                <a:cs typeface="Times New Roman" panose="02020603050405020304" pitchFamily="18" charset="0"/>
-              </a:rPr>
-              <a:t>--------------------------------------------</a:t>
-            </a:r>
-          </a:p>
-          <a:p>
-            <a:pPr defTabSz="914400" eaLnBrk="0" fontAlgn="base" hangingPunct="0">
-              <a:spcBef>
-                <a:spcPct val="0"/>
-              </a:spcBef>
-              <a:spcAft>
-                <a:spcPct val="0"/>
-              </a:spcAft>
-            </a:pPr>
-            <a:r>
-              <a:rPr lang="en-US" altLang="en-US" sz="1100" dirty="0">
-                <a:latin typeface="Calibri" panose="020F0502020204030204" pitchFamily="34" charset="0"/>
-                <a:ea typeface="Calibri" panose="020F0502020204030204" pitchFamily="34" charset="0"/>
-                <a:cs typeface="Times New Roman" panose="02020603050405020304" pitchFamily="18" charset="0"/>
-              </a:rPr>
-              <a:t>+ void Initialize();</a:t>
-            </a:r>
-          </a:p>
-          <a:p>
-            <a:pPr defTabSz="914400" eaLnBrk="0" fontAlgn="base" hangingPunct="0">
-              <a:spcBef>
-                <a:spcPct val="0"/>
-              </a:spcBef>
-              <a:spcAft>
-                <a:spcPct val="0"/>
-              </a:spcAft>
-            </a:pPr>
-            <a:r>
-              <a:rPr lang="en-US" altLang="en-US" sz="1100" dirty="0">
-                <a:latin typeface="Calibri" panose="020F0502020204030204" pitchFamily="34" charset="0"/>
-                <a:cs typeface="Times New Roman" panose="02020603050405020304" pitchFamily="18" charset="0"/>
-              </a:rPr>
-              <a:t>+ string </a:t>
-            </a:r>
-            <a:r>
-              <a:rPr lang="en-US" altLang="en-US" sz="1100" dirty="0" err="1">
-                <a:latin typeface="Calibri" panose="020F0502020204030204" pitchFamily="34" charset="0"/>
-                <a:cs typeface="Times New Roman" panose="02020603050405020304" pitchFamily="18" charset="0"/>
-              </a:rPr>
-              <a:t>GetFinalName</a:t>
-            </a:r>
-            <a:r>
-              <a:rPr lang="en-US" altLang="en-US" sz="1100" dirty="0">
-                <a:latin typeface="Calibri" panose="020F0502020204030204" pitchFamily="34" charset="0"/>
-                <a:cs typeface="Times New Roman" panose="02020603050405020304" pitchFamily="18" charset="0"/>
-              </a:rPr>
-              <a:t>();</a:t>
-            </a:r>
-          </a:p>
-          <a:p>
-            <a:pPr defTabSz="914400" eaLnBrk="0" fontAlgn="base" hangingPunct="0">
-              <a:spcBef>
-                <a:spcPct val="0"/>
-              </a:spcBef>
-              <a:spcAft>
-                <a:spcPct val="0"/>
-              </a:spcAft>
-            </a:pPr>
-            <a:r>
-              <a:rPr lang="en-US" altLang="en-US" sz="1100" dirty="0">
-                <a:latin typeface="Calibri" panose="020F0502020204030204" pitchFamily="34" charset="0"/>
-                <a:cs typeface="Times New Roman" panose="02020603050405020304" pitchFamily="18" charset="0"/>
-              </a:rPr>
-              <a:t>+ virtual bool </a:t>
-            </a:r>
-            <a:r>
-              <a:rPr lang="en-US" altLang="en-US" sz="1100" dirty="0" err="1">
-                <a:latin typeface="Calibri" panose="020F0502020204030204" pitchFamily="34" charset="0"/>
-                <a:cs typeface="Times New Roman" panose="02020603050405020304" pitchFamily="18" charset="0"/>
-              </a:rPr>
-              <a:t>DestroyObject</a:t>
-            </a:r>
-            <a:r>
-              <a:rPr lang="en-US" altLang="en-US" sz="1100" dirty="0">
-                <a:latin typeface="Calibri" panose="020F0502020204030204" pitchFamily="34" charset="0"/>
-                <a:cs typeface="Times New Roman" panose="02020603050405020304" pitchFamily="18" charset="0"/>
-              </a:rPr>
-              <a:t>();</a:t>
-            </a:r>
-            <a:endParaRPr lang="en-US" altLang="en-US" sz="800" dirty="0"/>
           </a:p>
         </p:txBody>
       </p:sp>
@@ -3628,8 +4112,8 @@
         </p:nvSpPr>
         <p:spPr bwMode="auto">
           <a:xfrm>
-            <a:off x="8172449" y="2556669"/>
-            <a:ext cx="2978151" cy="3683940"/>
+            <a:off x="8929596" y="2556669"/>
+            <a:ext cx="3164969" cy="2197571"/>
           </a:xfrm>
           <a:prstGeom prst="rect">
             <a:avLst/>
@@ -3663,116 +4147,357 @@
               </a:spcAft>
             </a:pPr>
             <a:r>
+              <a:rPr lang="en-US" altLang="en-US" sz="1100" i="1" dirty="0" err="1">
+                <a:highlight>
+                  <a:srgbClr val="00FF00"/>
+                </a:highlight>
+                <a:ea typeface="Calibri" panose="020F0502020204030204" pitchFamily="34" charset="0"/>
+                <a:cs typeface="Times New Roman" panose="02020603050405020304" pitchFamily="18" charset="0"/>
+              </a:rPr>
+              <a:t>WorldObject</a:t>
+            </a:r>
+            <a:endParaRPr lang="en-US" altLang="en-US" sz="1100" i="1" dirty="0">
+              <a:highlight>
+                <a:srgbClr val="00FF00"/>
+              </a:highlight>
+              <a:ea typeface="Calibri" panose="020F0502020204030204" pitchFamily="34" charset="0"/>
+              <a:cs typeface="Times New Roman" panose="02020603050405020304" pitchFamily="18" charset="0"/>
+            </a:endParaRPr>
+          </a:p>
+          <a:p>
+            <a:pPr defTabSz="914400" eaLnBrk="0" fontAlgn="base" hangingPunct="0">
+              <a:spcBef>
+                <a:spcPct val="0"/>
+              </a:spcBef>
+              <a:spcAft>
+                <a:spcPct val="0"/>
+              </a:spcAft>
+            </a:pPr>
+            <a:r>
+              <a:rPr lang="en-US" altLang="en-US" sz="1100" i="1" dirty="0">
+                <a:highlight>
+                  <a:srgbClr val="00FF00"/>
+                </a:highlight>
+                <a:ea typeface="Calibri" panose="020F0502020204030204" pitchFamily="34" charset="0"/>
+                <a:cs typeface="Times New Roman" panose="02020603050405020304" pitchFamily="18" charset="0"/>
+              </a:rPr>
+              <a:t>-----------------------------------------------------------------</a:t>
+            </a:r>
+          </a:p>
+          <a:p>
+            <a:pPr defTabSz="914400" eaLnBrk="0" fontAlgn="base" hangingPunct="0">
+              <a:spcBef>
+                <a:spcPct val="0"/>
+              </a:spcBef>
+              <a:spcAft>
+                <a:spcPct val="0"/>
+              </a:spcAft>
+            </a:pPr>
+            <a:r>
+              <a:rPr lang="en-US" altLang="en-US" sz="1100" dirty="0">
+                <a:highlight>
+                  <a:srgbClr val="00FF00"/>
+                </a:highlight>
+                <a:cs typeface="Times New Roman" panose="02020603050405020304" pitchFamily="18" charset="0"/>
+              </a:rPr>
+              <a:t>+ </a:t>
+            </a:r>
+            <a:r>
               <a:rPr lang="en-US" altLang="en-US" sz="1100" dirty="0" err="1">
-                <a:latin typeface="Calibri" panose="020F0502020204030204" pitchFamily="34" charset="0"/>
+                <a:highlight>
+                  <a:srgbClr val="00FF00"/>
+                </a:highlight>
+                <a:cs typeface="Times New Roman" panose="02020603050405020304" pitchFamily="18" charset="0"/>
+              </a:rPr>
+              <a:t>worldSprite</a:t>
+            </a:r>
+            <a:r>
+              <a:rPr lang="en-US" altLang="en-US" sz="1100" dirty="0">
+                <a:highlight>
+                  <a:srgbClr val="00FF00"/>
+                </a:highlight>
+                <a:cs typeface="Times New Roman" panose="02020603050405020304" pitchFamily="18" charset="0"/>
+              </a:rPr>
+              <a:t> : Sprite</a:t>
+            </a:r>
+          </a:p>
+          <a:p>
+            <a:pPr defTabSz="914400" eaLnBrk="0" fontAlgn="base" hangingPunct="0">
+              <a:spcBef>
+                <a:spcPct val="0"/>
+              </a:spcBef>
+              <a:spcAft>
+                <a:spcPct val="0"/>
+              </a:spcAft>
+            </a:pPr>
+            <a:r>
+              <a:rPr lang="en-US" altLang="en-US" sz="1100" dirty="0">
+                <a:highlight>
+                  <a:srgbClr val="00FF00"/>
+                </a:highlight>
+                <a:cs typeface="Times New Roman" panose="02020603050405020304" pitchFamily="18" charset="0"/>
+              </a:rPr>
+              <a:t>- </a:t>
+            </a:r>
+            <a:r>
+              <a:rPr lang="en-US" altLang="en-US" sz="1100" dirty="0" err="1">
+                <a:highlight>
+                  <a:srgbClr val="00FF00"/>
+                </a:highlight>
+                <a:cs typeface="Times New Roman" panose="02020603050405020304" pitchFamily="18" charset="0"/>
+              </a:rPr>
+              <a:t>pathfindingCost</a:t>
+            </a:r>
+            <a:r>
+              <a:rPr lang="en-US" altLang="en-US" sz="1100" dirty="0">
+                <a:highlight>
+                  <a:srgbClr val="00FF00"/>
+                </a:highlight>
+                <a:cs typeface="Times New Roman" panose="02020603050405020304" pitchFamily="18" charset="0"/>
+              </a:rPr>
+              <a:t> : float</a:t>
+            </a:r>
+            <a:endParaRPr lang="en-US" altLang="en-US" sz="1100" dirty="0">
+              <a:highlight>
+                <a:srgbClr val="00FF00"/>
+              </a:highlight>
+            </a:endParaRPr>
+          </a:p>
+          <a:p>
+            <a:pPr defTabSz="914400" eaLnBrk="0" fontAlgn="base" hangingPunct="0">
+              <a:spcBef>
+                <a:spcPct val="0"/>
+              </a:spcBef>
+              <a:spcAft>
+                <a:spcPct val="0"/>
+              </a:spcAft>
+            </a:pPr>
+            <a:r>
+              <a:rPr lang="en-US" altLang="en-US" sz="1100" dirty="0">
+                <a:highlight>
+                  <a:srgbClr val="00FF00"/>
+                </a:highlight>
                 <a:ea typeface="Calibri" panose="020F0502020204030204" pitchFamily="34" charset="0"/>
                 <a:cs typeface="Times New Roman" panose="02020603050405020304" pitchFamily="18" charset="0"/>
               </a:rPr>
-              <a:t>WorldObject</a:t>
-            </a:r>
-            <a:endParaRPr lang="en-US" altLang="en-US" sz="800" dirty="0"/>
-          </a:p>
-          <a:p>
-            <a:pPr defTabSz="914400" eaLnBrk="0" fontAlgn="base" hangingPunct="0">
-              <a:spcBef>
-                <a:spcPct val="0"/>
-              </a:spcBef>
-              <a:spcAft>
-                <a:spcPct val="0"/>
-              </a:spcAft>
-            </a:pPr>
-            <a:r>
-              <a:rPr lang="en-US" altLang="en-US" sz="1100" dirty="0">
-                <a:latin typeface="Calibri" panose="020F0502020204030204" pitchFamily="34" charset="0"/>
+              <a:t>+ placed : bool</a:t>
+            </a:r>
+            <a:endParaRPr lang="en-US" altLang="en-US" sz="1100" dirty="0">
+              <a:highlight>
+                <a:srgbClr val="00FF00"/>
+              </a:highlight>
+            </a:endParaRPr>
+          </a:p>
+          <a:p>
+            <a:pPr defTabSz="914400" eaLnBrk="0" fontAlgn="base" hangingPunct="0">
+              <a:spcBef>
+                <a:spcPct val="0"/>
+              </a:spcBef>
+              <a:spcAft>
+                <a:spcPct val="0"/>
+              </a:spcAft>
+            </a:pPr>
+            <a:r>
+              <a:rPr lang="en-US" altLang="en-US" sz="1100" i="1" dirty="0">
+                <a:highlight>
+                  <a:srgbClr val="00FF00"/>
+                </a:highlight>
                 <a:ea typeface="Calibri" panose="020F0502020204030204" pitchFamily="34" charset="0"/>
                 <a:cs typeface="Times New Roman" panose="02020603050405020304" pitchFamily="18" charset="0"/>
               </a:rPr>
-              <a:t>+ bool placed</a:t>
-            </a:r>
-            <a:endParaRPr lang="en-US" altLang="en-US" sz="800" dirty="0"/>
-          </a:p>
-          <a:p>
-            <a:pPr defTabSz="914400" eaLnBrk="0" fontAlgn="base" hangingPunct="0">
-              <a:spcBef>
-                <a:spcPct val="0"/>
-              </a:spcBef>
-              <a:spcAft>
-                <a:spcPct val="0"/>
-              </a:spcAft>
-            </a:pPr>
-            <a:r>
-              <a:rPr lang="en-US" altLang="en-US" sz="1100" dirty="0">
-                <a:latin typeface="Calibri" panose="020F0502020204030204" pitchFamily="34" charset="0"/>
-                <a:ea typeface="Calibri" panose="020F0502020204030204" pitchFamily="34" charset="0"/>
-                <a:cs typeface="Times New Roman" panose="02020603050405020304" pitchFamily="18" charset="0"/>
-              </a:rPr>
-              <a:t>+ health</a:t>
-            </a:r>
-            <a:endParaRPr lang="en-US" altLang="en-US" sz="800" dirty="0"/>
-          </a:p>
-          <a:p>
-            <a:pPr defTabSz="914400" eaLnBrk="0" fontAlgn="base" hangingPunct="0">
-              <a:spcBef>
-                <a:spcPct val="0"/>
-              </a:spcBef>
-              <a:spcAft>
-                <a:spcPct val="0"/>
-              </a:spcAft>
-            </a:pPr>
-            <a:r>
-              <a:rPr lang="en-US" altLang="en-US" sz="800" dirty="0">
-                <a:latin typeface="Arial" panose="020B0604020202020204" pitchFamily="34" charset="0"/>
-                <a:cs typeface="Times New Roman" panose="02020603050405020304" pitchFamily="18" charset="0"/>
-              </a:rPr>
-              <a:t>--------</a:t>
-            </a:r>
-          </a:p>
-          <a:p>
-            <a:pPr defTabSz="914400" eaLnBrk="0" fontAlgn="base" hangingPunct="0">
-              <a:spcBef>
-                <a:spcPct val="0"/>
-              </a:spcBef>
-              <a:spcAft>
-                <a:spcPct val="0"/>
-              </a:spcAft>
-            </a:pPr>
-            <a:r>
-              <a:rPr lang="en-US" altLang="en-US" sz="800" dirty="0">
-                <a:latin typeface="Arial" panose="020B0604020202020204" pitchFamily="34" charset="0"/>
-                <a:cs typeface="Times New Roman" panose="02020603050405020304" pitchFamily="18" charset="0"/>
-              </a:rPr>
-              <a:t>+ Abstract bool </a:t>
-            </a:r>
-            <a:r>
-              <a:rPr lang="en-US" altLang="en-US" sz="800" dirty="0" err="1">
-                <a:latin typeface="Arial" panose="020B0604020202020204" pitchFamily="34" charset="0"/>
+              <a:t>-----------------------------------------------------------------</a:t>
+            </a:r>
+            <a:endParaRPr lang="en-US" altLang="en-US" sz="1100" dirty="0">
+              <a:highlight>
+                <a:srgbClr val="00FF00"/>
+              </a:highlight>
+              <a:cs typeface="Times New Roman" panose="02020603050405020304" pitchFamily="18" charset="0"/>
+            </a:endParaRPr>
+          </a:p>
+          <a:p>
+            <a:pPr defTabSz="914400" eaLnBrk="0" fontAlgn="base" hangingPunct="0">
+              <a:spcBef>
+                <a:spcPct val="0"/>
+              </a:spcBef>
+              <a:spcAft>
+                <a:spcPct val="0"/>
+              </a:spcAft>
+            </a:pPr>
+            <a:r>
+              <a:rPr lang="en-US" altLang="en-US" sz="1100" dirty="0">
+                <a:highlight>
+                  <a:srgbClr val="00FF00"/>
+                </a:highlight>
+                <a:cs typeface="Times New Roman" panose="02020603050405020304" pitchFamily="18" charset="0"/>
+              </a:rPr>
+              <a:t>+ </a:t>
+            </a:r>
+            <a:r>
+              <a:rPr lang="en-US" altLang="en-US" sz="1100" dirty="0" err="1">
+                <a:highlight>
+                  <a:srgbClr val="00FF00"/>
+                </a:highlight>
+                <a:cs typeface="Times New Roman" panose="02020603050405020304" pitchFamily="18" charset="0"/>
+              </a:rPr>
+              <a:t>GetCurrentSprite</a:t>
+            </a:r>
+            <a:r>
+              <a:rPr lang="en-US" altLang="en-US" sz="1100" dirty="0">
+                <a:highlight>
+                  <a:srgbClr val="00FF00"/>
+                </a:highlight>
+                <a:cs typeface="Times New Roman" panose="02020603050405020304" pitchFamily="18" charset="0"/>
+              </a:rPr>
+              <a:t>() : Sprite &lt;&lt;override&gt;&gt;</a:t>
+            </a:r>
+          </a:p>
+          <a:p>
+            <a:pPr defTabSz="914400" eaLnBrk="0" fontAlgn="base" hangingPunct="0">
+              <a:spcBef>
+                <a:spcPct val="0"/>
+              </a:spcBef>
+              <a:spcAft>
+                <a:spcPct val="0"/>
+              </a:spcAft>
+            </a:pPr>
+            <a:r>
+              <a:rPr lang="en-US" altLang="en-US" sz="1100" i="1" dirty="0">
+                <a:highlight>
+                  <a:srgbClr val="00FF00"/>
+                </a:highlight>
+                <a:cs typeface="Times New Roman" panose="02020603050405020304" pitchFamily="18" charset="0"/>
+              </a:rPr>
+              <a:t>+ </a:t>
+            </a:r>
+            <a:r>
+              <a:rPr lang="en-US" altLang="en-US" sz="1100" i="1" dirty="0" err="1">
+                <a:highlight>
+                  <a:srgbClr val="00FF00"/>
+                </a:highlight>
                 <a:cs typeface="Times New Roman" panose="02020603050405020304" pitchFamily="18" charset="0"/>
               </a:rPr>
               <a:t>isSpaceFree</a:t>
             </a:r>
             <a:r>
-              <a:rPr lang="en-US" altLang="en-US" sz="800" dirty="0">
-                <a:latin typeface="Arial" panose="020B0604020202020204" pitchFamily="34" charset="0"/>
-                <a:cs typeface="Times New Roman" panose="02020603050405020304" pitchFamily="18" charset="0"/>
-              </a:rPr>
-              <a:t>(Vector2 position)</a:t>
-            </a:r>
-          </a:p>
-          <a:p>
-            <a:pPr defTabSz="914400" eaLnBrk="0" fontAlgn="base" hangingPunct="0">
-              <a:spcBef>
-                <a:spcPct val="0"/>
-              </a:spcBef>
-              <a:spcAft>
-                <a:spcPct val="0"/>
-              </a:spcAft>
-            </a:pPr>
-            <a:r>
-              <a:rPr lang="en-US" altLang="en-US" sz="800" dirty="0">
-                <a:latin typeface="Arial" panose="020B0604020202020204" pitchFamily="34" charset="0"/>
-                <a:cs typeface="Times New Roman" panose="02020603050405020304" pitchFamily="18" charset="0"/>
-              </a:rPr>
-              <a:t>+ bool Place(Vector2 position)</a:t>
+              <a:rPr lang="en-US" altLang="en-US" sz="1100" i="1" dirty="0">
+                <a:highlight>
+                  <a:srgbClr val="00FF00"/>
+                </a:highlight>
+                <a:cs typeface="Times New Roman" panose="02020603050405020304" pitchFamily="18" charset="0"/>
+              </a:rPr>
+              <a:t>(Vector2Int): bool</a:t>
+            </a:r>
+          </a:p>
+          <a:p>
+            <a:pPr defTabSz="914400" eaLnBrk="0" fontAlgn="base" hangingPunct="0">
+              <a:spcBef>
+                <a:spcPct val="0"/>
+              </a:spcBef>
+              <a:spcAft>
+                <a:spcPct val="0"/>
+              </a:spcAft>
+            </a:pPr>
+            <a:r>
+              <a:rPr lang="en-US" altLang="en-US" sz="1100" i="1" dirty="0">
+                <a:highlight>
+                  <a:srgbClr val="00FF00"/>
+                </a:highlight>
+                <a:cs typeface="Times New Roman" panose="02020603050405020304" pitchFamily="18" charset="0"/>
+              </a:rPr>
+              <a:t>+ </a:t>
+            </a:r>
+            <a:r>
+              <a:rPr lang="en-US" altLang="en-US" sz="1100" i="1" dirty="0" err="1">
+                <a:highlight>
+                  <a:srgbClr val="00FF00"/>
+                </a:highlight>
+                <a:cs typeface="Times New Roman" panose="02020603050405020304" pitchFamily="18" charset="0"/>
+              </a:rPr>
+              <a:t>GetWorldObjectInventory</a:t>
+            </a:r>
+            <a:r>
+              <a:rPr lang="en-US" altLang="en-US" sz="1100" i="1" dirty="0">
+                <a:highlight>
+                  <a:srgbClr val="00FF00"/>
+                </a:highlight>
+                <a:cs typeface="Times New Roman" panose="02020603050405020304" pitchFamily="18" charset="0"/>
+              </a:rPr>
+              <a:t>(Vector2Int) : Inventory</a:t>
+            </a:r>
+          </a:p>
+          <a:p>
+            <a:pPr defTabSz="914400" eaLnBrk="0" fontAlgn="base" hangingPunct="0">
+              <a:spcBef>
+                <a:spcPct val="0"/>
+              </a:spcBef>
+              <a:spcAft>
+                <a:spcPct val="0"/>
+              </a:spcAft>
+            </a:pPr>
+            <a:r>
+              <a:rPr lang="en-US" altLang="en-US" sz="1100" dirty="0">
+                <a:highlight>
+                  <a:srgbClr val="00FF00"/>
+                </a:highlight>
+                <a:cs typeface="Times New Roman" panose="02020603050405020304" pitchFamily="18" charset="0"/>
+              </a:rPr>
+              <a:t>+ Place(Vector2Int) : bool</a:t>
+            </a:r>
+          </a:p>
+          <a:p>
+            <a:pPr defTabSz="914400" eaLnBrk="0" fontAlgn="base" hangingPunct="0">
+              <a:spcBef>
+                <a:spcPct val="0"/>
+              </a:spcBef>
+              <a:spcAft>
+                <a:spcPct val="0"/>
+              </a:spcAft>
+            </a:pPr>
+            <a:r>
+              <a:rPr lang="en-US" altLang="en-US" sz="1100" dirty="0">
+                <a:highlight>
+                  <a:srgbClr val="00FF00"/>
+                </a:highlight>
+                <a:cs typeface="Times New Roman" panose="02020603050405020304" pitchFamily="18" charset="0"/>
+              </a:rPr>
+              <a:t>+ Take(Vector2Int) : bool</a:t>
+            </a:r>
+          </a:p>
+          <a:p>
+            <a:pPr defTabSz="914400" eaLnBrk="0" fontAlgn="base" hangingPunct="0">
+              <a:spcBef>
+                <a:spcPct val="0"/>
+              </a:spcBef>
+              <a:spcAft>
+                <a:spcPct val="0"/>
+              </a:spcAft>
+            </a:pPr>
+            <a:r>
+              <a:rPr lang="en-US" altLang="en-US" sz="1100" i="1" dirty="0">
+                <a:highlight>
+                  <a:srgbClr val="00FF00"/>
+                </a:highlight>
+                <a:cs typeface="Times New Roman" panose="02020603050405020304" pitchFamily="18" charset="0"/>
+              </a:rPr>
+              <a:t>+ </a:t>
+            </a:r>
+            <a:r>
+              <a:rPr lang="en-US" altLang="en-US" sz="1100" i="1" dirty="0" err="1">
+                <a:highlight>
+                  <a:srgbClr val="00FF00"/>
+                </a:highlight>
+                <a:cs typeface="Times New Roman" panose="02020603050405020304" pitchFamily="18" charset="0"/>
+              </a:rPr>
+              <a:t>GetPathfindingCost</a:t>
+            </a:r>
+            <a:r>
+              <a:rPr lang="en-US" altLang="en-US" sz="1100" i="1" dirty="0">
+                <a:highlight>
+                  <a:srgbClr val="00FF00"/>
+                </a:highlight>
+                <a:cs typeface="Times New Roman" panose="02020603050405020304" pitchFamily="18" charset="0"/>
+              </a:rPr>
+              <a:t>() : float</a:t>
             </a:r>
           </a:p>
           <a:p>
@@ -3818,8 +4543,8 @@
         </p:nvSpPr>
         <p:spPr bwMode="auto">
           <a:xfrm>
-            <a:off x="14546038" y="1676724"/>
-            <a:ext cx="1438275" cy="590550"/>
+            <a:off x="13716818" y="1877696"/>
+            <a:ext cx="3976822" cy="1176963"/>
           </a:xfrm>
           <a:prstGeom prst="rect">
             <a:avLst/>
@@ -3853,27 +4578,175 @@
               </a:spcAft>
             </a:pPr>
             <a:r>
-              <a:rPr lang="en-US" altLang="en-US" sz="1100">
-                <a:latin typeface="Calibri" panose="020F0502020204030204" pitchFamily="34" charset="0"/>
+              <a:rPr lang="en-US" altLang="en-US" sz="1100" i="1" dirty="0">
+                <a:highlight>
+                  <a:srgbClr val="00FF00"/>
+                </a:highlight>
                 <a:ea typeface="Calibri" panose="020F0502020204030204" pitchFamily="34" charset="0"/>
                 <a:cs typeface="Times New Roman" panose="02020603050405020304" pitchFamily="18" charset="0"/>
               </a:rPr>
               <a:t>Wall</a:t>
             </a:r>
-            <a:endParaRPr lang="en-US" altLang="en-US" sz="800"/>
-          </a:p>
-          <a:p>
-            <a:pPr defTabSz="914400" eaLnBrk="0" fontAlgn="base" hangingPunct="0">
-              <a:spcBef>
-                <a:spcPct val="0"/>
-              </a:spcBef>
-              <a:spcAft>
-                <a:spcPct val="0"/>
-              </a:spcAft>
-            </a:pPr>
-            <a:endParaRPr lang="en-US" altLang="en-US" sz="1800">
-              <a:latin typeface="Arial" panose="020B0604020202020204" pitchFamily="34" charset="0"/>
+            <a:endParaRPr lang="en-US" altLang="en-US" sz="1100" i="1" dirty="0">
+              <a:highlight>
+                <a:srgbClr val="00FF00"/>
+              </a:highlight>
             </a:endParaRPr>
+          </a:p>
+          <a:p>
+            <a:pPr defTabSz="914400" eaLnBrk="0" fontAlgn="base" hangingPunct="0">
+              <a:spcBef>
+                <a:spcPct val="0"/>
+              </a:spcBef>
+              <a:spcAft>
+                <a:spcPct val="0"/>
+              </a:spcAft>
+            </a:pPr>
+            <a:r>
+              <a:rPr lang="en-US" altLang="en-US" sz="1100" dirty="0">
+                <a:highlight>
+                  <a:srgbClr val="00FF00"/>
+                </a:highlight>
+              </a:rPr>
+              <a:t>---------------------------------------------------------------------------------------</a:t>
+            </a:r>
+          </a:p>
+          <a:p>
+            <a:pPr defTabSz="914400" eaLnBrk="0" fontAlgn="base" hangingPunct="0">
+              <a:spcBef>
+                <a:spcPct val="0"/>
+              </a:spcBef>
+              <a:spcAft>
+                <a:spcPct val="0"/>
+              </a:spcAft>
+            </a:pPr>
+            <a:r>
+              <a:rPr lang="en-US" altLang="en-US" sz="1100" dirty="0">
+                <a:highlight>
+                  <a:srgbClr val="00FF00"/>
+                </a:highlight>
+              </a:rPr>
+              <a:t>+ </a:t>
+            </a:r>
+            <a:r>
+              <a:rPr lang="en-US" altLang="en-US" sz="1100" dirty="0" err="1">
+                <a:highlight>
+                  <a:srgbClr val="00FF00"/>
+                </a:highlight>
+              </a:rPr>
+              <a:t>blocksUnits</a:t>
+            </a:r>
+            <a:r>
+              <a:rPr lang="en-US" altLang="en-US" sz="1100" dirty="0">
+                <a:highlight>
+                  <a:srgbClr val="00FF00"/>
+                </a:highlight>
+              </a:rPr>
+              <a:t> : bool</a:t>
+            </a:r>
+          </a:p>
+          <a:p>
+            <a:pPr defTabSz="914400" eaLnBrk="0" fontAlgn="base" hangingPunct="0">
+              <a:spcBef>
+                <a:spcPct val="0"/>
+              </a:spcBef>
+              <a:spcAft>
+                <a:spcPct val="0"/>
+              </a:spcAft>
+            </a:pPr>
+            <a:r>
+              <a:rPr lang="en-US" altLang="en-US" sz="1100" dirty="0">
+                <a:highlight>
+                  <a:srgbClr val="00FF00"/>
+                </a:highlight>
+              </a:rPr>
+              <a:t>---------------------------------------------------------------------------------------</a:t>
+            </a:r>
+          </a:p>
+          <a:p>
+            <a:pPr defTabSz="914400" eaLnBrk="0" fontAlgn="base" hangingPunct="0">
+              <a:spcBef>
+                <a:spcPct val="0"/>
+              </a:spcBef>
+              <a:spcAft>
+                <a:spcPct val="0"/>
+              </a:spcAft>
+            </a:pPr>
+            <a:r>
+              <a:rPr lang="en-US" altLang="en-US" sz="1100" dirty="0">
+                <a:highlight>
+                  <a:srgbClr val="00FF00"/>
+                </a:highlight>
+                <a:cs typeface="Times New Roman" panose="02020603050405020304" pitchFamily="18" charset="0"/>
+              </a:rPr>
+              <a:t>+ </a:t>
+            </a:r>
+            <a:r>
+              <a:rPr lang="en-US" altLang="en-US" sz="1100" dirty="0" err="1">
+                <a:highlight>
+                  <a:srgbClr val="00FF00"/>
+                </a:highlight>
+                <a:cs typeface="Times New Roman" panose="02020603050405020304" pitchFamily="18" charset="0"/>
+              </a:rPr>
+              <a:t>isSpaceFree</a:t>
+            </a:r>
+            <a:r>
+              <a:rPr lang="en-US" altLang="en-US" sz="1100" dirty="0">
+                <a:highlight>
+                  <a:srgbClr val="00FF00"/>
+                </a:highlight>
+                <a:cs typeface="Times New Roman" panose="02020603050405020304" pitchFamily="18" charset="0"/>
+              </a:rPr>
+              <a:t>(Vector2Int): bool &lt;&lt;override&gt;&gt;</a:t>
+            </a:r>
+          </a:p>
+          <a:p>
+            <a:pPr defTabSz="914400" eaLnBrk="0" fontAlgn="base" hangingPunct="0">
+              <a:spcBef>
+                <a:spcPct val="0"/>
+              </a:spcBef>
+              <a:spcAft>
+                <a:spcPct val="0"/>
+              </a:spcAft>
+            </a:pPr>
+            <a:r>
+              <a:rPr lang="en-US" altLang="en-US" sz="1100" dirty="0">
+                <a:highlight>
+                  <a:srgbClr val="00FF00"/>
+                </a:highlight>
+                <a:cs typeface="Times New Roman" panose="02020603050405020304" pitchFamily="18" charset="0"/>
+              </a:rPr>
+              <a:t>+ </a:t>
+            </a:r>
+            <a:r>
+              <a:rPr lang="en-US" altLang="en-US" sz="1100" dirty="0" err="1">
+                <a:highlight>
+                  <a:srgbClr val="00FF00"/>
+                </a:highlight>
+                <a:cs typeface="Times New Roman" panose="02020603050405020304" pitchFamily="18" charset="0"/>
+              </a:rPr>
+              <a:t>GetWorldObjectInventory</a:t>
+            </a:r>
+            <a:r>
+              <a:rPr lang="en-US" altLang="en-US" sz="1100" dirty="0">
+                <a:highlight>
+                  <a:srgbClr val="00FF00"/>
+                </a:highlight>
+                <a:cs typeface="Times New Roman" panose="02020603050405020304" pitchFamily="18" charset="0"/>
+              </a:rPr>
+              <a:t>(Vector2Int) : Inventory &lt;&lt;override&gt;&gt;</a:t>
+            </a:r>
+          </a:p>
+          <a:p>
+            <a:pPr defTabSz="914400" eaLnBrk="0" fontAlgn="base" hangingPunct="0">
+              <a:spcBef>
+                <a:spcPct val="0"/>
+              </a:spcBef>
+              <a:spcAft>
+                <a:spcPct val="0"/>
+              </a:spcAft>
+            </a:pPr>
+            <a:endParaRPr lang="en-US" altLang="en-US" sz="1100" dirty="0"/>
           </a:p>
         </p:txBody>
       </p:sp>
@@ -3893,8 +4766,8 @@
         </p:nvSpPr>
         <p:spPr bwMode="auto">
           <a:xfrm>
-            <a:off x="14547042" y="6240609"/>
-            <a:ext cx="1438275" cy="590550"/>
+            <a:off x="13716818" y="6240608"/>
+            <a:ext cx="3976822" cy="988380"/>
           </a:xfrm>
           <a:prstGeom prst="rect">
             <a:avLst/>
@@ -3928,26 +4801,104 @@
               </a:spcAft>
             </a:pPr>
             <a:r>
-              <a:rPr lang="en-US" altLang="en-US" sz="1100">
-                <a:latin typeface="Calibri" panose="020F0502020204030204" pitchFamily="34" charset="0"/>
+              <a:rPr lang="en-US" altLang="en-US" sz="1100" i="1" dirty="0">
+                <a:highlight>
+                  <a:srgbClr val="00FF00"/>
+                </a:highlight>
                 <a:ea typeface="Calibri" panose="020F0502020204030204" pitchFamily="34" charset="0"/>
                 <a:cs typeface="Times New Roman" panose="02020603050405020304" pitchFamily="18" charset="0"/>
               </a:rPr>
               <a:t>Floor</a:t>
             </a:r>
-            <a:endParaRPr lang="en-US" altLang="en-US" sz="800"/>
-          </a:p>
-          <a:p>
-            <a:pPr defTabSz="914400" eaLnBrk="0" fontAlgn="base" hangingPunct="0">
-              <a:spcBef>
-                <a:spcPct val="0"/>
-              </a:spcBef>
-              <a:spcAft>
-                <a:spcPct val="0"/>
-              </a:spcAft>
-            </a:pPr>
-            <a:endParaRPr lang="en-US" altLang="en-US" sz="1800">
-              <a:latin typeface="Arial" panose="020B0604020202020204" pitchFamily="34" charset="0"/>
+            <a:endParaRPr lang="en-US" altLang="en-US" sz="1100" i="1" dirty="0">
+              <a:highlight>
+                <a:srgbClr val="00FF00"/>
+              </a:highlight>
+            </a:endParaRPr>
+          </a:p>
+          <a:p>
+            <a:pPr defTabSz="914400" eaLnBrk="0" fontAlgn="base" hangingPunct="0">
+              <a:spcBef>
+                <a:spcPct val="0"/>
+              </a:spcBef>
+              <a:spcAft>
+                <a:spcPct val="0"/>
+              </a:spcAft>
+            </a:pPr>
+            <a:r>
+              <a:rPr lang="en-US" altLang="en-US" sz="1100" dirty="0">
+                <a:highlight>
+                  <a:srgbClr val="00FF00"/>
+                </a:highlight>
+              </a:rPr>
+              <a:t>----------------------------------------------------------------------------------------</a:t>
+            </a:r>
+          </a:p>
+          <a:p>
+            <a:pPr defTabSz="914400" eaLnBrk="0" fontAlgn="base" hangingPunct="0">
+              <a:spcBef>
+                <a:spcPct val="0"/>
+              </a:spcBef>
+              <a:spcAft>
+                <a:spcPct val="0"/>
+              </a:spcAft>
+            </a:pPr>
+            <a:r>
+              <a:rPr lang="en-US" altLang="en-US" sz="1100" dirty="0">
+                <a:highlight>
+                  <a:srgbClr val="00FF00"/>
+                </a:highlight>
+              </a:rPr>
+              <a:t>+ </a:t>
+            </a:r>
+            <a:r>
+              <a:rPr lang="en-US" altLang="en-US" sz="1100" dirty="0" err="1">
+                <a:highlight>
+                  <a:srgbClr val="00FF00"/>
+                </a:highlight>
+              </a:rPr>
+              <a:t>canSupportWall</a:t>
+            </a:r>
+            <a:r>
+              <a:rPr lang="en-US" altLang="en-US" sz="1100" dirty="0">
+                <a:highlight>
+                  <a:srgbClr val="00FF00"/>
+                </a:highlight>
+              </a:rPr>
+              <a:t> : bool</a:t>
+            </a:r>
+          </a:p>
+          <a:p>
+            <a:pPr defTabSz="914400" eaLnBrk="0" fontAlgn="base" hangingPunct="0">
+              <a:spcBef>
+                <a:spcPct val="0"/>
+              </a:spcBef>
+              <a:spcAft>
+                <a:spcPct val="0"/>
+              </a:spcAft>
+            </a:pPr>
+            <a:r>
+              <a:rPr lang="en-US" altLang="en-US" sz="1100" dirty="0">
+                <a:highlight>
+                  <a:srgbClr val="00FF00"/>
+                </a:highlight>
+              </a:rPr>
+              <a:t>----------------------------------------------------------------------------------------</a:t>
+            </a:r>
+          </a:p>
+          <a:p>
+            <a:pPr defTabSz="914400" eaLnBrk="0" fontAlgn="base" hangingPunct="0">
+              <a:spcBef>
+                <a:spcPct val="0"/>
+              </a:spcBef>
+              <a:spcAft>
+                <a:spcPct val="0"/>
+              </a:spcAft>
+            </a:pPr>
+            <a:endParaRPr lang="en-US" altLang="en-US" sz="1100" dirty="0">
+              <a:highlight>
+                <a:srgbClr val="00FF00"/>
+              </a:highlight>
             </a:endParaRPr>
           </a:p>
         </p:txBody>
@@ -3968,7 +4919,7 @@
         </p:nvSpPr>
         <p:spPr bwMode="auto">
           <a:xfrm>
-            <a:off x="749210" y="7577157"/>
+            <a:off x="749210" y="8697297"/>
             <a:ext cx="745958" cy="600075"/>
           </a:xfrm>
           <a:prstGeom prst="rect">
@@ -4078,25 +5029,25 @@
               </a:spcAft>
             </a:pPr>
             <a:r>
-              <a:rPr lang="en-US" altLang="en-US" sz="1100">
+              <a:rPr lang="en-US" altLang="en-US" sz="1100" i="1" dirty="0">
                 <a:latin typeface="Calibri" panose="020F0502020204030204" pitchFamily="34" charset="0"/>
                 <a:ea typeface="Calibri" panose="020F0502020204030204" pitchFamily="34" charset="0"/>
                 <a:cs typeface="Times New Roman" panose="02020603050405020304" pitchFamily="18" charset="0"/>
               </a:rPr>
               <a:t>Unit</a:t>
             </a:r>
-            <a:endParaRPr lang="en-US" altLang="en-US" sz="800"/>
-          </a:p>
-          <a:p>
-            <a:pPr defTabSz="914400" eaLnBrk="0" fontAlgn="base" hangingPunct="0">
-              <a:spcBef>
-                <a:spcPct val="0"/>
-              </a:spcBef>
-              <a:spcAft>
-                <a:spcPct val="0"/>
-              </a:spcAft>
-            </a:pPr>
-            <a:endParaRPr lang="en-US" altLang="en-US" sz="1800">
+            <a:endParaRPr lang="en-US" altLang="en-US" sz="800" i="1" dirty="0"/>
+          </a:p>
+          <a:p>
+            <a:pPr defTabSz="914400" eaLnBrk="0" fontAlgn="base" hangingPunct="0">
+              <a:spcBef>
+                <a:spcPct val="0"/>
+              </a:spcBef>
+              <a:spcAft>
+                <a:spcPct val="0"/>
+              </a:spcAft>
+            </a:pPr>
+            <a:endParaRPr lang="en-US" altLang="en-US" sz="1800" dirty="0">
               <a:latin typeface="Arial" panose="020B0604020202020204" pitchFamily="34" charset="0"/>
             </a:endParaRPr>
           </a:p>
@@ -4120,8 +5071,8 @@
         </p:nvCxnSpPr>
         <p:spPr>
           <a:xfrm flipV="1">
-            <a:off x="6431380" y="4398639"/>
-            <a:ext cx="1741069" cy="508715"/>
+            <a:off x="5825233" y="3655455"/>
+            <a:ext cx="3104363" cy="1516938"/>
           </a:xfrm>
           <a:prstGeom prst="bentConnector3">
             <a:avLst/>
@@ -4163,12 +5114,12 @@
         </p:nvCxnSpPr>
         <p:spPr>
           <a:xfrm>
-            <a:off x="11150600" y="4398639"/>
-            <a:ext cx="3396442" cy="2137245"/>
+            <a:off x="12094565" y="3655455"/>
+            <a:ext cx="1622253" cy="3079343"/>
           </a:xfrm>
           <a:prstGeom prst="bentConnector3">
             <a:avLst>
-              <a:gd name="adj1" fmla="val 32800"/>
+              <a:gd name="adj1" fmla="val 50000"/>
             </a:avLst>
           </a:prstGeom>
           <a:ln>
@@ -4208,12 +5159,12 @@
         </p:nvCxnSpPr>
         <p:spPr>
           <a:xfrm flipV="1">
-            <a:off x="11150600" y="1971999"/>
-            <a:ext cx="3395438" cy="2426640"/>
+            <a:off x="12094565" y="2466178"/>
+            <a:ext cx="1622253" cy="1189277"/>
           </a:xfrm>
           <a:prstGeom prst="bentConnector3">
             <a:avLst>
-              <a:gd name="adj1" fmla="val 32421"/>
+              <a:gd name="adj1" fmla="val 50000"/>
             </a:avLst>
           </a:prstGeom>
           <a:ln>
@@ -4253,8 +5204,8 @@
         </p:nvCxnSpPr>
         <p:spPr>
           <a:xfrm rot="16200000" flipH="1">
-            <a:off x="9579692" y="6322441"/>
-            <a:ext cx="1541465" cy="1377799"/>
+            <a:off x="9261785" y="6004535"/>
+            <a:ext cx="3027834" cy="527243"/>
           </a:xfrm>
           <a:prstGeom prst="bentConnector3">
             <a:avLst>
@@ -4296,7 +5247,7 @@
         </p:nvSpPr>
         <p:spPr bwMode="auto">
           <a:xfrm>
-            <a:off x="1868147" y="7572413"/>
+            <a:off x="1868147" y="8692553"/>
             <a:ext cx="745958" cy="600075"/>
           </a:xfrm>
           <a:prstGeom prst="rect">
@@ -4371,7 +5322,7 @@
         </p:nvSpPr>
         <p:spPr bwMode="auto">
           <a:xfrm>
-            <a:off x="3132907" y="7562926"/>
+            <a:off x="3132907" y="8683066"/>
             <a:ext cx="745958" cy="600075"/>
           </a:xfrm>
           <a:prstGeom prst="rect">
@@ -4447,11 +5398,13 @@
         </p:nvCxnSpPr>
         <p:spPr>
           <a:xfrm rot="5400000">
-            <a:off x="2644460" y="5548601"/>
-            <a:ext cx="506285" cy="3550826"/>
+            <a:off x="1892140" y="6831000"/>
+            <a:ext cx="1096346" cy="2636248"/>
           </a:xfrm>
           <a:prstGeom prst="bentConnector3">
-            <a:avLst/>
+            <a:avLst>
+              <a:gd name="adj1" fmla="val 50000"/>
+            </a:avLst>
           </a:prstGeom>
           <a:ln>
             <a:tailEnd type="triangle"/>
@@ -4490,8 +5443,8 @@
         </p:nvCxnSpPr>
         <p:spPr>
           <a:xfrm rot="5400000">
-            <a:off x="3206301" y="6105698"/>
-            <a:ext cx="501541" cy="2431889"/>
+            <a:off x="2453981" y="7388097"/>
+            <a:ext cx="1091602" cy="1517311"/>
           </a:xfrm>
           <a:prstGeom prst="bentConnector3">
             <a:avLst>
@@ -4535,8 +5488,8 @@
         </p:nvCxnSpPr>
         <p:spPr>
           <a:xfrm rot="5400000">
-            <a:off x="3843424" y="6733335"/>
-            <a:ext cx="492054" cy="1167129"/>
+            <a:off x="3091105" y="8015733"/>
+            <a:ext cx="1082115" cy="252551"/>
           </a:xfrm>
           <a:prstGeom prst="bentConnector3">
             <a:avLst>
@@ -4717,7 +5670,7 @@
         </p:nvSpPr>
         <p:spPr bwMode="auto">
           <a:xfrm>
-            <a:off x="13260557" y="3120626"/>
+            <a:off x="13260557" y="3765860"/>
             <a:ext cx="1846093" cy="711201"/>
           </a:xfrm>
           <a:prstGeom prst="rect">
@@ -4833,321 +5786,8 @@
         </p:nvCxnSpPr>
         <p:spPr>
           <a:xfrm rot="5400000">
-            <a:off x="14297714" y="2153164"/>
-            <a:ext cx="853352" cy="1081572"/>
-          </a:xfrm>
-          <a:prstGeom prst="bentConnector3">
-            <a:avLst/>
-          </a:prstGeom>
-          <a:ln>
-            <a:tailEnd type="triangle"/>
-          </a:ln>
-        </p:spPr>
-        <p:style>
-          <a:lnRef idx="1">
-            <a:schemeClr val="accent1"/>
-          </a:lnRef>
-          <a:fillRef idx="0">
-            <a:schemeClr val="accent1"/>
-          </a:fillRef>
-          <a:effectRef idx="0">
-            <a:schemeClr val="accent1"/>
-          </a:effectRef>
-          <a:fontRef idx="minor">
-            <a:schemeClr val="tx1"/>
-          </a:fontRef>
-        </p:style>
-      </p:cxnSp>
-      <p:sp>
-        <p:nvSpPr>
-          <p:cNvPr id="55" name="Text Box 1">
-            <a:extLst>
-              <a:ext uri="{FF2B5EF4-FFF2-40B4-BE49-F238E27FC236}">
-                <a16:creationId xmlns:a16="http://schemas.microsoft.com/office/drawing/2014/main" id="{2B55F062-370C-4724-BD09-0AFF6A2FAF48}"/>
-              </a:ext>
-            </a:extLst>
-          </p:cNvPr>
-          <p:cNvSpPr txBox="1">
-            <a:spLocks noChangeArrowheads="1"/>
-          </p:cNvSpPr>
-          <p:nvPr/>
-        </p:nvSpPr>
-        <p:spPr bwMode="auto">
-          <a:xfrm>
-            <a:off x="13621568" y="7073580"/>
-            <a:ext cx="1533525" cy="711201"/>
-          </a:xfrm>
-          <a:prstGeom prst="rect">
-            <a:avLst/>
-          </a:prstGeom>
-          <a:solidFill>
-            <a:srgbClr val="FFFFFF"/>
-          </a:solidFill>
-          <a:ln w="9525">
-            <a:solidFill>
-              <a:srgbClr val="000000"/>
-            </a:solidFill>
-            <a:miter lim="800000"/>
-            <a:headEnd/>
-            <a:tailEnd/>
-          </a:ln>
-        </p:spPr>
-        <p:txBody>
-          <a:bodyPr vert="horz" wrap="square" lIns="91440" tIns="45720" rIns="91440" bIns="45720" numCol="1" anchor="t" anchorCtr="0" compatLnSpc="1">
-            <a:prstTxWarp prst="textNoShape">
-              <a:avLst/>
-            </a:prstTxWarp>
-          </a:bodyPr>
-          <a:lstStyle/>
-          <a:p>
-            <a:pPr defTabSz="914400" eaLnBrk="0" fontAlgn="base" hangingPunct="0">
-              <a:spcBef>
-                <a:spcPct val="0"/>
-              </a:spcBef>
-              <a:spcAft>
-                <a:spcPct val="0"/>
-              </a:spcAft>
-            </a:pPr>
-            <a:r>
-              <a:rPr lang="en-US" altLang="en-US" sz="1100" dirty="0" err="1">
-                <a:latin typeface="Calibri" panose="020F0502020204030204" pitchFamily="34" charset="0"/>
-                <a:ea typeface="Calibri" panose="020F0502020204030204" pitchFamily="34" charset="0"/>
-                <a:cs typeface="Times New Roman" panose="02020603050405020304" pitchFamily="18" charset="0"/>
-              </a:rPr>
-              <a:t>FloorSnappable</a:t>
-            </a:r>
-            <a:endParaRPr lang="en-US" altLang="en-US" sz="1100" dirty="0">
-              <a:latin typeface="Calibri" panose="020F0502020204030204" pitchFamily="34" charset="0"/>
-              <a:ea typeface="Calibri" panose="020F0502020204030204" pitchFamily="34" charset="0"/>
-              <a:cs typeface="Times New Roman" panose="02020603050405020304" pitchFamily="18" charset="0"/>
-            </a:endParaRPr>
-          </a:p>
-          <a:p>
-            <a:pPr defTabSz="914400" eaLnBrk="0" fontAlgn="base" hangingPunct="0">
-              <a:spcBef>
-                <a:spcPct val="0"/>
-              </a:spcBef>
-              <a:spcAft>
-                <a:spcPct val="0"/>
-              </a:spcAft>
-            </a:pPr>
-            <a:r>
-              <a:rPr lang="en-US" altLang="en-US" sz="1100" dirty="0">
-                <a:latin typeface="Calibri" panose="020F0502020204030204" pitchFamily="34" charset="0"/>
-                <a:cs typeface="Times New Roman" panose="02020603050405020304" pitchFamily="18" charset="0"/>
-              </a:rPr>
-              <a:t>---------------------------</a:t>
-            </a:r>
-          </a:p>
-          <a:p>
-            <a:pPr defTabSz="914400" eaLnBrk="0" fontAlgn="base" hangingPunct="0">
-              <a:spcBef>
-                <a:spcPct val="0"/>
-              </a:spcBef>
-              <a:spcAft>
-                <a:spcPct val="0"/>
-              </a:spcAft>
-            </a:pPr>
-            <a:r>
-              <a:rPr lang="en-US" altLang="en-US" sz="1100" dirty="0">
-                <a:latin typeface="Calibri" panose="020F0502020204030204" pitchFamily="34" charset="0"/>
-                <a:cs typeface="Times New Roman" panose="02020603050405020304" pitchFamily="18" charset="0"/>
-              </a:rPr>
-              <a:t>Floors that have sprites that snap to each other</a:t>
-            </a:r>
-            <a:endParaRPr lang="en-US" altLang="en-US" sz="800" dirty="0"/>
-          </a:p>
-          <a:p>
-            <a:pPr defTabSz="914400" eaLnBrk="0" fontAlgn="base" hangingPunct="0">
-              <a:spcBef>
-                <a:spcPct val="0"/>
-              </a:spcBef>
-              <a:spcAft>
-                <a:spcPct val="0"/>
-              </a:spcAft>
-            </a:pPr>
-            <a:endParaRPr lang="en-US" altLang="en-US" sz="1800" dirty="0">
-              <a:latin typeface="Arial" panose="020B0604020202020204" pitchFamily="34" charset="0"/>
-            </a:endParaRPr>
-          </a:p>
-        </p:txBody>
-      </p:sp>
-      <p:cxnSp>
-        <p:nvCxnSpPr>
-          <p:cNvPr id="57" name="Connector: Elbow 56">
-            <a:extLst>
-              <a:ext uri="{FF2B5EF4-FFF2-40B4-BE49-F238E27FC236}">
-                <a16:creationId xmlns:a16="http://schemas.microsoft.com/office/drawing/2014/main" id="{410F9EC9-1A3D-4A92-8881-A7001F749C21}"/>
-              </a:ext>
-            </a:extLst>
-          </p:cNvPr>
-          <p:cNvCxnSpPr>
-            <a:stCxn id="7" idx="2"/>
-            <a:endCxn id="55" idx="0"/>
-          </p:cNvCxnSpPr>
-          <p:nvPr/>
-        </p:nvCxnSpPr>
-        <p:spPr>
-          <a:xfrm rot="5400000">
-            <a:off x="14706046" y="6513445"/>
-            <a:ext cx="242421" cy="877849"/>
-          </a:xfrm>
-          <a:prstGeom prst="bentConnector3">
-            <a:avLst/>
-          </a:prstGeom>
-          <a:ln>
-            <a:tailEnd type="triangle"/>
-          </a:ln>
-        </p:spPr>
-        <p:style>
-          <a:lnRef idx="1">
-            <a:schemeClr val="accent1"/>
-          </a:lnRef>
-          <a:fillRef idx="0">
-            <a:schemeClr val="accent1"/>
-          </a:fillRef>
-          <a:effectRef idx="0">
-            <a:schemeClr val="accent1"/>
-          </a:effectRef>
-          <a:fontRef idx="minor">
-            <a:schemeClr val="tx1"/>
-          </a:fontRef>
-        </p:style>
-      </p:cxnSp>
-      <p:sp>
-        <p:nvSpPr>
-          <p:cNvPr id="59" name="Text Box 1">
-            <a:extLst>
-              <a:ext uri="{FF2B5EF4-FFF2-40B4-BE49-F238E27FC236}">
-                <a16:creationId xmlns:a16="http://schemas.microsoft.com/office/drawing/2014/main" id="{1EFCB648-148F-467A-86C3-B3C825DB8C4C}"/>
-              </a:ext>
-            </a:extLst>
-          </p:cNvPr>
-          <p:cNvSpPr txBox="1">
-            <a:spLocks noChangeArrowheads="1"/>
-          </p:cNvSpPr>
-          <p:nvPr/>
-        </p:nvSpPr>
-        <p:spPr bwMode="auto">
-          <a:xfrm>
-            <a:off x="15393764" y="7070872"/>
-            <a:ext cx="1533525" cy="711201"/>
-          </a:xfrm>
-          <a:prstGeom prst="rect">
-            <a:avLst/>
-          </a:prstGeom>
-          <a:solidFill>
-            <a:srgbClr val="FFFFFF"/>
-          </a:solidFill>
-          <a:ln w="9525">
-            <a:solidFill>
-              <a:srgbClr val="000000"/>
-            </a:solidFill>
-            <a:miter lim="800000"/>
-            <a:headEnd/>
-            <a:tailEnd/>
-          </a:ln>
-        </p:spPr>
-        <p:txBody>
-          <a:bodyPr vert="horz" wrap="square" lIns="91440" tIns="45720" rIns="91440" bIns="45720" numCol="1" anchor="t" anchorCtr="0" compatLnSpc="1">
-            <a:prstTxWarp prst="textNoShape">
-              <a:avLst/>
-            </a:prstTxWarp>
-          </a:bodyPr>
-          <a:lstStyle/>
-          <a:p>
-            <a:pPr defTabSz="914400" eaLnBrk="0" fontAlgn="base" hangingPunct="0">
-              <a:spcBef>
-                <a:spcPct val="0"/>
-              </a:spcBef>
-              <a:spcAft>
-                <a:spcPct val="0"/>
-              </a:spcAft>
-            </a:pPr>
-            <a:r>
-              <a:rPr lang="en-US" altLang="en-US" sz="1100" dirty="0" err="1">
-                <a:latin typeface="Calibri" panose="020F0502020204030204" pitchFamily="34" charset="0"/>
-                <a:ea typeface="Calibri" panose="020F0502020204030204" pitchFamily="34" charset="0"/>
-                <a:cs typeface="Times New Roman" panose="02020603050405020304" pitchFamily="18" charset="0"/>
-              </a:rPr>
-              <a:t>PitSnappable</a:t>
-            </a:r>
-            <a:endParaRPr lang="en-US" altLang="en-US" sz="1100" dirty="0">
-              <a:latin typeface="Calibri" panose="020F0502020204030204" pitchFamily="34" charset="0"/>
-              <a:ea typeface="Calibri" panose="020F0502020204030204" pitchFamily="34" charset="0"/>
-              <a:cs typeface="Times New Roman" panose="02020603050405020304" pitchFamily="18" charset="0"/>
-            </a:endParaRPr>
-          </a:p>
-          <a:p>
-            <a:pPr defTabSz="914400" eaLnBrk="0" fontAlgn="base" hangingPunct="0">
-              <a:spcBef>
-                <a:spcPct val="0"/>
-              </a:spcBef>
-              <a:spcAft>
-                <a:spcPct val="0"/>
-              </a:spcAft>
-            </a:pPr>
-            <a:r>
-              <a:rPr lang="en-US" altLang="en-US" sz="1100" dirty="0">
-                <a:latin typeface="Calibri" panose="020F0502020204030204" pitchFamily="34" charset="0"/>
-                <a:cs typeface="Times New Roman" panose="02020603050405020304" pitchFamily="18" charset="0"/>
-              </a:rPr>
-              <a:t>---------------------------</a:t>
-            </a:r>
-          </a:p>
-          <a:p>
-            <a:pPr defTabSz="914400" eaLnBrk="0" fontAlgn="base" hangingPunct="0">
-              <a:spcBef>
-                <a:spcPct val="0"/>
-              </a:spcBef>
-              <a:spcAft>
-                <a:spcPct val="0"/>
-              </a:spcAft>
-            </a:pPr>
-            <a:r>
-              <a:rPr lang="en-US" altLang="en-US" sz="1100" dirty="0">
-                <a:latin typeface="Calibri" panose="020F0502020204030204" pitchFamily="34" charset="0"/>
-                <a:cs typeface="Times New Roman" panose="02020603050405020304" pitchFamily="18" charset="0"/>
-              </a:rPr>
-              <a:t>Pits that have sprites that snap to each other</a:t>
-            </a:r>
-            <a:endParaRPr lang="en-US" altLang="en-US" sz="800" dirty="0"/>
-          </a:p>
-          <a:p>
-            <a:pPr defTabSz="914400" eaLnBrk="0" fontAlgn="base" hangingPunct="0">
-              <a:spcBef>
-                <a:spcPct val="0"/>
-              </a:spcBef>
-              <a:spcAft>
-                <a:spcPct val="0"/>
-              </a:spcAft>
-            </a:pPr>
-            <a:endParaRPr lang="en-US" altLang="en-US" sz="1800" dirty="0">
-              <a:latin typeface="Arial" panose="020B0604020202020204" pitchFamily="34" charset="0"/>
-            </a:endParaRPr>
-          </a:p>
-        </p:txBody>
-      </p:sp>
-      <p:cxnSp>
-        <p:nvCxnSpPr>
-          <p:cNvPr id="62" name="Connector: Elbow 61">
-            <a:extLst>
-              <a:ext uri="{FF2B5EF4-FFF2-40B4-BE49-F238E27FC236}">
-                <a16:creationId xmlns:a16="http://schemas.microsoft.com/office/drawing/2014/main" id="{05DBCBC5-BCDC-4711-9A21-1555A2B7941F}"/>
-              </a:ext>
-            </a:extLst>
-          </p:cNvPr>
-          <p:cNvCxnSpPr>
-            <a:cxnSpLocks/>
-            <a:stCxn id="7" idx="2"/>
-            <a:endCxn id="59" idx="0"/>
-          </p:cNvCxnSpPr>
-          <p:nvPr/>
-        </p:nvCxnSpPr>
-        <p:spPr>
-          <a:xfrm rot="16200000" flipH="1">
-            <a:off x="15593496" y="6503842"/>
-            <a:ext cx="239712" cy="894347"/>
+            <a:off x="14588817" y="2649447"/>
+            <a:ext cx="711201" cy="1521625"/>
           </a:xfrm>
           <a:prstGeom prst="bentConnector3">
             <a:avLst>
@@ -5175,10 +5815,10 @@
       </p:cxnSp>
       <p:sp>
         <p:nvSpPr>
-          <p:cNvPr id="70" name="Text Box 1">
+          <p:cNvPr id="55" name="Text Box 1">
             <a:extLst>
               <a:ext uri="{FF2B5EF4-FFF2-40B4-BE49-F238E27FC236}">
-                <a16:creationId xmlns:a16="http://schemas.microsoft.com/office/drawing/2014/main" id="{228ACAEE-0497-40A7-A0E3-920D949AD19D}"/>
+                <a16:creationId xmlns:a16="http://schemas.microsoft.com/office/drawing/2014/main" id="{2B55F062-370C-4724-BD09-0AFF6A2FAF48}"/>
               </a:ext>
             </a:extLst>
           </p:cNvPr>
@@ -5189,8 +5829,8 @@
         </p:nvSpPr>
         <p:spPr bwMode="auto">
           <a:xfrm>
-            <a:off x="15706726" y="3120626"/>
-            <a:ext cx="2331984" cy="988380"/>
+            <a:off x="14108240" y="8181656"/>
+            <a:ext cx="1533525" cy="711201"/>
           </a:xfrm>
           <a:prstGeom prst="rect">
             <a:avLst/>
@@ -5229,7 +5869,7 @@
                 <a:ea typeface="Calibri" panose="020F0502020204030204" pitchFamily="34" charset="0"/>
                 <a:cs typeface="Times New Roman" panose="02020603050405020304" pitchFamily="18" charset="0"/>
               </a:rPr>
-              <a:t>FenceSnappable</a:t>
+              <a:t>FloorSnappable</a:t>
             </a:r>
             <a:endParaRPr lang="en-US" altLang="en-US" sz="1100" dirty="0">
               <a:latin typeface="Calibri" panose="020F0502020204030204" pitchFamily="34" charset="0"/>
@@ -5268,7 +5908,7 @@
                 <a:latin typeface="Calibri" panose="020F0502020204030204" pitchFamily="34" charset="0"/>
                 <a:cs typeface="Times New Roman" panose="02020603050405020304" pitchFamily="18" charset="0"/>
               </a:rPr>
-              <a:t>Walls that have sprites that snap to each other but in a fence fashion.</a:t>
+              <a:t>Floors that have sprites that snap to each other</a:t>
             </a:r>
             <a:endParaRPr lang="en-US" altLang="en-US" sz="800" dirty="0"/>
           </a:p>
@@ -5289,24 +5929,181 @@
       </p:sp>
       <p:cxnSp>
         <p:nvCxnSpPr>
-          <p:cNvPr id="71" name="Connector: Elbow 70">
+          <p:cNvPr id="57" name="Connector: Elbow 56">
             <a:extLst>
               <a:ext uri="{FF2B5EF4-FFF2-40B4-BE49-F238E27FC236}">
-                <a16:creationId xmlns:a16="http://schemas.microsoft.com/office/drawing/2014/main" id="{23DA0303-62E1-4AB7-88B1-9A2CA4D16A5C}"/>
+                <a16:creationId xmlns:a16="http://schemas.microsoft.com/office/drawing/2014/main" id="{410F9EC9-1A3D-4A92-8881-A7001F749C21}"/>
               </a:ext>
             </a:extLst>
           </p:cNvPr>
           <p:cNvCxnSpPr>
             <a:cxnSpLocks/>
-            <a:stCxn id="6" idx="2"/>
-            <a:endCxn id="70" idx="0"/>
+            <a:stCxn id="7" idx="2"/>
+            <a:endCxn id="55" idx="0"/>
+          </p:cNvCxnSpPr>
+          <p:nvPr/>
+        </p:nvCxnSpPr>
+        <p:spPr>
+          <a:xfrm rot="5400000">
+            <a:off x="14813782" y="7290209"/>
+            <a:ext cx="952668" cy="830226"/>
+          </a:xfrm>
+          <a:prstGeom prst="bentConnector3">
+            <a:avLst/>
+          </a:prstGeom>
+          <a:ln>
+            <a:tailEnd type="triangle"/>
+          </a:ln>
+        </p:spPr>
+        <p:style>
+          <a:lnRef idx="1">
+            <a:schemeClr val="accent1"/>
+          </a:lnRef>
+          <a:fillRef idx="0">
+            <a:schemeClr val="accent1"/>
+          </a:fillRef>
+          <a:effectRef idx="0">
+            <a:schemeClr val="accent1"/>
+          </a:effectRef>
+          <a:fontRef idx="minor">
+            <a:schemeClr val="tx1"/>
+          </a:fontRef>
+        </p:style>
+      </p:cxnSp>
+      <p:sp>
+        <p:nvSpPr>
+          <p:cNvPr id="59" name="Text Box 1">
+            <a:extLst>
+              <a:ext uri="{FF2B5EF4-FFF2-40B4-BE49-F238E27FC236}">
+                <a16:creationId xmlns:a16="http://schemas.microsoft.com/office/drawing/2014/main" id="{1EFCB648-148F-467A-86C3-B3C825DB8C4C}"/>
+              </a:ext>
+            </a:extLst>
+          </p:cNvPr>
+          <p:cNvSpPr txBox="1">
+            <a:spLocks noChangeArrowheads="1"/>
+          </p:cNvSpPr>
+          <p:nvPr/>
+        </p:nvSpPr>
+        <p:spPr bwMode="auto">
+          <a:xfrm>
+            <a:off x="15880436" y="8178948"/>
+            <a:ext cx="1533525" cy="711201"/>
+          </a:xfrm>
+          <a:prstGeom prst="rect">
+            <a:avLst/>
+          </a:prstGeom>
+          <a:solidFill>
+            <a:srgbClr val="FFFFFF"/>
+          </a:solidFill>
+          <a:ln w="9525">
+            <a:solidFill>
+              <a:srgbClr val="000000"/>
+            </a:solidFill>
+            <a:miter lim="800000"/>
+            <a:headEnd/>
+            <a:tailEnd/>
+          </a:ln>
+        </p:spPr>
+        <p:txBody>
+          <a:bodyPr vert="horz" wrap="square" lIns="91440" tIns="45720" rIns="91440" bIns="45720" numCol="1" anchor="t" anchorCtr="0" compatLnSpc="1">
+            <a:prstTxWarp prst="textNoShape">
+              <a:avLst/>
+            </a:prstTxWarp>
+          </a:bodyPr>
+          <a:lstStyle/>
+          <a:p>
+            <a:pPr defTabSz="914400" eaLnBrk="0" fontAlgn="base" hangingPunct="0">
+              <a:spcBef>
+                <a:spcPct val="0"/>
+              </a:spcBef>
+              <a:spcAft>
+                <a:spcPct val="0"/>
+              </a:spcAft>
+            </a:pPr>
+            <a:r>
+              <a:rPr lang="en-US" altLang="en-US" sz="1100" dirty="0" err="1">
+                <a:latin typeface="Calibri" panose="020F0502020204030204" pitchFamily="34" charset="0"/>
+                <a:ea typeface="Calibri" panose="020F0502020204030204" pitchFamily="34" charset="0"/>
+                <a:cs typeface="Times New Roman" panose="02020603050405020304" pitchFamily="18" charset="0"/>
+              </a:rPr>
+              <a:t>PitSnappable</a:t>
+            </a:r>
+            <a:endParaRPr lang="en-US" altLang="en-US" sz="1100" dirty="0">
+              <a:latin typeface="Calibri" panose="020F0502020204030204" pitchFamily="34" charset="0"/>
+              <a:ea typeface="Calibri" panose="020F0502020204030204" pitchFamily="34" charset="0"/>
+              <a:cs typeface="Times New Roman" panose="02020603050405020304" pitchFamily="18" charset="0"/>
+            </a:endParaRPr>
+          </a:p>
+          <a:p>
+            <a:pPr defTabSz="914400" eaLnBrk="0" fontAlgn="base" hangingPunct="0">
+              <a:spcBef>
+                <a:spcPct val="0"/>
+              </a:spcBef>
+              <a:spcAft>
+                <a:spcPct val="0"/>
+              </a:spcAft>
+            </a:pPr>
+            <a:r>
+              <a:rPr lang="en-US" altLang="en-US" sz="1100" dirty="0">
+                <a:latin typeface="Calibri" panose="020F0502020204030204" pitchFamily="34" charset="0"/>
+                <a:cs typeface="Times New Roman" panose="02020603050405020304" pitchFamily="18" charset="0"/>
+              </a:rPr>
+              <a:t>---------------------------</a:t>
+            </a:r>
+          </a:p>
+          <a:p>
+            <a:pPr defTabSz="914400" eaLnBrk="0" fontAlgn="base" hangingPunct="0">
+              <a:spcBef>
+                <a:spcPct val="0"/>
+              </a:spcBef>
+              <a:spcAft>
+                <a:spcPct val="0"/>
+              </a:spcAft>
+            </a:pPr>
+            <a:r>
+              <a:rPr lang="en-US" altLang="en-US" sz="1100" dirty="0">
+                <a:latin typeface="Calibri" panose="020F0502020204030204" pitchFamily="34" charset="0"/>
+                <a:cs typeface="Times New Roman" panose="02020603050405020304" pitchFamily="18" charset="0"/>
+              </a:rPr>
+              <a:t>Pits that have sprites that snap to each other</a:t>
+            </a:r>
+            <a:endParaRPr lang="en-US" altLang="en-US" sz="800" dirty="0"/>
+          </a:p>
+          <a:p>
+            <a:pPr defTabSz="914400" eaLnBrk="0" fontAlgn="base" hangingPunct="0">
+              <a:spcBef>
+                <a:spcPct val="0"/>
+              </a:spcBef>
+              <a:spcAft>
+                <a:spcPct val="0"/>
+              </a:spcAft>
+            </a:pPr>
+            <a:endParaRPr lang="en-US" altLang="en-US" sz="1800" dirty="0">
+              <a:latin typeface="Arial" panose="020B0604020202020204" pitchFamily="34" charset="0"/>
+            </a:endParaRPr>
+          </a:p>
+        </p:txBody>
+      </p:sp>
+      <p:cxnSp>
+        <p:nvCxnSpPr>
+          <p:cNvPr id="62" name="Connector: Elbow 61">
+            <a:extLst>
+              <a:ext uri="{FF2B5EF4-FFF2-40B4-BE49-F238E27FC236}">
+                <a16:creationId xmlns:a16="http://schemas.microsoft.com/office/drawing/2014/main" id="{05DBCBC5-BCDC-4711-9A21-1555A2B7941F}"/>
+              </a:ext>
+            </a:extLst>
+          </p:cNvPr>
+          <p:cNvCxnSpPr>
+            <a:cxnSpLocks/>
+            <a:stCxn id="7" idx="2"/>
+            <a:endCxn id="59" idx="0"/>
           </p:cNvCxnSpPr>
           <p:nvPr/>
         </p:nvCxnSpPr>
         <p:spPr>
           <a:xfrm rot="16200000" flipH="1">
-            <a:off x="15642271" y="1890179"/>
-            <a:ext cx="853352" cy="1607542"/>
+            <a:off x="15701234" y="7232983"/>
+            <a:ext cx="949960" cy="941970"/>
           </a:xfrm>
           <a:prstGeom prst="bentConnector3">
             <a:avLst>
@@ -5334,10 +6131,10 @@
       </p:cxnSp>
       <p:sp>
         <p:nvSpPr>
-          <p:cNvPr id="56" name="Text Box 8">
+          <p:cNvPr id="70" name="Text Box 1">
             <a:extLst>
               <a:ext uri="{FF2B5EF4-FFF2-40B4-BE49-F238E27FC236}">
-                <a16:creationId xmlns:a16="http://schemas.microsoft.com/office/drawing/2014/main" id="{E4947114-1F88-4047-9094-DD1417F12627}"/>
+                <a16:creationId xmlns:a16="http://schemas.microsoft.com/office/drawing/2014/main" id="{228ACAEE-0497-40A7-A0E3-920D949AD19D}"/>
               </a:ext>
             </a:extLst>
           </p:cNvPr>
@@ -5348,8 +6145,8 @@
         </p:nvSpPr>
         <p:spPr bwMode="auto">
           <a:xfrm>
-            <a:off x="5825233" y="7572413"/>
-            <a:ext cx="745958" cy="600075"/>
+            <a:off x="15706726" y="3765860"/>
+            <a:ext cx="2331984" cy="988380"/>
           </a:xfrm>
           <a:prstGeom prst="rect">
             <a:avLst/>
@@ -5383,11 +6180,51 @@
               </a:spcAft>
             </a:pPr>
             <a:r>
-              <a:rPr lang="en-US" altLang="en-US" sz="1100" dirty="0">
-                <a:latin typeface="Calibri" panose="020F0502020204030204" pitchFamily="34" charset="0"/>
-                <a:cs typeface="Times New Roman" panose="02020603050405020304" pitchFamily="18" charset="0"/>
-              </a:rPr>
-              <a:t>Wand</a:t>
+              <a:rPr lang="en-US" altLang="en-US" sz="1100" dirty="0" err="1">
+                <a:latin typeface="Calibri" panose="020F0502020204030204" pitchFamily="34" charset="0"/>
+                <a:ea typeface="Calibri" panose="020F0502020204030204" pitchFamily="34" charset="0"/>
+                <a:cs typeface="Times New Roman" panose="02020603050405020304" pitchFamily="18" charset="0"/>
+              </a:rPr>
+              <a:t>FenceSnappable</a:t>
+            </a:r>
+            <a:endParaRPr lang="en-US" altLang="en-US" sz="1100" dirty="0">
+              <a:latin typeface="Calibri" panose="020F0502020204030204" pitchFamily="34" charset="0"/>
+              <a:ea typeface="Calibri" panose="020F0502020204030204" pitchFamily="34" charset="0"/>
+              <a:cs typeface="Times New Roman" panose="02020603050405020304" pitchFamily="18" charset="0"/>
+            </a:endParaRPr>
+          </a:p>
+          <a:p>
+            <a:pPr defTabSz="914400" eaLnBrk="0" fontAlgn="base" hangingPunct="0">
+              <a:spcBef>
+                <a:spcPct val="0"/>
+              </a:spcBef>
+              <a:spcAft>
+                <a:spcPct val="0"/>
+              </a:spcAft>
+            </a:pPr>
+            <a:r>
+              <a:rPr lang="en-US" altLang="en-US" sz="1100" dirty="0">
+                <a:latin typeface="Calibri" panose="020F0502020204030204" pitchFamily="34" charset="0"/>
+                <a:cs typeface="Times New Roman" panose="02020603050405020304" pitchFamily="18" charset="0"/>
+              </a:rPr>
+              <a:t>---------------------------</a:t>
+            </a:r>
+          </a:p>
+          <a:p>
+            <a:pPr defTabSz="914400" eaLnBrk="0" fontAlgn="base" hangingPunct="0">
+              <a:spcBef>
+                <a:spcPct val="0"/>
+              </a:spcBef>
+              <a:spcAft>
+                <a:spcPct val="0"/>
+              </a:spcAft>
+            </a:pPr>
+            <a:r>
+              <a:rPr lang="en-US" altLang="en-US" sz="1100" dirty="0">
+                <a:latin typeface="Calibri" panose="020F0502020204030204" pitchFamily="34" charset="0"/>
+                <a:cs typeface="Times New Roman" panose="02020603050405020304" pitchFamily="18" charset="0"/>
+              </a:rPr>
+              <a:t>Walls that have sprites that snap to each other but in a fence fashion.</a:t>
             </a:r>
             <a:endParaRPr lang="en-US" altLang="en-US" sz="800" dirty="0"/>
           </a:p>
@@ -5408,24 +6245,24 @@
       </p:sp>
       <p:cxnSp>
         <p:nvCxnSpPr>
-          <p:cNvPr id="58" name="Connector: Elbow 57">
+          <p:cNvPr id="71" name="Connector: Elbow 70">
             <a:extLst>
               <a:ext uri="{FF2B5EF4-FFF2-40B4-BE49-F238E27FC236}">
-                <a16:creationId xmlns:a16="http://schemas.microsoft.com/office/drawing/2014/main" id="{381229F4-0881-4086-AA3B-DD849A79A88C}"/>
+                <a16:creationId xmlns:a16="http://schemas.microsoft.com/office/drawing/2014/main" id="{23DA0303-62E1-4AB7-88B1-9A2CA4D16A5C}"/>
               </a:ext>
             </a:extLst>
           </p:cNvPr>
           <p:cNvCxnSpPr>
             <a:cxnSpLocks/>
-            <a:stCxn id="4" idx="2"/>
-            <a:endCxn id="56" idx="0"/>
+            <a:stCxn id="6" idx="2"/>
+            <a:endCxn id="70" idx="0"/>
           </p:cNvCxnSpPr>
           <p:nvPr/>
         </p:nvCxnSpPr>
         <p:spPr>
           <a:xfrm rot="16200000" flipH="1">
-            <a:off x="5184843" y="6559043"/>
-            <a:ext cx="501541" cy="1525197"/>
+            <a:off x="15933373" y="2826514"/>
+            <a:ext cx="711201" cy="1167489"/>
           </a:xfrm>
           <a:prstGeom prst="bentConnector3">
             <a:avLst>
@@ -5453,6 +6290,125 @@
       </p:cxnSp>
       <p:sp>
         <p:nvSpPr>
+          <p:cNvPr id="56" name="Text Box 8">
+            <a:extLst>
+              <a:ext uri="{FF2B5EF4-FFF2-40B4-BE49-F238E27FC236}">
+                <a16:creationId xmlns:a16="http://schemas.microsoft.com/office/drawing/2014/main" id="{E4947114-1F88-4047-9094-DD1417F12627}"/>
+              </a:ext>
+            </a:extLst>
+          </p:cNvPr>
+          <p:cNvSpPr txBox="1">
+            <a:spLocks noChangeArrowheads="1"/>
+          </p:cNvSpPr>
+          <p:nvPr/>
+        </p:nvSpPr>
+        <p:spPr bwMode="auto">
+          <a:xfrm>
+            <a:off x="5825233" y="8692553"/>
+            <a:ext cx="745958" cy="600075"/>
+          </a:xfrm>
+          <a:prstGeom prst="rect">
+            <a:avLst/>
+          </a:prstGeom>
+          <a:solidFill>
+            <a:srgbClr val="FFFFFF"/>
+          </a:solidFill>
+          <a:ln w="9525">
+            <a:solidFill>
+              <a:srgbClr val="000000"/>
+            </a:solidFill>
+            <a:miter lim="800000"/>
+            <a:headEnd/>
+            <a:tailEnd/>
+          </a:ln>
+        </p:spPr>
+        <p:txBody>
+          <a:bodyPr vert="horz" wrap="square" lIns="91440" tIns="45720" rIns="91440" bIns="45720" numCol="1" anchor="t" anchorCtr="0" compatLnSpc="1">
+            <a:prstTxWarp prst="textNoShape">
+              <a:avLst/>
+            </a:prstTxWarp>
+          </a:bodyPr>
+          <a:lstStyle/>
+          <a:p>
+            <a:pPr defTabSz="914400" eaLnBrk="0" fontAlgn="base" hangingPunct="0">
+              <a:spcBef>
+                <a:spcPct val="0"/>
+              </a:spcBef>
+              <a:spcAft>
+                <a:spcPct val="0"/>
+              </a:spcAft>
+            </a:pPr>
+            <a:r>
+              <a:rPr lang="en-US" altLang="en-US" sz="1100" dirty="0">
+                <a:latin typeface="Calibri" panose="020F0502020204030204" pitchFamily="34" charset="0"/>
+                <a:cs typeface="Times New Roman" panose="02020603050405020304" pitchFamily="18" charset="0"/>
+              </a:rPr>
+              <a:t>Wand</a:t>
+            </a:r>
+            <a:endParaRPr lang="en-US" altLang="en-US" sz="800" dirty="0"/>
+          </a:p>
+          <a:p>
+            <a:pPr defTabSz="914400" eaLnBrk="0" fontAlgn="base" hangingPunct="0">
+              <a:spcBef>
+                <a:spcPct val="0"/>
+              </a:spcBef>
+              <a:spcAft>
+                <a:spcPct val="0"/>
+              </a:spcAft>
+            </a:pPr>
+            <a:endParaRPr lang="en-US" altLang="en-US" sz="1800" dirty="0">
+              <a:latin typeface="Arial" panose="020B0604020202020204" pitchFamily="34" charset="0"/>
+            </a:endParaRPr>
+          </a:p>
+        </p:txBody>
+      </p:sp>
+      <p:cxnSp>
+        <p:nvCxnSpPr>
+          <p:cNvPr id="58" name="Connector: Elbow 57">
+            <a:extLst>
+              <a:ext uri="{FF2B5EF4-FFF2-40B4-BE49-F238E27FC236}">
+                <a16:creationId xmlns:a16="http://schemas.microsoft.com/office/drawing/2014/main" id="{381229F4-0881-4086-AA3B-DD849A79A88C}"/>
+              </a:ext>
+            </a:extLst>
+          </p:cNvPr>
+          <p:cNvCxnSpPr>
+            <a:cxnSpLocks/>
+            <a:stCxn id="4" idx="2"/>
+            <a:endCxn id="56" idx="0"/>
+          </p:cNvCxnSpPr>
+          <p:nvPr/>
+        </p:nvCxnSpPr>
+        <p:spPr>
+          <a:xfrm rot="16200000" flipH="1">
+            <a:off x="4432523" y="6926864"/>
+            <a:ext cx="1091602" cy="2439775"/>
+          </a:xfrm>
+          <a:prstGeom prst="bentConnector3">
+            <a:avLst>
+              <a:gd name="adj1" fmla="val 50000"/>
+            </a:avLst>
+          </a:prstGeom>
+          <a:ln>
+            <a:tailEnd type="triangle"/>
+          </a:ln>
+        </p:spPr>
+        <p:style>
+          <a:lnRef idx="1">
+            <a:schemeClr val="accent1"/>
+          </a:lnRef>
+          <a:fillRef idx="0">
+            <a:schemeClr val="accent1"/>
+          </a:fillRef>
+          <a:effectRef idx="0">
+            <a:schemeClr val="accent1"/>
+          </a:effectRef>
+          <a:fontRef idx="minor">
+            <a:schemeClr val="tx1"/>
+          </a:fontRef>
+        </p:style>
+      </p:cxnSp>
+      <p:sp>
+        <p:nvSpPr>
           <p:cNvPr id="113" name="Text Box 2">
             <a:extLst>
               <a:ext uri="{FF2B5EF4-FFF2-40B4-BE49-F238E27FC236}">
@@ -5503,11 +6459,14 @@
             </a:pPr>
             <a:r>
               <a:rPr lang="en-US" altLang="en-US" sz="1100" dirty="0" err="1">
+                <a:highlight>
+                  <a:srgbClr val="00FF00"/>
+                </a:highlight>
                 <a:latin typeface="Calibri" panose="020F0502020204030204" pitchFamily="34" charset="0"/>
                 <a:ea typeface="Calibri" panose="020F0502020204030204" pitchFamily="34" charset="0"/>
                 <a:cs typeface="Times New Roman" panose="02020603050405020304" pitchFamily="18" charset="0"/>
               </a:rPr>
-              <a:t>ItemSpriteRenderer</a:t>
+              <a:t>RogueSpriteRenderer</a:t>
             </a:r>
             <a:endParaRPr lang="en-US" altLang="en-US" sz="1100" dirty="0">
               <a:latin typeface="Calibri" panose="020F0502020204030204" pitchFamily="34" charset="0"/>
@@ -5693,8 +6652,8 @@
         </p:nvCxnSpPr>
         <p:spPr>
           <a:xfrm rot="16200000" flipH="1">
-            <a:off x="497020" y="2489725"/>
-            <a:ext cx="3415776" cy="1419481"/>
+            <a:off x="-247003" y="3233749"/>
+            <a:ext cx="3680815" cy="196472"/>
           </a:xfrm>
           <a:prstGeom prst="bentConnector2">
             <a:avLst/>
@@ -5719,6 +6678,90 @@
           </a:fontRef>
         </p:style>
       </p:cxnSp>
+      <p:sp>
+        <p:nvSpPr>
+          <p:cNvPr id="18" name="Rectangle 17">
+            <a:extLst>
+              <a:ext uri="{FF2B5EF4-FFF2-40B4-BE49-F238E27FC236}">
+                <a16:creationId xmlns:a16="http://schemas.microsoft.com/office/drawing/2014/main" id="{0F6D728E-1CBC-4220-AA6B-66210342536C}"/>
+              </a:ext>
+            </a:extLst>
+          </p:cNvPr>
+          <p:cNvSpPr/>
+          <p:nvPr/>
+        </p:nvSpPr>
+        <p:spPr>
+          <a:xfrm>
+            <a:off x="7717731" y="234635"/>
+            <a:ext cx="3060759" cy="1442089"/>
+          </a:xfrm>
+          <a:prstGeom prst="rect">
+            <a:avLst/>
+          </a:prstGeom>
+          <a:solidFill>
+            <a:schemeClr val="bg1">
+              <a:lumMod val="95000"/>
+            </a:schemeClr>
+          </a:solidFill>
+        </p:spPr>
+        <p:style>
+          <a:lnRef idx="2">
+            <a:schemeClr val="accent1">
+              <a:shade val="50000"/>
+            </a:schemeClr>
+          </a:lnRef>
+          <a:fillRef idx="1">
+            <a:schemeClr val="accent1"/>
+          </a:fillRef>
+          <a:effectRef idx="0">
+            <a:schemeClr val="accent1"/>
+          </a:effectRef>
+          <a:fontRef idx="minor">
+            <a:schemeClr val="lt1"/>
+          </a:fontRef>
+        </p:style>
+        <p:txBody>
+          <a:bodyPr rtlCol="0" anchor="t"/>
+          <a:lstStyle/>
+          <a:p>
+            <a:pPr algn="ctr"/>
+            <a:r>
+              <a:rPr lang="en-US" dirty="0">
+                <a:solidFill>
+                  <a:schemeClr val="tx1"/>
+                </a:solidFill>
+              </a:rPr>
+              <a:t>Key</a:t>
+            </a:r>
+          </a:p>
+          <a:p>
+            <a:r>
+              <a:rPr lang="en-US" dirty="0">
+                <a:solidFill>
+                  <a:schemeClr val="tx1"/>
+                </a:solidFill>
+                <a:highlight>
+                  <a:srgbClr val="00FF00"/>
+                </a:highlight>
+              </a:rPr>
+              <a:t>Implemented</a:t>
+            </a:r>
+          </a:p>
+          <a:p>
+            <a:r>
+              <a:rPr lang="en-US" dirty="0">
+                <a:solidFill>
+                  <a:schemeClr val="tx1"/>
+                </a:solidFill>
+                <a:highlight>
+                  <a:srgbClr val="FF0000"/>
+                </a:highlight>
+              </a:rPr>
+              <a:t>Unimplemented</a:t>
+            </a:r>
+          </a:p>
+        </p:txBody>
+      </p:sp>
     </p:spTree>
     <p:extLst>
       <p:ext uri="{BB962C8B-B14F-4D97-AF65-F5344CB8AC3E}">

</xml_diff>

<commit_message>
Comments have been updated for RoguelikeObject.cs, WorldObject.cs, and Inventory.cs
</commit_message>
<xml_diff>
--- a/Class Diagram.pptx
+++ b/Class Diagram.pptx
@@ -243,7 +243,7 @@
           <a:p>
             <a:fld id="{DFA429E4-E4A0-4FCB-B57B-5790209CB571}" type="datetimeFigureOut">
               <a:rPr lang="en-US" smtClean="0"/>
-              <a:t>8/13/2019</a:t>
+              <a:t>8/18/2019</a:t>
             </a:fld>
             <a:endParaRPr lang="en-US"/>
           </a:p>
@@ -413,7 +413,7 @@
           <a:p>
             <a:fld id="{DFA429E4-E4A0-4FCB-B57B-5790209CB571}" type="datetimeFigureOut">
               <a:rPr lang="en-US" smtClean="0"/>
-              <a:t>8/13/2019</a:t>
+              <a:t>8/18/2019</a:t>
             </a:fld>
             <a:endParaRPr lang="en-US"/>
           </a:p>
@@ -593,7 +593,7 @@
           <a:p>
             <a:fld id="{DFA429E4-E4A0-4FCB-B57B-5790209CB571}" type="datetimeFigureOut">
               <a:rPr lang="en-US" smtClean="0"/>
-              <a:t>8/13/2019</a:t>
+              <a:t>8/18/2019</a:t>
             </a:fld>
             <a:endParaRPr lang="en-US"/>
           </a:p>
@@ -763,7 +763,7 @@
           <a:p>
             <a:fld id="{DFA429E4-E4A0-4FCB-B57B-5790209CB571}" type="datetimeFigureOut">
               <a:rPr lang="en-US" smtClean="0"/>
-              <a:t>8/13/2019</a:t>
+              <a:t>8/18/2019</a:t>
             </a:fld>
             <a:endParaRPr lang="en-US"/>
           </a:p>
@@ -1007,7 +1007,7 @@
           <a:p>
             <a:fld id="{DFA429E4-E4A0-4FCB-B57B-5790209CB571}" type="datetimeFigureOut">
               <a:rPr lang="en-US" smtClean="0"/>
-              <a:t>8/13/2019</a:t>
+              <a:t>8/18/2019</a:t>
             </a:fld>
             <a:endParaRPr lang="en-US"/>
           </a:p>
@@ -1239,7 +1239,7 @@
           <a:p>
             <a:fld id="{DFA429E4-E4A0-4FCB-B57B-5790209CB571}" type="datetimeFigureOut">
               <a:rPr lang="en-US" smtClean="0"/>
-              <a:t>8/13/2019</a:t>
+              <a:t>8/18/2019</a:t>
             </a:fld>
             <a:endParaRPr lang="en-US"/>
           </a:p>
@@ -1606,7 +1606,7 @@
           <a:p>
             <a:fld id="{DFA429E4-E4A0-4FCB-B57B-5790209CB571}" type="datetimeFigureOut">
               <a:rPr lang="en-US" smtClean="0"/>
-              <a:t>8/13/2019</a:t>
+              <a:t>8/18/2019</a:t>
             </a:fld>
             <a:endParaRPr lang="en-US"/>
           </a:p>
@@ -1724,7 +1724,7 @@
           <a:p>
             <a:fld id="{DFA429E4-E4A0-4FCB-B57B-5790209CB571}" type="datetimeFigureOut">
               <a:rPr lang="en-US" smtClean="0"/>
-              <a:t>8/13/2019</a:t>
+              <a:t>8/18/2019</a:t>
             </a:fld>
             <a:endParaRPr lang="en-US"/>
           </a:p>
@@ -1819,7 +1819,7 @@
           <a:p>
             <a:fld id="{DFA429E4-E4A0-4FCB-B57B-5790209CB571}" type="datetimeFigureOut">
               <a:rPr lang="en-US" smtClean="0"/>
-              <a:t>8/13/2019</a:t>
+              <a:t>8/18/2019</a:t>
             </a:fld>
             <a:endParaRPr lang="en-US"/>
           </a:p>
@@ -2096,7 +2096,7 @@
           <a:p>
             <a:fld id="{DFA429E4-E4A0-4FCB-B57B-5790209CB571}" type="datetimeFigureOut">
               <a:rPr lang="en-US" smtClean="0"/>
-              <a:t>8/13/2019</a:t>
+              <a:t>8/18/2019</a:t>
             </a:fld>
             <a:endParaRPr lang="en-US"/>
           </a:p>
@@ -2353,7 +2353,7 @@
           <a:p>
             <a:fld id="{DFA429E4-E4A0-4FCB-B57B-5790209CB571}" type="datetimeFigureOut">
               <a:rPr lang="en-US" smtClean="0"/>
-              <a:t>8/13/2019</a:t>
+              <a:t>8/18/2019</a:t>
             </a:fld>
             <a:endParaRPr lang="en-US"/>
           </a:p>
@@ -2566,7 +2566,7 @@
           <a:p>
             <a:fld id="{DFA429E4-E4A0-4FCB-B57B-5790209CB571}" type="datetimeFigureOut">
               <a:rPr lang="en-US" smtClean="0"/>
-              <a:t>8/13/2019</a:t>
+              <a:t>8/18/2019</a:t>
             </a:fld>
             <a:endParaRPr lang="en-US"/>
           </a:p>
@@ -2987,8 +2987,8 @@
         </p:nvSpPr>
         <p:spPr bwMode="auto">
           <a:xfrm>
-            <a:off x="1691640" y="2743835"/>
-            <a:ext cx="4133593" cy="4857116"/>
+            <a:off x="1691640" y="2743834"/>
+            <a:ext cx="5248048" cy="5866766"/>
           </a:xfrm>
           <a:prstGeom prst="rect">
             <a:avLst/>
@@ -3073,6 +3073,66 @@
               <a:t>+ </a:t>
             </a:r>
             <a:r>
+              <a:rPr lang="en-US" altLang="en-US" sz="1100" u="sng" dirty="0" err="1">
+                <a:highlight>
+                  <a:srgbClr val="00FF00"/>
+                </a:highlight>
+                <a:latin typeface="Calibri" panose="020F0502020204030204" pitchFamily="34" charset="0"/>
+                <a:cs typeface="Times New Roman" panose="02020603050405020304" pitchFamily="18" charset="0"/>
+              </a:rPr>
+              <a:t>roguelikeObjectList</a:t>
+            </a:r>
+            <a:r>
+              <a:rPr lang="en-US" altLang="en-US" sz="1100" u="sng" dirty="0">
+                <a:highlight>
+                  <a:srgbClr val="00FF00"/>
+                </a:highlight>
+                <a:latin typeface="Calibri" panose="020F0502020204030204" pitchFamily="34" charset="0"/>
+                <a:cs typeface="Times New Roman" panose="02020603050405020304" pitchFamily="18" charset="0"/>
+              </a:rPr>
+              <a:t> : List&lt;</a:t>
+            </a:r>
+            <a:r>
+              <a:rPr lang="en-US" altLang="en-US" sz="1100" u="sng" dirty="0" err="1">
+                <a:highlight>
+                  <a:srgbClr val="00FF00"/>
+                </a:highlight>
+                <a:latin typeface="Calibri" panose="020F0502020204030204" pitchFamily="34" charset="0"/>
+                <a:cs typeface="Times New Roman" panose="02020603050405020304" pitchFamily="18" charset="0"/>
+              </a:rPr>
+              <a:t>RoguelikeObject</a:t>
+            </a:r>
+            <a:r>
+              <a:rPr lang="en-US" altLang="en-US" sz="1100" u="sng" dirty="0">
+                <a:highlight>
+                  <a:srgbClr val="00FF00"/>
+                </a:highlight>
+                <a:latin typeface="Calibri" panose="020F0502020204030204" pitchFamily="34" charset="0"/>
+                <a:cs typeface="Times New Roman" panose="02020603050405020304" pitchFamily="18" charset="0"/>
+              </a:rPr>
+              <a:t>&gt;</a:t>
+            </a:r>
+          </a:p>
+          <a:p>
+            <a:pPr defTabSz="914400" eaLnBrk="0" fontAlgn="base" hangingPunct="0">
+              <a:spcBef>
+                <a:spcPct val="0"/>
+              </a:spcBef>
+              <a:spcAft>
+                <a:spcPct val="0"/>
+              </a:spcAft>
+            </a:pPr>
+            <a:r>
+              <a:rPr lang="en-US" altLang="en-US" sz="1100" dirty="0">
+                <a:highlight>
+                  <a:srgbClr val="00FF00"/>
+                </a:highlight>
+                <a:latin typeface="Calibri" panose="020F0502020204030204" pitchFamily="34" charset="0"/>
+                <a:cs typeface="Times New Roman" panose="02020603050405020304" pitchFamily="18" charset="0"/>
+              </a:rPr>
+              <a:t>+ </a:t>
+            </a:r>
+            <a:r>
               <a:rPr lang="en-US" altLang="en-US" sz="1100" dirty="0" err="1">
                 <a:highlight>
                   <a:srgbClr val="00FF00"/>
@@ -3150,27 +3210,7 @@
                 <a:latin typeface="Calibri" panose="020F0502020204030204" pitchFamily="34" charset="0"/>
                 <a:cs typeface="Times New Roman" panose="02020603050405020304" pitchFamily="18" charset="0"/>
               </a:rPr>
-              <a:t>&gt;</a:t>
-            </a:r>
-          </a:p>
-          <a:p>
-            <a:pPr defTabSz="914400" eaLnBrk="0" fontAlgn="base" hangingPunct="0">
-              <a:spcBef>
-                <a:spcPct val="0"/>
-              </a:spcBef>
-              <a:spcAft>
-                <a:spcPct val="0"/>
-              </a:spcAft>
-            </a:pPr>
-            <a:r>
-              <a:rPr lang="en-US" altLang="en-US" sz="1100" dirty="0">
-                <a:highlight>
-                  <a:srgbClr val="00FF00"/>
-                </a:highlight>
-                <a:latin typeface="Calibri" panose="020F0502020204030204" pitchFamily="34" charset="0"/>
-                <a:cs typeface="Times New Roman" panose="02020603050405020304" pitchFamily="18" charset="0"/>
-              </a:rPr>
-              <a:t>+ </a:t>
+              <a:t>&gt;+ </a:t>
             </a:r>
             <a:r>
               <a:rPr lang="en-US" altLang="en-US" sz="1100" dirty="0" err="1">
@@ -3727,6 +3767,53 @@
                 <a:ea typeface="Calibri" panose="020F0502020204030204" pitchFamily="34" charset="0"/>
                 <a:cs typeface="Times New Roman" panose="02020603050405020304" pitchFamily="18" charset="0"/>
               </a:rPr>
+              <a:t>+ itemSprite1 : Sprite</a:t>
+            </a:r>
+          </a:p>
+          <a:p>
+            <a:pPr defTabSz="914400" eaLnBrk="0" fontAlgn="base" hangingPunct="0">
+              <a:spcBef>
+                <a:spcPct val="0"/>
+              </a:spcBef>
+              <a:spcAft>
+                <a:spcPct val="0"/>
+              </a:spcAft>
+            </a:pPr>
+            <a:r>
+              <a:rPr lang="en-US" altLang="en-US" sz="1100" dirty="0">
+                <a:highlight>
+                  <a:srgbClr val="00FF00"/>
+                </a:highlight>
+                <a:ea typeface="Calibri" panose="020F0502020204030204" pitchFamily="34" charset="0"/>
+                <a:cs typeface="Times New Roman" panose="02020603050405020304" pitchFamily="18" charset="0"/>
+              </a:rPr>
+              <a:t>+ itemSprite2 : Sprite</a:t>
+            </a:r>
+            <a:endParaRPr lang="en-US" altLang="en-US" sz="1100" dirty="0">
+              <a:highlight>
+                <a:srgbClr val="00FF00"/>
+              </a:highlight>
+              <a:latin typeface="Calibri" panose="020F0502020204030204" pitchFamily="34" charset="0"/>
+              <a:cs typeface="Times New Roman" panose="02020603050405020304" pitchFamily="18" charset="0"/>
+            </a:endParaRPr>
+          </a:p>
+          <a:p>
+            <a:pPr defTabSz="914400" eaLnBrk="0" fontAlgn="base" hangingPunct="0">
+              <a:spcBef>
+                <a:spcPct val="0"/>
+              </a:spcBef>
+              <a:spcAft>
+                <a:spcPct val="0"/>
+              </a:spcAft>
+            </a:pPr>
+            <a:r>
+              <a:rPr lang="en-US" altLang="en-US" sz="1100" dirty="0">
+                <a:highlight>
+                  <a:srgbClr val="00FF00"/>
+                </a:highlight>
+                <a:latin typeface="Calibri" panose="020F0502020204030204" pitchFamily="34" charset="0"/>
+                <a:cs typeface="Times New Roman" panose="02020603050405020304" pitchFamily="18" charset="0"/>
+              </a:rPr>
               <a:t>+ </a:t>
             </a:r>
             <a:r>
@@ -3734,20 +3821,60 @@
                 <a:highlight>
                   <a:srgbClr val="00FF00"/>
                 </a:highlight>
+                <a:latin typeface="Calibri" panose="020F0502020204030204" pitchFamily="34" charset="0"/>
+                <a:cs typeface="Times New Roman" panose="02020603050405020304" pitchFamily="18" charset="0"/>
+              </a:rPr>
+              <a:t>animationSpeed</a:t>
+            </a:r>
+            <a:r>
+              <a:rPr lang="en-US" altLang="en-US" sz="1100" dirty="0">
+                <a:highlight>
+                  <a:srgbClr val="00FF00"/>
+                </a:highlight>
+                <a:latin typeface="Calibri" panose="020F0502020204030204" pitchFamily="34" charset="0"/>
+                <a:cs typeface="Times New Roman" panose="02020603050405020304" pitchFamily="18" charset="0"/>
+              </a:rPr>
+              <a:t> : float</a:t>
+            </a:r>
+          </a:p>
+          <a:p>
+            <a:pPr defTabSz="914400" eaLnBrk="0" fontAlgn="base" hangingPunct="0">
+              <a:spcBef>
+                <a:spcPct val="0"/>
+              </a:spcBef>
+              <a:spcAft>
+                <a:spcPct val="0"/>
+              </a:spcAft>
+            </a:pPr>
+            <a:r>
+              <a:rPr lang="en-US" altLang="en-US" sz="1100" dirty="0">
+                <a:highlight>
+                  <a:srgbClr val="00FF00"/>
+                </a:highlight>
                 <a:ea typeface="Calibri" panose="020F0502020204030204" pitchFamily="34" charset="0"/>
                 <a:cs typeface="Times New Roman" panose="02020603050405020304" pitchFamily="18" charset="0"/>
               </a:rPr>
-              <a:t>itemSprite</a:t>
-            </a:r>
-            <a:r>
-              <a:rPr lang="en-US" altLang="en-US" sz="1100" dirty="0">
+              <a:t>+ </a:t>
+            </a:r>
+            <a:r>
+              <a:rPr lang="en-US" altLang="en-US" sz="1100" dirty="0" err="1">
                 <a:highlight>
                   <a:srgbClr val="00FF00"/>
                 </a:highlight>
                 <a:ea typeface="Calibri" panose="020F0502020204030204" pitchFamily="34" charset="0"/>
                 <a:cs typeface="Times New Roman" panose="02020603050405020304" pitchFamily="18" charset="0"/>
               </a:rPr>
-              <a:t> : Sprite</a:t>
+              <a:t>spriteToggle</a:t>
+            </a:r>
+            <a:r>
+              <a:rPr lang="en-US" altLang="en-US" sz="1100" dirty="0">
+                <a:highlight>
+                  <a:srgbClr val="00FF00"/>
+                </a:highlight>
+                <a:ea typeface="Calibri" panose="020F0502020204030204" pitchFamily="34" charset="0"/>
+                <a:cs typeface="Times New Roman" panose="02020603050405020304" pitchFamily="18" charset="0"/>
+              </a:rPr>
+              <a:t> : bool</a:t>
             </a:r>
           </a:p>
           <a:p>
@@ -3874,6 +4001,7 @@
                   <a:srgbClr val="00FF00"/>
                 </a:highlight>
                 <a:latin typeface="Calibri" panose="020F0502020204030204" pitchFamily="34" charset="0"/>
+                <a:ea typeface="Calibri" panose="020F0502020204030204" pitchFamily="34" charset="0"/>
                 <a:cs typeface="Times New Roman" panose="02020603050405020304" pitchFamily="18" charset="0"/>
               </a:rPr>
               <a:t>+ </a:t>
@@ -3884,6 +4012,48 @@
                   <a:srgbClr val="00FF00"/>
                 </a:highlight>
                 <a:latin typeface="Calibri" panose="020F0502020204030204" pitchFamily="34" charset="0"/>
+                <a:ea typeface="Calibri" panose="020F0502020204030204" pitchFamily="34" charset="0"/>
+                <a:cs typeface="Times New Roman" panose="02020603050405020304" pitchFamily="18" charset="0"/>
+              </a:rPr>
+              <a:t>OnCreate</a:t>
+            </a:r>
+            <a:r>
+              <a:rPr lang="en-US" altLang="en-US" sz="1100" i="1" dirty="0">
+                <a:highlight>
+                  <a:srgbClr val="00FF00"/>
+                </a:highlight>
+                <a:latin typeface="Calibri" panose="020F0502020204030204" pitchFamily="34" charset="0"/>
+                <a:ea typeface="Calibri" panose="020F0502020204030204" pitchFamily="34" charset="0"/>
+                <a:cs typeface="Times New Roman" panose="02020603050405020304" pitchFamily="18" charset="0"/>
+              </a:rPr>
+              <a:t>() : void</a:t>
+            </a:r>
+          </a:p>
+          <a:p>
+            <a:pPr defTabSz="914400" eaLnBrk="0" fontAlgn="base" hangingPunct="0">
+              <a:spcBef>
+                <a:spcPct val="0"/>
+              </a:spcBef>
+              <a:spcAft>
+                <a:spcPct val="0"/>
+              </a:spcAft>
+            </a:pPr>
+            <a:r>
+              <a:rPr lang="en-US" altLang="en-US" sz="1100" i="1" dirty="0">
+                <a:highlight>
+                  <a:srgbClr val="00FF00"/>
+                </a:highlight>
+                <a:latin typeface="Calibri" panose="020F0502020204030204" pitchFamily="34" charset="0"/>
+                <a:cs typeface="Times New Roman" panose="02020603050405020304" pitchFamily="18" charset="0"/>
+              </a:rPr>
+              <a:t>+ </a:t>
+            </a:r>
+            <a:r>
+              <a:rPr lang="en-US" altLang="en-US" sz="1100" i="1" dirty="0" err="1">
+                <a:highlight>
+                  <a:srgbClr val="00FF00"/>
+                </a:highlight>
+                <a:latin typeface="Calibri" panose="020F0502020204030204" pitchFamily="34" charset="0"/>
                 <a:cs typeface="Times New Roman" panose="02020603050405020304" pitchFamily="18" charset="0"/>
               </a:rPr>
               <a:t>GetFullName</a:t>
@@ -3996,7 +4166,7 @@
                 <a:latin typeface="Calibri" panose="020F0502020204030204" pitchFamily="34" charset="0"/>
                 <a:cs typeface="Times New Roman" panose="02020603050405020304" pitchFamily="18" charset="0"/>
               </a:rPr>
-              <a:t># </a:t>
+              <a:t>+ </a:t>
             </a:r>
             <a:r>
               <a:rPr lang="en-US" altLang="en-US" sz="1100" i="1" dirty="0" err="1">
@@ -4039,27 +4209,27 @@
               <a:t>+ </a:t>
             </a:r>
             <a:r>
-              <a:rPr lang="en-US" altLang="en-US" sz="1100" dirty="0" err="1">
-                <a:highlight>
-                  <a:srgbClr val="00FF00"/>
-                </a:highlight>
-                <a:latin typeface="Calibri" panose="020F0502020204030204" pitchFamily="34" charset="0"/>
-                <a:cs typeface="Times New Roman" panose="02020603050405020304" pitchFamily="18" charset="0"/>
-              </a:rPr>
-              <a:t>MakeItem</a:t>
-            </a:r>
-            <a:r>
-              <a:rPr lang="en-US" altLang="en-US" sz="1100" dirty="0">
-                <a:highlight>
-                  <a:srgbClr val="00FF00"/>
-                </a:highlight>
-                <a:latin typeface="Calibri" panose="020F0502020204030204" pitchFamily="34" charset="0"/>
-                <a:cs typeface="Times New Roman" panose="02020603050405020304" pitchFamily="18" charset="0"/>
-              </a:rPr>
-              <a:t>(</a:t>
-            </a:r>
-            <a:r>
-              <a:rPr lang="en-US" altLang="en-US" sz="1100" dirty="0" err="1">
+              <a:rPr lang="en-US" altLang="en-US" sz="1100" u="sng" dirty="0" err="1">
+                <a:highlight>
+                  <a:srgbClr val="00FF00"/>
+                </a:highlight>
+                <a:latin typeface="Calibri" panose="020F0502020204030204" pitchFamily="34" charset="0"/>
+                <a:cs typeface="Times New Roman" panose="02020603050405020304" pitchFamily="18" charset="0"/>
+              </a:rPr>
+              <a:t>MakeRoguelikeObject</a:t>
+            </a:r>
+            <a:r>
+              <a:rPr lang="en-US" altLang="en-US" sz="1100" u="sng" dirty="0">
+                <a:highlight>
+                  <a:srgbClr val="00FF00"/>
+                </a:highlight>
+                <a:latin typeface="Calibri" panose="020F0502020204030204" pitchFamily="34" charset="0"/>
+                <a:cs typeface="Times New Roman" panose="02020603050405020304" pitchFamily="18" charset="0"/>
+              </a:rPr>
+              <a:t> (</a:t>
+            </a:r>
+            <a:r>
+              <a:rPr lang="en-US" altLang="en-US" sz="1100" u="sng" dirty="0" err="1">
                 <a:highlight>
                   <a:srgbClr val="00FF00"/>
                 </a:highlight>
@@ -4069,7 +4239,7 @@
               <a:t>RoguelikeObject</a:t>
             </a:r>
             <a:r>
-              <a:rPr lang="en-US" altLang="en-US" sz="1100" dirty="0">
+              <a:rPr lang="en-US" altLang="en-US" sz="1100" u="sng" dirty="0">
                 <a:highlight>
                   <a:srgbClr val="00FF00"/>
                 </a:highlight>
@@ -4079,7 +4249,7 @@
               <a:t>, int, Inventory, int) : </a:t>
             </a:r>
             <a:r>
-              <a:rPr lang="en-US" altLang="en-US" sz="1100" dirty="0" err="1">
+              <a:rPr lang="en-US" altLang="en-US" sz="1100" u="sng" dirty="0" err="1">
                 <a:highlight>
                   <a:srgbClr val="00FF00"/>
                 </a:highlight>
@@ -4088,10 +4258,146 @@
               </a:rPr>
               <a:t>RoguelikeObject</a:t>
             </a:r>
-            <a:endParaRPr lang="en-US" altLang="en-US" sz="800" dirty="0">
+            <a:endParaRPr lang="en-US" altLang="en-US" sz="1100" u="sng" dirty="0">
               <a:highlight>
                 <a:srgbClr val="00FF00"/>
               </a:highlight>
+              <a:latin typeface="Calibri" panose="020F0502020204030204" pitchFamily="34" charset="0"/>
+              <a:cs typeface="Times New Roman" panose="02020603050405020304" pitchFamily="18" charset="0"/>
+            </a:endParaRPr>
+          </a:p>
+          <a:p>
+            <a:pPr defTabSz="914400" eaLnBrk="0" fontAlgn="base" hangingPunct="0">
+              <a:spcBef>
+                <a:spcPct val="0"/>
+              </a:spcBef>
+              <a:spcAft>
+                <a:spcPct val="0"/>
+              </a:spcAft>
+            </a:pPr>
+            <a:r>
+              <a:rPr lang="en-US" altLang="en-US" sz="1100" dirty="0">
+                <a:highlight>
+                  <a:srgbClr val="00FF00"/>
+                </a:highlight>
+                <a:latin typeface="Calibri" panose="020F0502020204030204" pitchFamily="34" charset="0"/>
+                <a:cs typeface="Times New Roman" panose="02020603050405020304" pitchFamily="18" charset="0"/>
+              </a:rPr>
+              <a:t>+ </a:t>
+            </a:r>
+            <a:r>
+              <a:rPr lang="en-US" altLang="en-US" sz="1100" u="sng" dirty="0" err="1">
+                <a:highlight>
+                  <a:srgbClr val="00FF00"/>
+                </a:highlight>
+                <a:latin typeface="Calibri" panose="020F0502020204030204" pitchFamily="34" charset="0"/>
+                <a:cs typeface="Times New Roman" panose="02020603050405020304" pitchFamily="18" charset="0"/>
+              </a:rPr>
+              <a:t>MakeRoguelikeObjectTemporary</a:t>
+            </a:r>
+            <a:r>
+              <a:rPr lang="en-US" altLang="en-US" sz="1100" u="sng" dirty="0">
+                <a:highlight>
+                  <a:srgbClr val="00FF00"/>
+                </a:highlight>
+                <a:latin typeface="Calibri" panose="020F0502020204030204" pitchFamily="34" charset="0"/>
+                <a:cs typeface="Times New Roman" panose="02020603050405020304" pitchFamily="18" charset="0"/>
+              </a:rPr>
+              <a:t>(</a:t>
+            </a:r>
+            <a:r>
+              <a:rPr lang="en-US" altLang="en-US" sz="1100" u="sng" dirty="0" err="1">
+                <a:highlight>
+                  <a:srgbClr val="00FF00"/>
+                </a:highlight>
+                <a:latin typeface="Calibri" panose="020F0502020204030204" pitchFamily="34" charset="0"/>
+                <a:cs typeface="Times New Roman" panose="02020603050405020304" pitchFamily="18" charset="0"/>
+              </a:rPr>
+              <a:t>RoguelikeObject</a:t>
+            </a:r>
+            <a:r>
+              <a:rPr lang="en-US" altLang="en-US" sz="1100" u="sng" dirty="0">
+                <a:highlight>
+                  <a:srgbClr val="00FF00"/>
+                </a:highlight>
+                <a:latin typeface="Calibri" panose="020F0502020204030204" pitchFamily="34" charset="0"/>
+                <a:cs typeface="Times New Roman" panose="02020603050405020304" pitchFamily="18" charset="0"/>
+              </a:rPr>
+              <a:t>, int) : </a:t>
+            </a:r>
+            <a:r>
+              <a:rPr lang="en-US" altLang="en-US" sz="1100" u="sng" dirty="0" err="1">
+                <a:highlight>
+                  <a:srgbClr val="00FF00"/>
+                </a:highlight>
+                <a:latin typeface="Calibri" panose="020F0502020204030204" pitchFamily="34" charset="0"/>
+                <a:cs typeface="Times New Roman" panose="02020603050405020304" pitchFamily="18" charset="0"/>
+              </a:rPr>
+              <a:t>RoguelikeObject</a:t>
+            </a:r>
+            <a:endParaRPr lang="en-US" altLang="en-US" sz="1100" u="sng" dirty="0">
+              <a:highlight>
+                <a:srgbClr val="00FF00"/>
+              </a:highlight>
+              <a:latin typeface="Calibri" panose="020F0502020204030204" pitchFamily="34" charset="0"/>
+              <a:cs typeface="Times New Roman" panose="02020603050405020304" pitchFamily="18" charset="0"/>
+            </a:endParaRPr>
+          </a:p>
+          <a:p>
+            <a:pPr defTabSz="914400" eaLnBrk="0" fontAlgn="base" hangingPunct="0">
+              <a:spcBef>
+                <a:spcPct val="0"/>
+              </a:spcBef>
+              <a:spcAft>
+                <a:spcPct val="0"/>
+              </a:spcAft>
+            </a:pPr>
+            <a:r>
+              <a:rPr lang="en-US" altLang="en-US" sz="1100" dirty="0">
+                <a:highlight>
+                  <a:srgbClr val="00FF00"/>
+                </a:highlight>
+                <a:latin typeface="Calibri" panose="020F0502020204030204" pitchFamily="34" charset="0"/>
+                <a:cs typeface="Times New Roman" panose="02020603050405020304" pitchFamily="18" charset="0"/>
+              </a:rPr>
+              <a:t>+ </a:t>
+            </a:r>
+            <a:r>
+              <a:rPr lang="en-US" altLang="en-US" sz="1100" dirty="0" err="1">
+                <a:highlight>
+                  <a:srgbClr val="00FF00"/>
+                </a:highlight>
+                <a:latin typeface="Calibri" panose="020F0502020204030204" pitchFamily="34" charset="0"/>
+                <a:cs typeface="Times New Roman" panose="02020603050405020304" pitchFamily="18" charset="0"/>
+              </a:rPr>
+              <a:t>ToggleRoguelikeObjectSprite</a:t>
+            </a:r>
+            <a:r>
+              <a:rPr lang="en-US" altLang="en-US" sz="1100" dirty="0">
+                <a:highlight>
+                  <a:srgbClr val="00FF00"/>
+                </a:highlight>
+                <a:latin typeface="Calibri" panose="020F0502020204030204" pitchFamily="34" charset="0"/>
+                <a:cs typeface="Times New Roman" panose="02020603050405020304" pitchFamily="18" charset="0"/>
+              </a:rPr>
+              <a:t>() : </a:t>
+            </a:r>
+            <a:r>
+              <a:rPr lang="en-US" altLang="en-US" sz="1100" dirty="0" err="1">
+                <a:highlight>
+                  <a:srgbClr val="00FF00"/>
+                </a:highlight>
+                <a:latin typeface="Calibri" panose="020F0502020204030204" pitchFamily="34" charset="0"/>
+                <a:cs typeface="Times New Roman" panose="02020603050405020304" pitchFamily="18" charset="0"/>
+              </a:rPr>
+              <a:t>IEnumerator</a:t>
+            </a:r>
+            <a:endParaRPr lang="en-US" altLang="en-US" sz="1100" dirty="0">
+              <a:highlight>
+                <a:srgbClr val="00FF00"/>
+              </a:highlight>
+              <a:latin typeface="Calibri" panose="020F0502020204030204" pitchFamily="34" charset="0"/>
+              <a:cs typeface="Times New Roman" panose="02020603050405020304" pitchFamily="18" charset="0"/>
             </a:endParaRPr>
           </a:p>
         </p:txBody>
@@ -4113,7 +4419,7 @@
         <p:spPr bwMode="auto">
           <a:xfrm>
             <a:off x="8929596" y="2556669"/>
-            <a:ext cx="3164969" cy="2197571"/>
+            <a:ext cx="3619734" cy="3282156"/>
           </a:xfrm>
           <a:prstGeom prst="rect">
             <a:avLst/>
@@ -4198,27 +4504,88 @@
                 <a:highlight>
                   <a:srgbClr val="00FF00"/>
                 </a:highlight>
+                <a:ea typeface="Calibri" panose="020F0502020204030204" pitchFamily="34" charset="0"/>
                 <a:cs typeface="Times New Roman" panose="02020603050405020304" pitchFamily="18" charset="0"/>
               </a:rPr>
               <a:t>+ </a:t>
             </a:r>
             <a:r>
-              <a:rPr lang="en-US" altLang="en-US" sz="1100" dirty="0" err="1">
-                <a:highlight>
-                  <a:srgbClr val="00FF00"/>
-                </a:highlight>
-                <a:cs typeface="Times New Roman" panose="02020603050405020304" pitchFamily="18" charset="0"/>
-              </a:rPr>
-              <a:t>worldSprite</a:t>
-            </a:r>
-            <a:r>
-              <a:rPr lang="en-US" altLang="en-US" sz="1100" dirty="0">
-                <a:highlight>
-                  <a:srgbClr val="00FF00"/>
-                </a:highlight>
-                <a:cs typeface="Times New Roman" panose="02020603050405020304" pitchFamily="18" charset="0"/>
-              </a:rPr>
-              <a:t> : Sprite</a:t>
+              <a:rPr lang="en-US" altLang="en-US" sz="1100" u="sng" dirty="0" err="1">
+                <a:highlight>
+                  <a:srgbClr val="00FF00"/>
+                </a:highlight>
+                <a:ea typeface="Calibri" panose="020F0502020204030204" pitchFamily="34" charset="0"/>
+                <a:cs typeface="Times New Roman" panose="02020603050405020304" pitchFamily="18" charset="0"/>
+              </a:rPr>
+              <a:t>worldObjectList</a:t>
+            </a:r>
+            <a:r>
+              <a:rPr lang="en-US" altLang="en-US" sz="1100" u="sng" dirty="0">
+                <a:highlight>
+                  <a:srgbClr val="00FF00"/>
+                </a:highlight>
+                <a:ea typeface="Calibri" panose="020F0502020204030204" pitchFamily="34" charset="0"/>
+                <a:cs typeface="Times New Roman" panose="02020603050405020304" pitchFamily="18" charset="0"/>
+              </a:rPr>
+              <a:t> : List&lt;</a:t>
+            </a:r>
+            <a:r>
+              <a:rPr lang="en-US" altLang="en-US" sz="1100" u="sng" dirty="0" err="1">
+                <a:highlight>
+                  <a:srgbClr val="00FF00"/>
+                </a:highlight>
+                <a:ea typeface="Calibri" panose="020F0502020204030204" pitchFamily="34" charset="0"/>
+                <a:cs typeface="Times New Roman" panose="02020603050405020304" pitchFamily="18" charset="0"/>
+              </a:rPr>
+              <a:t>WorldObject</a:t>
+            </a:r>
+            <a:r>
+              <a:rPr lang="en-US" altLang="en-US" sz="1100" u="sng" dirty="0">
+                <a:highlight>
+                  <a:srgbClr val="00FF00"/>
+                </a:highlight>
+                <a:ea typeface="Calibri" panose="020F0502020204030204" pitchFamily="34" charset="0"/>
+                <a:cs typeface="Times New Roman" panose="02020603050405020304" pitchFamily="18" charset="0"/>
+              </a:rPr>
+              <a:t>&gt;</a:t>
+            </a:r>
+          </a:p>
+          <a:p>
+            <a:pPr defTabSz="914400" eaLnBrk="0" fontAlgn="base" hangingPunct="0">
+              <a:spcBef>
+                <a:spcPct val="0"/>
+              </a:spcBef>
+              <a:spcAft>
+                <a:spcPct val="0"/>
+              </a:spcAft>
+            </a:pPr>
+            <a:r>
+              <a:rPr lang="en-US" altLang="en-US" sz="1100" dirty="0">
+                <a:highlight>
+                  <a:srgbClr val="00FF00"/>
+                </a:highlight>
+                <a:cs typeface="Times New Roman" panose="02020603050405020304" pitchFamily="18" charset="0"/>
+              </a:rPr>
+              <a:t>+ worldSprite1 : Sprite</a:t>
+            </a:r>
+          </a:p>
+          <a:p>
+            <a:pPr defTabSz="914400" eaLnBrk="0" fontAlgn="base" hangingPunct="0">
+              <a:spcBef>
+                <a:spcPct val="0"/>
+              </a:spcBef>
+              <a:spcAft>
+                <a:spcPct val="0"/>
+              </a:spcAft>
+            </a:pPr>
+            <a:r>
+              <a:rPr lang="en-US" altLang="en-US" sz="1100" dirty="0">
+                <a:highlight>
+                  <a:srgbClr val="00FF00"/>
+                </a:highlight>
+                <a:cs typeface="Times New Roman" panose="02020603050405020304" pitchFamily="18" charset="0"/>
+              </a:rPr>
+              <a:t>+ worldSprite2 : Sprite</a:t>
             </a:r>
           </a:p>
           <a:p>
@@ -4376,6 +4743,117 @@
                 </a:highlight>
                 <a:cs typeface="Times New Roman" panose="02020603050405020304" pitchFamily="18" charset="0"/>
               </a:rPr>
+              <a:t>GetWorldSprite</a:t>
+            </a:r>
+            <a:r>
+              <a:rPr lang="en-US" altLang="en-US" sz="1100" i="1" dirty="0">
+                <a:highlight>
+                  <a:srgbClr val="00FF00"/>
+                </a:highlight>
+                <a:cs typeface="Times New Roman" panose="02020603050405020304" pitchFamily="18" charset="0"/>
+              </a:rPr>
+              <a:t>() : Sprite</a:t>
+            </a:r>
+          </a:p>
+          <a:p>
+            <a:pPr defTabSz="914400" eaLnBrk="0" fontAlgn="base" hangingPunct="0">
+              <a:spcBef>
+                <a:spcPct val="0"/>
+              </a:spcBef>
+              <a:spcAft>
+                <a:spcPct val="0"/>
+              </a:spcAft>
+            </a:pPr>
+            <a:r>
+              <a:rPr lang="en-US" altLang="en-US" sz="1100" dirty="0">
+                <a:highlight>
+                  <a:srgbClr val="00FF00"/>
+                </a:highlight>
+                <a:cs typeface="Times New Roman" panose="02020603050405020304" pitchFamily="18" charset="0"/>
+              </a:rPr>
+              <a:t>+ </a:t>
+            </a:r>
+            <a:r>
+              <a:rPr lang="en-US" altLang="en-US" sz="1100" dirty="0" err="1">
+                <a:highlight>
+                  <a:srgbClr val="00FF00"/>
+                </a:highlight>
+                <a:cs typeface="Times New Roman" panose="02020603050405020304" pitchFamily="18" charset="0"/>
+              </a:rPr>
+              <a:t>DestroyObject</a:t>
+            </a:r>
+            <a:r>
+              <a:rPr lang="en-US" altLang="en-US" sz="1100" dirty="0">
+                <a:highlight>
+                  <a:srgbClr val="00FF00"/>
+                </a:highlight>
+                <a:cs typeface="Times New Roman" panose="02020603050405020304" pitchFamily="18" charset="0"/>
+              </a:rPr>
+              <a:t>() : void &lt;&lt;override&gt;&gt;</a:t>
+            </a:r>
+          </a:p>
+          <a:p>
+            <a:pPr defTabSz="914400" eaLnBrk="0" fontAlgn="base" hangingPunct="0">
+              <a:spcBef>
+                <a:spcPct val="0"/>
+              </a:spcBef>
+              <a:spcAft>
+                <a:spcPct val="0"/>
+              </a:spcAft>
+            </a:pPr>
+            <a:r>
+              <a:rPr lang="en-US" altLang="en-US" sz="1100" dirty="0">
+                <a:highlight>
+                  <a:srgbClr val="00FF00"/>
+                </a:highlight>
+                <a:cs typeface="Times New Roman" panose="02020603050405020304" pitchFamily="18" charset="0"/>
+              </a:rPr>
+              <a:t>+ </a:t>
+            </a:r>
+            <a:r>
+              <a:rPr lang="en-US" altLang="en-US" sz="1100" dirty="0" err="1">
+                <a:highlight>
+                  <a:srgbClr val="00FF00"/>
+                </a:highlight>
+                <a:cs typeface="Times New Roman" panose="02020603050405020304" pitchFamily="18" charset="0"/>
+              </a:rPr>
+              <a:t>OnCreate</a:t>
+            </a:r>
+            <a:r>
+              <a:rPr lang="en-US" altLang="en-US" sz="1100" dirty="0">
+                <a:highlight>
+                  <a:srgbClr val="00FF00"/>
+                </a:highlight>
+                <a:cs typeface="Times New Roman" panose="02020603050405020304" pitchFamily="18" charset="0"/>
+              </a:rPr>
+              <a:t>() : void &lt;&lt;override&gt;&gt;</a:t>
+            </a:r>
+          </a:p>
+          <a:p>
+            <a:pPr defTabSz="914400" eaLnBrk="0" fontAlgn="base" hangingPunct="0">
+              <a:spcBef>
+                <a:spcPct val="0"/>
+              </a:spcBef>
+              <a:spcAft>
+                <a:spcPct val="0"/>
+              </a:spcAft>
+            </a:pPr>
+            <a:r>
+              <a:rPr lang="en-US" altLang="en-US" sz="1100" i="1" dirty="0">
+                <a:highlight>
+                  <a:srgbClr val="00FF00"/>
+                </a:highlight>
+                <a:cs typeface="Times New Roman" panose="02020603050405020304" pitchFamily="18" charset="0"/>
+              </a:rPr>
+              <a:t>+ </a:t>
+            </a:r>
+            <a:r>
+              <a:rPr lang="en-US" altLang="en-US" sz="1100" i="1" dirty="0" err="1">
+                <a:highlight>
+                  <a:srgbClr val="00FF00"/>
+                </a:highlight>
+                <a:cs typeface="Times New Roman" panose="02020603050405020304" pitchFamily="18" charset="0"/>
+              </a:rPr>
               <a:t>isSpaceFree</a:t>
             </a:r>
             <a:r>
@@ -4499,6 +4977,58 @@
               </a:rPr>
               <a:t>() : float</a:t>
             </a:r>
+          </a:p>
+          <a:p>
+            <a:pPr defTabSz="914400" eaLnBrk="0" fontAlgn="base" hangingPunct="0">
+              <a:spcBef>
+                <a:spcPct val="0"/>
+              </a:spcBef>
+              <a:spcAft>
+                <a:spcPct val="0"/>
+              </a:spcAft>
+            </a:pPr>
+            <a:r>
+              <a:rPr lang="en-US" altLang="en-US" sz="1100" dirty="0">
+                <a:highlight>
+                  <a:srgbClr val="00FF00"/>
+                </a:highlight>
+                <a:cs typeface="Times New Roman" panose="02020603050405020304" pitchFamily="18" charset="0"/>
+              </a:rPr>
+              <a:t>+ </a:t>
+            </a:r>
+            <a:r>
+              <a:rPr lang="en-US" altLang="en-US" sz="1100" u="sng" dirty="0" err="1">
+                <a:highlight>
+                  <a:srgbClr val="00FF00"/>
+                </a:highlight>
+                <a:cs typeface="Times New Roman" panose="02020603050405020304" pitchFamily="18" charset="0"/>
+              </a:rPr>
+              <a:t>MakeAndPlaceWorldObject</a:t>
+            </a:r>
+            <a:r>
+              <a:rPr lang="en-US" altLang="en-US" sz="1100" u="sng" dirty="0">
+                <a:highlight>
+                  <a:srgbClr val="00FF00"/>
+                </a:highlight>
+                <a:cs typeface="Times New Roman" panose="02020603050405020304" pitchFamily="18" charset="0"/>
+              </a:rPr>
+              <a:t>() : </a:t>
+            </a:r>
+            <a:r>
+              <a:rPr lang="en-US" altLang="en-US" sz="1100" u="sng" dirty="0" err="1">
+                <a:highlight>
+                  <a:srgbClr val="00FF00"/>
+                </a:highlight>
+                <a:cs typeface="Times New Roman" panose="02020603050405020304" pitchFamily="18" charset="0"/>
+              </a:rPr>
+              <a:t>WorldObject</a:t>
+            </a:r>
+            <a:endParaRPr lang="en-US" altLang="en-US" sz="1100" u="sng" dirty="0">
+              <a:highlight>
+                <a:srgbClr val="00FF00"/>
+              </a:highlight>
+              <a:cs typeface="Times New Roman" panose="02020603050405020304" pitchFamily="18" charset="0"/>
+            </a:endParaRPr>
           </a:p>
           <a:p>
             <a:pPr defTabSz="914400" eaLnBrk="0" fontAlgn="base" hangingPunct="0">
@@ -4919,7 +5449,7 @@
         </p:nvSpPr>
         <p:spPr bwMode="auto">
           <a:xfrm>
-            <a:off x="749210" y="8697297"/>
+            <a:off x="669042" y="9981548"/>
             <a:ext cx="745958" cy="600075"/>
           </a:xfrm>
           <a:prstGeom prst="rect">
@@ -5071,8 +5601,8 @@
         </p:nvCxnSpPr>
         <p:spPr>
           <a:xfrm flipV="1">
-            <a:off x="5825233" y="3655455"/>
-            <a:ext cx="3104363" cy="1516938"/>
+            <a:off x="6939688" y="4197747"/>
+            <a:ext cx="1989908" cy="1479470"/>
           </a:xfrm>
           <a:prstGeom prst="bentConnector3">
             <a:avLst/>
@@ -5114,8 +5644,8 @@
         </p:nvCxnSpPr>
         <p:spPr>
           <a:xfrm>
-            <a:off x="12094565" y="3655455"/>
-            <a:ext cx="1622253" cy="3079343"/>
+            <a:off x="12549330" y="4197747"/>
+            <a:ext cx="1167488" cy="2537051"/>
           </a:xfrm>
           <a:prstGeom prst="bentConnector3">
             <a:avLst>
@@ -5159,8 +5689,8 @@
         </p:nvCxnSpPr>
         <p:spPr>
           <a:xfrm flipV="1">
-            <a:off x="12094565" y="2466178"/>
-            <a:ext cx="1622253" cy="1189277"/>
+            <a:off x="12549330" y="2466178"/>
+            <a:ext cx="1167488" cy="1731569"/>
           </a:xfrm>
           <a:prstGeom prst="bentConnector3">
             <a:avLst>
@@ -5204,8 +5734,8 @@
         </p:nvCxnSpPr>
         <p:spPr>
           <a:xfrm rot="16200000" flipH="1">
-            <a:off x="9261785" y="6004535"/>
-            <a:ext cx="3027834" cy="527243"/>
+            <a:off x="9917769" y="6660518"/>
+            <a:ext cx="1943249" cy="299861"/>
           </a:xfrm>
           <a:prstGeom prst="bentConnector3">
             <a:avLst>
@@ -5247,7 +5777,7 @@
         </p:nvSpPr>
         <p:spPr bwMode="auto">
           <a:xfrm>
-            <a:off x="1868147" y="8692553"/>
+            <a:off x="1787979" y="9976804"/>
             <a:ext cx="745958" cy="600075"/>
           </a:xfrm>
           <a:prstGeom prst="rect">
@@ -5322,7 +5852,7 @@
         </p:nvSpPr>
         <p:spPr bwMode="auto">
           <a:xfrm>
-            <a:off x="3132907" y="8683066"/>
+            <a:off x="3052739" y="9967317"/>
             <a:ext cx="745958" cy="600075"/>
           </a:xfrm>
           <a:prstGeom prst="rect">
@@ -5398,8 +5928,8 @@
         </p:nvCxnSpPr>
         <p:spPr>
           <a:xfrm rot="5400000">
-            <a:off x="1892140" y="6831000"/>
-            <a:ext cx="1096346" cy="2636248"/>
+            <a:off x="1993369" y="7659253"/>
+            <a:ext cx="1370948" cy="3273643"/>
           </a:xfrm>
           <a:prstGeom prst="bentConnector3">
             <a:avLst>
@@ -5443,8 +5973,8 @@
         </p:nvCxnSpPr>
         <p:spPr>
           <a:xfrm rot="5400000">
-            <a:off x="2453981" y="7388097"/>
-            <a:ext cx="1091602" cy="1517311"/>
+            <a:off x="2555209" y="8216349"/>
+            <a:ext cx="1366204" cy="2154706"/>
           </a:xfrm>
           <a:prstGeom prst="bentConnector3">
             <a:avLst>
@@ -5488,8 +6018,8 @@
         </p:nvCxnSpPr>
         <p:spPr>
           <a:xfrm rot="5400000">
-            <a:off x="3091105" y="8015733"/>
-            <a:ext cx="1082115" cy="252551"/>
+            <a:off x="3192333" y="8843985"/>
+            <a:ext cx="1356717" cy="889946"/>
           </a:xfrm>
           <a:prstGeom prst="bentConnector3">
             <a:avLst>
@@ -6304,7 +6834,7 @@
         </p:nvSpPr>
         <p:spPr bwMode="auto">
           <a:xfrm>
-            <a:off x="5825233" y="8692553"/>
+            <a:off x="5745065" y="9976804"/>
             <a:ext cx="745958" cy="600075"/>
           </a:xfrm>
           <a:prstGeom prst="rect">
@@ -6380,8 +6910,8 @@
         </p:nvCxnSpPr>
         <p:spPr>
           <a:xfrm rot="16200000" flipH="1">
-            <a:off x="4432523" y="6926864"/>
-            <a:ext cx="1091602" cy="2439775"/>
+            <a:off x="4533752" y="8392512"/>
+            <a:ext cx="1366204" cy="1802380"/>
           </a:xfrm>
           <a:prstGeom prst="bentConnector3">
             <a:avLst>
@@ -6652,8 +7182,8 @@
         </p:nvCxnSpPr>
         <p:spPr>
           <a:xfrm rot="16200000" flipH="1">
-            <a:off x="-247003" y="3233749"/>
-            <a:ext cx="3680815" cy="196472"/>
+            <a:off x="-499415" y="3486161"/>
+            <a:ext cx="4185639" cy="196472"/>
           </a:xfrm>
           <a:prstGeom prst="bentConnector2">
             <a:avLst/>

</xml_diff>

<commit_message>
The Class Diagram has been updated and there have been minor updates throughout the code including reorganizing the functions and variables to be consistent.
</commit_message>
<xml_diff>
--- a/Class Diagram.pptx
+++ b/Class Diagram.pptx
@@ -4044,6 +4044,48 @@
                   <a:srgbClr val="00FF00"/>
                 </a:highlight>
                 <a:latin typeface="Calibri" panose="020F0502020204030204" pitchFamily="34" charset="0"/>
+                <a:ea typeface="Calibri" panose="020F0502020204030204" pitchFamily="34" charset="0"/>
+                <a:cs typeface="Times New Roman" panose="02020603050405020304" pitchFamily="18" charset="0"/>
+              </a:rPr>
+              <a:t>+ Step() : void</a:t>
+            </a:r>
+          </a:p>
+          <a:p>
+            <a:pPr defTabSz="914400" eaLnBrk="0" fontAlgn="base" hangingPunct="0">
+              <a:spcBef>
+                <a:spcPct val="0"/>
+              </a:spcBef>
+              <a:spcAft>
+                <a:spcPct val="0"/>
+              </a:spcAft>
+            </a:pPr>
+            <a:r>
+              <a:rPr lang="en-US" altLang="en-US" sz="1100" i="1" dirty="0">
+                <a:highlight>
+                  <a:srgbClr val="00FF00"/>
+                </a:highlight>
+                <a:latin typeface="Calibri" panose="020F0502020204030204" pitchFamily="34" charset="0"/>
+                <a:ea typeface="Calibri" panose="020F0502020204030204" pitchFamily="34" charset="0"/>
+                <a:cs typeface="Times New Roman" panose="02020603050405020304" pitchFamily="18" charset="0"/>
+              </a:rPr>
+              <a:t>+ Die() : void</a:t>
+            </a:r>
+          </a:p>
+          <a:p>
+            <a:pPr defTabSz="914400" eaLnBrk="0" fontAlgn="base" hangingPunct="0">
+              <a:spcBef>
+                <a:spcPct val="0"/>
+              </a:spcBef>
+              <a:spcAft>
+                <a:spcPct val="0"/>
+              </a:spcAft>
+            </a:pPr>
+            <a:r>
+              <a:rPr lang="en-US" altLang="en-US" sz="1100" i="1" dirty="0">
+                <a:highlight>
+                  <a:srgbClr val="00FF00"/>
+                </a:highlight>
+                <a:latin typeface="Calibri" panose="020F0502020204030204" pitchFamily="34" charset="0"/>
                 <a:cs typeface="Times New Roman" panose="02020603050405020304" pitchFamily="18" charset="0"/>
               </a:rPr>
               <a:t>+ </a:t>
@@ -5074,7 +5116,7 @@
         <p:spPr bwMode="auto">
           <a:xfrm>
             <a:off x="13716818" y="1877696"/>
-            <a:ext cx="3976822" cy="1176963"/>
+            <a:ext cx="3976822" cy="1608850"/>
           </a:xfrm>
           <a:prstGeom prst="rect">
             <a:avLst/>
@@ -5190,8 +5232,121 @@
                   <a:srgbClr val="00FF00"/>
                 </a:highlight>
               </a:rPr>
+              <a:t>+ </a:t>
+            </a:r>
+            <a:r>
+              <a:rPr lang="en-US" altLang="en-US" sz="1100" dirty="0" err="1">
+                <a:highlight>
+                  <a:srgbClr val="00FF00"/>
+                </a:highlight>
+              </a:rPr>
+              <a:t>influenceFloors</a:t>
+            </a:r>
+            <a:r>
+              <a:rPr lang="en-US" altLang="en-US" sz="1100" dirty="0">
+                <a:highlight>
+                  <a:srgbClr val="00FF00"/>
+                </a:highlight>
+              </a:rPr>
+              <a:t>: bool</a:t>
+            </a:r>
+          </a:p>
+          <a:p>
+            <a:pPr defTabSz="914400" eaLnBrk="0" fontAlgn="base" hangingPunct="0">
+              <a:spcBef>
+                <a:spcPct val="0"/>
+              </a:spcBef>
+              <a:spcAft>
+                <a:spcPct val="0"/>
+              </a:spcAft>
+            </a:pPr>
+            <a:r>
+              <a:rPr lang="en-US" altLang="en-US" sz="1100" dirty="0">
+                <a:highlight>
+                  <a:srgbClr val="00FF00"/>
+                </a:highlight>
+              </a:rPr>
               <a:t>---------------------------------------------------------------------------------------</a:t>
             </a:r>
+          </a:p>
+          <a:p>
+            <a:pPr defTabSz="914400" eaLnBrk="0" fontAlgn="base" hangingPunct="0">
+              <a:spcBef>
+                <a:spcPct val="0"/>
+              </a:spcBef>
+              <a:spcAft>
+                <a:spcPct val="0"/>
+              </a:spcAft>
+            </a:pPr>
+            <a:r>
+              <a:rPr lang="en-US" altLang="en-US" sz="1100" dirty="0">
+                <a:highlight>
+                  <a:srgbClr val="00FF00"/>
+                </a:highlight>
+                <a:cs typeface="Times New Roman" panose="02020603050405020304" pitchFamily="18" charset="0"/>
+              </a:rPr>
+              <a:t>+ </a:t>
+            </a:r>
+            <a:r>
+              <a:rPr lang="en-US" altLang="en-US" sz="1100" dirty="0" err="1">
+                <a:highlight>
+                  <a:srgbClr val="00FF00"/>
+                </a:highlight>
+                <a:cs typeface="Times New Roman" panose="02020603050405020304" pitchFamily="18" charset="0"/>
+              </a:rPr>
+              <a:t>DestroyObject</a:t>
+            </a:r>
+            <a:r>
+              <a:rPr lang="en-US" altLang="en-US" sz="1100" dirty="0">
+                <a:highlight>
+                  <a:srgbClr val="00FF00"/>
+                </a:highlight>
+                <a:cs typeface="Times New Roman" panose="02020603050405020304" pitchFamily="18" charset="0"/>
+              </a:rPr>
+              <a:t>() : void &lt;&lt;override&gt;&gt;</a:t>
+            </a:r>
+          </a:p>
+          <a:p>
+            <a:pPr defTabSz="914400" eaLnBrk="0" fontAlgn="base" hangingPunct="0">
+              <a:spcBef>
+                <a:spcPct val="0"/>
+              </a:spcBef>
+              <a:spcAft>
+                <a:spcPct val="0"/>
+              </a:spcAft>
+            </a:pPr>
+            <a:r>
+              <a:rPr lang="en-US" altLang="en-US" sz="1100" dirty="0">
+                <a:highlight>
+                  <a:srgbClr val="00FF00"/>
+                </a:highlight>
+                <a:cs typeface="Times New Roman" panose="02020603050405020304" pitchFamily="18" charset="0"/>
+              </a:rPr>
+              <a:t>+ </a:t>
+            </a:r>
+            <a:r>
+              <a:rPr lang="en-US" altLang="en-US" sz="1100" dirty="0" err="1">
+                <a:highlight>
+                  <a:srgbClr val="00FF00"/>
+                </a:highlight>
+                <a:cs typeface="Times New Roman" panose="02020603050405020304" pitchFamily="18" charset="0"/>
+              </a:rPr>
+              <a:t>OnCreate</a:t>
+            </a:r>
+            <a:r>
+              <a:rPr lang="en-US" altLang="en-US" sz="1100" dirty="0">
+                <a:highlight>
+                  <a:srgbClr val="00FF00"/>
+                </a:highlight>
+                <a:cs typeface="Times New Roman" panose="02020603050405020304" pitchFamily="18" charset="0"/>
+              </a:rPr>
+              <a:t>() : void &lt;&lt;override&gt;&gt;</a:t>
+            </a:r>
+            <a:endParaRPr lang="en-US" altLang="en-US" sz="1100" dirty="0">
+              <a:highlight>
+                <a:srgbClr val="00FF00"/>
+              </a:highlight>
+            </a:endParaRPr>
           </a:p>
           <a:p>
             <a:pPr defTabSz="914400" eaLnBrk="0" fontAlgn="base" hangingPunct="0">
@@ -5296,8 +5451,8 @@
         </p:nvSpPr>
         <p:spPr bwMode="auto">
           <a:xfrm>
-            <a:off x="13716818" y="6240608"/>
-            <a:ext cx="3976822" cy="988380"/>
+            <a:off x="13716818" y="6240607"/>
+            <a:ext cx="3976822" cy="1541465"/>
           </a:xfrm>
           <a:prstGeom prst="rect">
             <a:avLst/>
@@ -5414,6 +5569,159 @@
                 </a:highlight>
               </a:rPr>
               <a:t>----------------------------------------------------------------------------------------</a:t>
+            </a:r>
+          </a:p>
+          <a:p>
+            <a:pPr defTabSz="914400" eaLnBrk="0" fontAlgn="base" hangingPunct="0">
+              <a:spcBef>
+                <a:spcPct val="0"/>
+              </a:spcBef>
+              <a:spcAft>
+                <a:spcPct val="0"/>
+              </a:spcAft>
+            </a:pPr>
+            <a:r>
+              <a:rPr lang="en-US" altLang="en-US" sz="1100" dirty="0">
+                <a:highlight>
+                  <a:srgbClr val="00FF00"/>
+                </a:highlight>
+                <a:cs typeface="Times New Roman" panose="02020603050405020304" pitchFamily="18" charset="0"/>
+              </a:rPr>
+              <a:t>+ </a:t>
+            </a:r>
+            <a:r>
+              <a:rPr lang="en-US" altLang="en-US" sz="1100" dirty="0" err="1">
+                <a:highlight>
+                  <a:srgbClr val="00FF00"/>
+                </a:highlight>
+                <a:cs typeface="Times New Roman" panose="02020603050405020304" pitchFamily="18" charset="0"/>
+              </a:rPr>
+              <a:t>DestroyObject</a:t>
+            </a:r>
+            <a:r>
+              <a:rPr lang="en-US" altLang="en-US" sz="1100" dirty="0">
+                <a:highlight>
+                  <a:srgbClr val="00FF00"/>
+                </a:highlight>
+                <a:cs typeface="Times New Roman" panose="02020603050405020304" pitchFamily="18" charset="0"/>
+              </a:rPr>
+              <a:t>() : void &lt;&lt;override&gt;&gt;</a:t>
+            </a:r>
+          </a:p>
+          <a:p>
+            <a:pPr defTabSz="914400" eaLnBrk="0" fontAlgn="base" hangingPunct="0">
+              <a:spcBef>
+                <a:spcPct val="0"/>
+              </a:spcBef>
+              <a:spcAft>
+                <a:spcPct val="0"/>
+              </a:spcAft>
+            </a:pPr>
+            <a:r>
+              <a:rPr lang="en-US" altLang="en-US" sz="1100" dirty="0">
+                <a:highlight>
+                  <a:srgbClr val="00FF00"/>
+                </a:highlight>
+                <a:cs typeface="Times New Roman" panose="02020603050405020304" pitchFamily="18" charset="0"/>
+              </a:rPr>
+              <a:t>+ </a:t>
+            </a:r>
+            <a:r>
+              <a:rPr lang="en-US" altLang="en-US" sz="1100" dirty="0" err="1">
+                <a:highlight>
+                  <a:srgbClr val="00FF00"/>
+                </a:highlight>
+                <a:cs typeface="Times New Roman" panose="02020603050405020304" pitchFamily="18" charset="0"/>
+              </a:rPr>
+              <a:t>OnCreate</a:t>
+            </a:r>
+            <a:r>
+              <a:rPr lang="en-US" altLang="en-US" sz="1100" dirty="0">
+                <a:highlight>
+                  <a:srgbClr val="00FF00"/>
+                </a:highlight>
+                <a:cs typeface="Times New Roman" panose="02020603050405020304" pitchFamily="18" charset="0"/>
+              </a:rPr>
+              <a:t>() : void &lt;&lt;override&gt;&gt;</a:t>
+            </a:r>
+            <a:endParaRPr lang="en-US" altLang="en-US" sz="1100" dirty="0">
+              <a:highlight>
+                <a:srgbClr val="00FF00"/>
+              </a:highlight>
+            </a:endParaRPr>
+          </a:p>
+          <a:p>
+            <a:pPr defTabSz="914400" eaLnBrk="0" fontAlgn="base" hangingPunct="0">
+              <a:spcBef>
+                <a:spcPct val="0"/>
+              </a:spcBef>
+              <a:spcAft>
+                <a:spcPct val="0"/>
+              </a:spcAft>
+            </a:pPr>
+            <a:r>
+              <a:rPr lang="en-US" altLang="en-US" sz="1100" dirty="0">
+                <a:highlight>
+                  <a:srgbClr val="00FF00"/>
+                </a:highlight>
+                <a:cs typeface="Times New Roman" panose="02020603050405020304" pitchFamily="18" charset="0"/>
+              </a:rPr>
+              <a:t>+ </a:t>
+            </a:r>
+            <a:r>
+              <a:rPr lang="en-US" altLang="en-US" sz="1100" dirty="0" err="1">
+                <a:highlight>
+                  <a:srgbClr val="00FF00"/>
+                </a:highlight>
+                <a:cs typeface="Times New Roman" panose="02020603050405020304" pitchFamily="18" charset="0"/>
+              </a:rPr>
+              <a:t>isSpaceFree</a:t>
+            </a:r>
+            <a:r>
+              <a:rPr lang="en-US" altLang="en-US" sz="1100" dirty="0">
+                <a:highlight>
+                  <a:srgbClr val="00FF00"/>
+                </a:highlight>
+                <a:cs typeface="Times New Roman" panose="02020603050405020304" pitchFamily="18" charset="0"/>
+              </a:rPr>
+              <a:t>(Vector2Int): bool &lt;&lt;override&gt;&gt;</a:t>
+            </a:r>
+          </a:p>
+          <a:p>
+            <a:pPr defTabSz="914400" eaLnBrk="0" fontAlgn="base" hangingPunct="0">
+              <a:spcBef>
+                <a:spcPct val="0"/>
+              </a:spcBef>
+              <a:spcAft>
+                <a:spcPct val="0"/>
+              </a:spcAft>
+            </a:pPr>
+            <a:r>
+              <a:rPr lang="en-US" altLang="en-US" sz="1100" dirty="0">
+                <a:highlight>
+                  <a:srgbClr val="00FF00"/>
+                </a:highlight>
+                <a:cs typeface="Times New Roman" panose="02020603050405020304" pitchFamily="18" charset="0"/>
+              </a:rPr>
+              <a:t>+ </a:t>
+            </a:r>
+            <a:r>
+              <a:rPr lang="en-US" altLang="en-US" sz="1100" dirty="0" err="1">
+                <a:highlight>
+                  <a:srgbClr val="00FF00"/>
+                </a:highlight>
+                <a:cs typeface="Times New Roman" panose="02020603050405020304" pitchFamily="18" charset="0"/>
+              </a:rPr>
+              <a:t>GetWorldObjectInventory</a:t>
+            </a:r>
+            <a:r>
+              <a:rPr lang="en-US" altLang="en-US" sz="1100" dirty="0">
+                <a:highlight>
+                  <a:srgbClr val="00FF00"/>
+                </a:highlight>
+                <a:cs typeface="Times New Roman" panose="02020603050405020304" pitchFamily="18" charset="0"/>
+              </a:rPr>
+              <a:t>(Vector2Int) : Inventory &lt;&lt;override&gt;&gt;</a:t>
             </a:r>
           </a:p>
           <a:p>
@@ -5524,8 +5832,8 @@
         </p:nvSpPr>
         <p:spPr bwMode="auto">
           <a:xfrm>
-            <a:off x="10191599" y="7782074"/>
-            <a:ext cx="1695450" cy="752475"/>
+            <a:off x="8535553" y="6540263"/>
+            <a:ext cx="3976821" cy="3282156"/>
           </a:xfrm>
           <a:prstGeom prst="rect">
             <a:avLst/>
@@ -5560,26 +5868,633 @@
             </a:pPr>
             <a:r>
               <a:rPr lang="en-US" altLang="en-US" sz="1100" i="1" dirty="0">
+                <a:highlight>
+                  <a:srgbClr val="00FF00"/>
+                </a:highlight>
                 <a:latin typeface="Calibri" panose="020F0502020204030204" pitchFamily="34" charset="0"/>
                 <a:ea typeface="Calibri" panose="020F0502020204030204" pitchFamily="34" charset="0"/>
                 <a:cs typeface="Times New Roman" panose="02020603050405020304" pitchFamily="18" charset="0"/>
               </a:rPr>
               <a:t>Unit</a:t>
             </a:r>
-            <a:endParaRPr lang="en-US" altLang="en-US" sz="800" i="1" dirty="0"/>
-          </a:p>
-          <a:p>
-            <a:pPr defTabSz="914400" eaLnBrk="0" fontAlgn="base" hangingPunct="0">
-              <a:spcBef>
-                <a:spcPct val="0"/>
-              </a:spcBef>
-              <a:spcAft>
-                <a:spcPct val="0"/>
-              </a:spcAft>
-            </a:pPr>
-            <a:endParaRPr lang="en-US" altLang="en-US" sz="1800" dirty="0">
-              <a:latin typeface="Arial" panose="020B0604020202020204" pitchFamily="34" charset="0"/>
+          </a:p>
+          <a:p>
+            <a:pPr defTabSz="914400" eaLnBrk="0" fontAlgn="base" hangingPunct="0">
+              <a:spcBef>
+                <a:spcPct val="0"/>
+              </a:spcBef>
+              <a:spcAft>
+                <a:spcPct val="0"/>
+              </a:spcAft>
+            </a:pPr>
+            <a:r>
+              <a:rPr lang="en-US" altLang="en-US" sz="1100" i="1" dirty="0">
+                <a:highlight>
+                  <a:srgbClr val="00FF00"/>
+                </a:highlight>
+                <a:latin typeface="Calibri" panose="020F0502020204030204" pitchFamily="34" charset="0"/>
+                <a:cs typeface="Times New Roman" panose="02020603050405020304" pitchFamily="18" charset="0"/>
+              </a:rPr>
+              <a:t>----------------------------------------------------------------------------------------</a:t>
+            </a:r>
+          </a:p>
+          <a:p>
+            <a:pPr defTabSz="914400" eaLnBrk="0" fontAlgn="base" hangingPunct="0">
+              <a:spcBef>
+                <a:spcPct val="0"/>
+              </a:spcBef>
+              <a:spcAft>
+                <a:spcPct val="0"/>
+              </a:spcAft>
+            </a:pPr>
+            <a:r>
+              <a:rPr lang="en-US" altLang="en-US" sz="1100" i="1" dirty="0">
+                <a:highlight>
+                  <a:srgbClr val="00FF00"/>
+                </a:highlight>
+                <a:latin typeface="Calibri" panose="020F0502020204030204" pitchFamily="34" charset="0"/>
+                <a:cs typeface="Times New Roman" panose="02020603050405020304" pitchFamily="18" charset="0"/>
+              </a:rPr>
+              <a:t>+ </a:t>
+            </a:r>
+            <a:r>
+              <a:rPr lang="en-US" altLang="en-US" sz="1100" i="1" u="sng" dirty="0" err="1">
+                <a:highlight>
+                  <a:srgbClr val="00FF00"/>
+                </a:highlight>
+                <a:latin typeface="Calibri" panose="020F0502020204030204" pitchFamily="34" charset="0"/>
+                <a:cs typeface="Times New Roman" panose="02020603050405020304" pitchFamily="18" charset="0"/>
+              </a:rPr>
+              <a:t>unitList</a:t>
+            </a:r>
+            <a:r>
+              <a:rPr lang="en-US" altLang="en-US" sz="1100" i="1" u="sng" dirty="0">
+                <a:highlight>
+                  <a:srgbClr val="00FF00"/>
+                </a:highlight>
+                <a:latin typeface="Calibri" panose="020F0502020204030204" pitchFamily="34" charset="0"/>
+                <a:cs typeface="Times New Roman" panose="02020603050405020304" pitchFamily="18" charset="0"/>
+              </a:rPr>
+              <a:t> : List&lt;Unit&gt;</a:t>
+            </a:r>
+          </a:p>
+          <a:p>
+            <a:pPr defTabSz="914400" eaLnBrk="0" fontAlgn="base" hangingPunct="0">
+              <a:spcBef>
+                <a:spcPct val="0"/>
+              </a:spcBef>
+              <a:spcAft>
+                <a:spcPct val="0"/>
+              </a:spcAft>
+            </a:pPr>
+            <a:r>
+              <a:rPr lang="en-US" altLang="en-US" sz="1100" dirty="0">
+                <a:highlight>
+                  <a:srgbClr val="00FF00"/>
+                </a:highlight>
+              </a:rPr>
+              <a:t>+ </a:t>
+            </a:r>
+            <a:r>
+              <a:rPr lang="en-US" altLang="en-US" sz="1100" dirty="0" err="1">
+                <a:highlight>
+                  <a:srgbClr val="00FF00"/>
+                </a:highlight>
+              </a:rPr>
+              <a:t>unitTnventory</a:t>
+            </a:r>
+            <a:r>
+              <a:rPr lang="en-US" altLang="en-US" sz="1100" dirty="0">
+                <a:highlight>
+                  <a:srgbClr val="00FF00"/>
+                </a:highlight>
+              </a:rPr>
+              <a:t> : Inventory</a:t>
+            </a:r>
+          </a:p>
+          <a:p>
+            <a:pPr defTabSz="914400" eaLnBrk="0" fontAlgn="base" hangingPunct="0">
+              <a:spcBef>
+                <a:spcPct val="0"/>
+              </a:spcBef>
+              <a:spcAft>
+                <a:spcPct val="0"/>
+              </a:spcAft>
+            </a:pPr>
+            <a:r>
+              <a:rPr lang="en-US" altLang="en-US" sz="1100" dirty="0">
+                <a:highlight>
+                  <a:srgbClr val="00FF00"/>
+                </a:highlight>
+              </a:rPr>
+              <a:t>+ burrower : bool</a:t>
+            </a:r>
+          </a:p>
+          <a:p>
+            <a:pPr defTabSz="914400" eaLnBrk="0" fontAlgn="base" hangingPunct="0">
+              <a:spcBef>
+                <a:spcPct val="0"/>
+              </a:spcBef>
+              <a:spcAft>
+                <a:spcPct val="0"/>
+              </a:spcAft>
+            </a:pPr>
+            <a:r>
+              <a:rPr lang="en-US" altLang="en-US" sz="1100" dirty="0">
+                <a:highlight>
+                  <a:srgbClr val="00FF00"/>
+                </a:highlight>
+              </a:rPr>
+              <a:t>+ dead : bool</a:t>
+            </a:r>
+          </a:p>
+          <a:p>
+            <a:pPr defTabSz="914400" eaLnBrk="0" fontAlgn="base" hangingPunct="0">
+              <a:spcBef>
+                <a:spcPct val="0"/>
+              </a:spcBef>
+              <a:spcAft>
+                <a:spcPct val="0"/>
+              </a:spcAft>
+            </a:pPr>
+            <a:r>
+              <a:rPr lang="en-US" altLang="en-US" sz="1100" dirty="0">
+                <a:highlight>
+                  <a:srgbClr val="00FF00"/>
+                </a:highlight>
+              </a:rPr>
+              <a:t>+ speed : int</a:t>
+            </a:r>
+          </a:p>
+          <a:p>
+            <a:pPr defTabSz="914400" eaLnBrk="0" fontAlgn="base" hangingPunct="0">
+              <a:spcBef>
+                <a:spcPct val="0"/>
+              </a:spcBef>
+              <a:spcAft>
+                <a:spcPct val="0"/>
+              </a:spcAft>
+            </a:pPr>
+            <a:r>
+              <a:rPr lang="en-US" altLang="en-US" sz="1100" dirty="0">
+                <a:highlight>
+                  <a:srgbClr val="00FF00"/>
+                </a:highlight>
+              </a:rPr>
+              <a:t>- </a:t>
+            </a:r>
+            <a:r>
+              <a:rPr lang="en-US" altLang="en-US" sz="1100" dirty="0" err="1">
+                <a:highlight>
+                  <a:srgbClr val="00FF00"/>
+                </a:highlight>
+              </a:rPr>
+              <a:t>speedCounter</a:t>
+            </a:r>
+            <a:r>
+              <a:rPr lang="en-US" altLang="en-US" sz="1100" dirty="0">
+                <a:highlight>
+                  <a:srgbClr val="00FF00"/>
+                </a:highlight>
+              </a:rPr>
+              <a:t> : int</a:t>
+            </a:r>
+          </a:p>
+          <a:p>
+            <a:pPr defTabSz="914400" eaLnBrk="0" fontAlgn="base" hangingPunct="0">
+              <a:spcBef>
+                <a:spcPct val="0"/>
+              </a:spcBef>
+              <a:spcAft>
+                <a:spcPct val="0"/>
+              </a:spcAft>
+            </a:pPr>
+            <a:r>
+              <a:rPr lang="en-US" altLang="en-US" sz="1100" dirty="0">
+                <a:highlight>
+                  <a:srgbClr val="00FF00"/>
+                </a:highlight>
+              </a:rPr>
+              <a:t>----------------------------------------------------------------------------------------</a:t>
+            </a:r>
+          </a:p>
+          <a:p>
+            <a:pPr defTabSz="914400" eaLnBrk="0" fontAlgn="base" hangingPunct="0">
+              <a:spcBef>
+                <a:spcPct val="0"/>
+              </a:spcBef>
+              <a:spcAft>
+                <a:spcPct val="0"/>
+              </a:spcAft>
+            </a:pPr>
+            <a:r>
+              <a:rPr lang="en-US" altLang="en-US" sz="1100" i="1" dirty="0">
+                <a:highlight>
+                  <a:srgbClr val="00FF00"/>
+                </a:highlight>
+              </a:rPr>
+              <a:t># </a:t>
+            </a:r>
+            <a:r>
+              <a:rPr lang="en-US" altLang="en-US" sz="1100" i="1" dirty="0" err="1">
+                <a:highlight>
+                  <a:srgbClr val="00FF00"/>
+                </a:highlight>
+              </a:rPr>
+              <a:t>TakeTurn</a:t>
+            </a:r>
+            <a:r>
+              <a:rPr lang="en-US" altLang="en-US" sz="1100" i="1" dirty="0">
+                <a:highlight>
+                  <a:srgbClr val="00FF00"/>
+                </a:highlight>
+              </a:rPr>
+              <a:t>() : void</a:t>
+            </a:r>
+            <a:endParaRPr lang="en-US" altLang="en-US" sz="1100" dirty="0">
+              <a:highlight>
+                <a:srgbClr val="00FF00"/>
+              </a:highlight>
+              <a:cs typeface="Times New Roman" panose="02020603050405020304" pitchFamily="18" charset="0"/>
             </a:endParaRPr>
+          </a:p>
+          <a:p>
+            <a:pPr defTabSz="914400" eaLnBrk="0" fontAlgn="base" hangingPunct="0">
+              <a:spcBef>
+                <a:spcPct val="0"/>
+              </a:spcBef>
+              <a:spcAft>
+                <a:spcPct val="0"/>
+              </a:spcAft>
+            </a:pPr>
+            <a:r>
+              <a:rPr lang="en-US" altLang="en-US" sz="1100" dirty="0">
+                <a:highlight>
+                  <a:srgbClr val="00FF00"/>
+                </a:highlight>
+                <a:cs typeface="Times New Roman" panose="02020603050405020304" pitchFamily="18" charset="0"/>
+              </a:rPr>
+              <a:t>- </a:t>
+            </a:r>
+            <a:r>
+              <a:rPr lang="en-US" altLang="en-US" sz="1100" dirty="0" err="1">
+                <a:highlight>
+                  <a:srgbClr val="00FF00"/>
+                </a:highlight>
+                <a:cs typeface="Times New Roman" panose="02020603050405020304" pitchFamily="18" charset="0"/>
+              </a:rPr>
+              <a:t>GetMoveDirection</a:t>
+            </a:r>
+            <a:r>
+              <a:rPr lang="en-US" altLang="en-US" sz="1100" dirty="0">
+                <a:highlight>
+                  <a:srgbClr val="00FF00"/>
+                </a:highlight>
+                <a:cs typeface="Times New Roman" panose="02020603050405020304" pitchFamily="18" charset="0"/>
+              </a:rPr>
+              <a:t>() : Vector2Int</a:t>
+            </a:r>
+          </a:p>
+          <a:p>
+            <a:pPr defTabSz="914400" eaLnBrk="0" fontAlgn="base" hangingPunct="0">
+              <a:spcBef>
+                <a:spcPct val="0"/>
+              </a:spcBef>
+              <a:spcAft>
+                <a:spcPct val="0"/>
+              </a:spcAft>
+            </a:pPr>
+            <a:r>
+              <a:rPr lang="en-US" altLang="en-US" sz="1100" dirty="0">
+                <a:highlight>
+                  <a:srgbClr val="00FF00"/>
+                </a:highlight>
+                <a:cs typeface="Times New Roman" panose="02020603050405020304" pitchFamily="18" charset="0"/>
+              </a:rPr>
+              <a:t>- </a:t>
+            </a:r>
+            <a:r>
+              <a:rPr lang="en-US" altLang="en-US" sz="1100" dirty="0" err="1">
+                <a:highlight>
+                  <a:srgbClr val="00FF00"/>
+                </a:highlight>
+                <a:cs typeface="Times New Roman" panose="02020603050405020304" pitchFamily="18" charset="0"/>
+              </a:rPr>
+              <a:t>GetMoveMap</a:t>
+            </a:r>
+            <a:r>
+              <a:rPr lang="en-US" altLang="en-US" sz="1100" dirty="0">
+                <a:highlight>
+                  <a:srgbClr val="00FF00"/>
+                </a:highlight>
+                <a:cs typeface="Times New Roman" panose="02020603050405020304" pitchFamily="18" charset="0"/>
+              </a:rPr>
+              <a:t>() : Node[,]</a:t>
+            </a:r>
+          </a:p>
+          <a:p>
+            <a:pPr defTabSz="914400" eaLnBrk="0" fontAlgn="base" hangingPunct="0">
+              <a:spcBef>
+                <a:spcPct val="0"/>
+              </a:spcBef>
+              <a:spcAft>
+                <a:spcPct val="0"/>
+              </a:spcAft>
+            </a:pPr>
+            <a:r>
+              <a:rPr lang="en-US" altLang="en-US" sz="1100" dirty="0">
+                <a:highlight>
+                  <a:srgbClr val="00FF00"/>
+                </a:highlight>
+              </a:rPr>
+              <a:t># </a:t>
+            </a:r>
+            <a:r>
+              <a:rPr lang="en-US" altLang="en-US" sz="1100" dirty="0" err="1">
+                <a:highlight>
+                  <a:srgbClr val="00FF00"/>
+                </a:highlight>
+              </a:rPr>
+              <a:t>AttackMove</a:t>
+            </a:r>
+            <a:r>
+              <a:rPr lang="en-US" altLang="en-US" sz="1100" dirty="0">
+                <a:highlight>
+                  <a:srgbClr val="00FF00"/>
+                </a:highlight>
+              </a:rPr>
+              <a:t>(Vecotr2Int) : bool</a:t>
+            </a:r>
+          </a:p>
+          <a:p>
+            <a:pPr defTabSz="914400" eaLnBrk="0" fontAlgn="base" hangingPunct="0">
+              <a:spcBef>
+                <a:spcPct val="0"/>
+              </a:spcBef>
+              <a:spcAft>
+                <a:spcPct val="0"/>
+              </a:spcAft>
+            </a:pPr>
+            <a:r>
+              <a:rPr lang="en-US" altLang="en-US" sz="1100" dirty="0">
+                <a:highlight>
+                  <a:srgbClr val="00FF00"/>
+                </a:highlight>
+              </a:rPr>
+              <a:t>- </a:t>
+            </a:r>
+            <a:r>
+              <a:rPr lang="en-US" altLang="en-US" sz="1100" dirty="0" err="1">
+                <a:highlight>
+                  <a:srgbClr val="00FF00"/>
+                </a:highlight>
+              </a:rPr>
+              <a:t>MeleeAttack</a:t>
+            </a:r>
+            <a:r>
+              <a:rPr lang="en-US" altLang="en-US" sz="1100" dirty="0">
+                <a:highlight>
+                  <a:srgbClr val="00FF00"/>
+                </a:highlight>
+              </a:rPr>
+              <a:t>(</a:t>
+            </a:r>
+            <a:r>
+              <a:rPr lang="en-US" altLang="en-US" sz="1100" dirty="0" err="1">
+                <a:highlight>
+                  <a:srgbClr val="00FF00"/>
+                </a:highlight>
+              </a:rPr>
+              <a:t>RoguelikeObject</a:t>
+            </a:r>
+            <a:r>
+              <a:rPr lang="en-US" altLang="en-US" sz="1100" dirty="0">
+                <a:highlight>
+                  <a:srgbClr val="00FF00"/>
+                </a:highlight>
+              </a:rPr>
+              <a:t>) : bool</a:t>
+            </a:r>
+          </a:p>
+          <a:p>
+            <a:pPr defTabSz="914400" eaLnBrk="0" fontAlgn="base" hangingPunct="0">
+              <a:spcBef>
+                <a:spcPct val="0"/>
+              </a:spcBef>
+              <a:spcAft>
+                <a:spcPct val="0"/>
+              </a:spcAft>
+            </a:pPr>
+            <a:r>
+              <a:rPr lang="en-US" altLang="en-US" sz="1100" dirty="0">
+                <a:highlight>
+                  <a:srgbClr val="00FF00"/>
+                </a:highlight>
+              </a:rPr>
+              <a:t>+ Die() : void &lt;&lt;override&gt;&gt;</a:t>
+            </a:r>
+          </a:p>
+          <a:p>
+            <a:pPr defTabSz="914400" eaLnBrk="0" fontAlgn="base" hangingPunct="0">
+              <a:spcBef>
+                <a:spcPct val="0"/>
+              </a:spcBef>
+              <a:spcAft>
+                <a:spcPct val="0"/>
+              </a:spcAft>
+            </a:pPr>
+            <a:r>
+              <a:rPr lang="en-US" altLang="en-US" sz="1100" dirty="0">
+                <a:highlight>
+                  <a:srgbClr val="00FF00"/>
+                </a:highlight>
+              </a:rPr>
+              <a:t>+ Step() : void &lt;&lt;override&gt;&gt;</a:t>
+            </a:r>
+          </a:p>
+          <a:p>
+            <a:pPr defTabSz="914400" eaLnBrk="0" fontAlgn="base" hangingPunct="0">
+              <a:spcBef>
+                <a:spcPct val="0"/>
+              </a:spcBef>
+              <a:spcAft>
+                <a:spcPct val="0"/>
+              </a:spcAft>
+            </a:pPr>
+            <a:r>
+              <a:rPr lang="en-US" altLang="en-US" sz="1100" dirty="0">
+                <a:highlight>
+                  <a:srgbClr val="00FF00"/>
+                </a:highlight>
+                <a:cs typeface="Times New Roman" panose="02020603050405020304" pitchFamily="18" charset="0"/>
+              </a:rPr>
+              <a:t>+ </a:t>
+            </a:r>
+            <a:r>
+              <a:rPr lang="en-US" altLang="en-US" sz="1100" dirty="0" err="1">
+                <a:highlight>
+                  <a:srgbClr val="00FF00"/>
+                </a:highlight>
+                <a:cs typeface="Times New Roman" panose="02020603050405020304" pitchFamily="18" charset="0"/>
+              </a:rPr>
+              <a:t>GetWorldObjectInventory</a:t>
+            </a:r>
+            <a:r>
+              <a:rPr lang="en-US" altLang="en-US" sz="1100" dirty="0">
+                <a:highlight>
+                  <a:srgbClr val="00FF00"/>
+                </a:highlight>
+                <a:cs typeface="Times New Roman" panose="02020603050405020304" pitchFamily="18" charset="0"/>
+              </a:rPr>
+              <a:t>(Vector2Int) : Inventory &lt;&lt;override&gt;&gt;</a:t>
+            </a:r>
+            <a:endParaRPr lang="en-US" altLang="en-US" sz="1100" dirty="0">
+              <a:highlight>
+                <a:srgbClr val="00FF00"/>
+              </a:highlight>
+            </a:endParaRPr>
+          </a:p>
+          <a:p>
+            <a:pPr defTabSz="914400" eaLnBrk="0" fontAlgn="base" hangingPunct="0">
+              <a:spcBef>
+                <a:spcPct val="0"/>
+              </a:spcBef>
+              <a:spcAft>
+                <a:spcPct val="0"/>
+              </a:spcAft>
+            </a:pPr>
+            <a:r>
+              <a:rPr lang="en-US" altLang="en-US" sz="1100" dirty="0">
+                <a:highlight>
+                  <a:srgbClr val="00FF00"/>
+                </a:highlight>
+                <a:cs typeface="Times New Roman" panose="02020603050405020304" pitchFamily="18" charset="0"/>
+              </a:rPr>
+              <a:t>+ </a:t>
+            </a:r>
+            <a:r>
+              <a:rPr lang="en-US" altLang="en-US" sz="1100" dirty="0" err="1">
+                <a:highlight>
+                  <a:srgbClr val="00FF00"/>
+                </a:highlight>
+                <a:cs typeface="Times New Roman" panose="02020603050405020304" pitchFamily="18" charset="0"/>
+              </a:rPr>
+              <a:t>isSpaceFree</a:t>
+            </a:r>
+            <a:r>
+              <a:rPr lang="en-US" altLang="en-US" sz="1100" dirty="0">
+                <a:highlight>
+                  <a:srgbClr val="00FF00"/>
+                </a:highlight>
+                <a:cs typeface="Times New Roman" panose="02020603050405020304" pitchFamily="18" charset="0"/>
+              </a:rPr>
+              <a:t>(Vector2Int): bool &lt;&lt;override&gt;&gt;</a:t>
+            </a:r>
+          </a:p>
+          <a:p>
+            <a:pPr defTabSz="914400" eaLnBrk="0" fontAlgn="base" hangingPunct="0">
+              <a:spcBef>
+                <a:spcPct val="0"/>
+              </a:spcBef>
+              <a:spcAft>
+                <a:spcPct val="0"/>
+              </a:spcAft>
+            </a:pPr>
+            <a:r>
+              <a:rPr lang="en-US" altLang="en-US" sz="1100" dirty="0">
+                <a:highlight>
+                  <a:srgbClr val="00FF00"/>
+                </a:highlight>
+                <a:cs typeface="Times New Roman" panose="02020603050405020304" pitchFamily="18" charset="0"/>
+              </a:rPr>
+              <a:t>+ </a:t>
+            </a:r>
+            <a:r>
+              <a:rPr lang="en-US" altLang="en-US" sz="1100" dirty="0" err="1">
+                <a:highlight>
+                  <a:srgbClr val="00FF00"/>
+                </a:highlight>
+                <a:cs typeface="Times New Roman" panose="02020603050405020304" pitchFamily="18" charset="0"/>
+              </a:rPr>
+              <a:t>OnCreate</a:t>
+            </a:r>
+            <a:r>
+              <a:rPr lang="en-US" altLang="en-US" sz="1100" dirty="0">
+                <a:highlight>
+                  <a:srgbClr val="00FF00"/>
+                </a:highlight>
+                <a:cs typeface="Times New Roman" panose="02020603050405020304" pitchFamily="18" charset="0"/>
+              </a:rPr>
+              <a:t>() : void &lt;&lt;override&gt;&gt;</a:t>
+            </a:r>
+          </a:p>
+          <a:p>
+            <a:pPr defTabSz="914400" eaLnBrk="0" fontAlgn="base" hangingPunct="0">
+              <a:spcBef>
+                <a:spcPct val="0"/>
+              </a:spcBef>
+              <a:spcAft>
+                <a:spcPct val="0"/>
+              </a:spcAft>
+            </a:pPr>
+            <a:r>
+              <a:rPr lang="en-US" altLang="en-US" sz="1100" dirty="0">
+                <a:highlight>
+                  <a:srgbClr val="00FF00"/>
+                </a:highlight>
+                <a:cs typeface="Times New Roman" panose="02020603050405020304" pitchFamily="18" charset="0"/>
+              </a:rPr>
+              <a:t>+ </a:t>
+            </a:r>
+            <a:r>
+              <a:rPr lang="en-US" altLang="en-US" sz="1100" dirty="0" err="1">
+                <a:highlight>
+                  <a:srgbClr val="00FF00"/>
+                </a:highlight>
+                <a:cs typeface="Times New Roman" panose="02020603050405020304" pitchFamily="18" charset="0"/>
+              </a:rPr>
+              <a:t>DestroyObject</a:t>
+            </a:r>
+            <a:r>
+              <a:rPr lang="en-US" altLang="en-US" sz="1100" dirty="0">
+                <a:highlight>
+                  <a:srgbClr val="00FF00"/>
+                </a:highlight>
+                <a:cs typeface="Times New Roman" panose="02020603050405020304" pitchFamily="18" charset="0"/>
+              </a:rPr>
+              <a:t>() : void &lt;&lt;override&gt;&gt;</a:t>
+            </a:r>
+            <a:endParaRPr lang="en-US" altLang="en-US" sz="1100" dirty="0">
+              <a:highlight>
+                <a:srgbClr val="00FF00"/>
+              </a:highlight>
+            </a:endParaRPr>
+          </a:p>
+          <a:p>
+            <a:pPr defTabSz="914400" eaLnBrk="0" fontAlgn="base" hangingPunct="0">
+              <a:spcBef>
+                <a:spcPct val="0"/>
+              </a:spcBef>
+              <a:spcAft>
+                <a:spcPct val="0"/>
+              </a:spcAft>
+            </a:pPr>
+            <a:endParaRPr lang="en-US" altLang="en-US" sz="1100" dirty="0">
+              <a:highlight>
+                <a:srgbClr val="00FF00"/>
+              </a:highlight>
+            </a:endParaRPr>
+          </a:p>
+          <a:p>
+            <a:pPr defTabSz="914400" eaLnBrk="0" fontAlgn="base" hangingPunct="0">
+              <a:spcBef>
+                <a:spcPct val="0"/>
+              </a:spcBef>
+              <a:spcAft>
+                <a:spcPct val="0"/>
+              </a:spcAft>
+            </a:pPr>
+            <a:endParaRPr lang="en-US" altLang="en-US" sz="1100" i="1" dirty="0"/>
           </a:p>
         </p:txBody>
       </p:sp>
@@ -5645,7 +6560,7 @@
         <p:spPr>
           <a:xfrm>
             <a:off x="12549330" y="4197747"/>
-            <a:ext cx="1167488" cy="2537051"/>
+            <a:ext cx="1167488" cy="2813593"/>
           </a:xfrm>
           <a:prstGeom prst="bentConnector3">
             <a:avLst>
@@ -5689,8 +6604,8 @@
         </p:nvCxnSpPr>
         <p:spPr>
           <a:xfrm flipV="1">
-            <a:off x="12549330" y="2466178"/>
-            <a:ext cx="1167488" cy="1731569"/>
+            <a:off x="12549330" y="2682121"/>
+            <a:ext cx="1167488" cy="1515626"/>
           </a:xfrm>
           <a:prstGeom prst="bentConnector3">
             <a:avLst>
@@ -5733,9 +6648,9 @@
           <p:nvPr/>
         </p:nvCxnSpPr>
         <p:spPr>
-          <a:xfrm rot="16200000" flipH="1">
-            <a:off x="9917769" y="6660518"/>
-            <a:ext cx="1943249" cy="299861"/>
+          <a:xfrm rot="5400000">
+            <a:off x="10280995" y="6081795"/>
+            <a:ext cx="701438" cy="215499"/>
           </a:xfrm>
           <a:prstGeom prst="bentConnector3">
             <a:avLst>
@@ -6316,8 +7231,8 @@
         </p:nvCxnSpPr>
         <p:spPr>
           <a:xfrm rot="5400000">
-            <a:off x="14588817" y="2649447"/>
-            <a:ext cx="711201" cy="1521625"/>
+            <a:off x="14804760" y="2865391"/>
+            <a:ext cx="279314" cy="1521625"/>
           </a:xfrm>
           <a:prstGeom prst="bentConnector3">
             <a:avLst>
@@ -6475,8 +7390,8 @@
         </p:nvCxnSpPr>
         <p:spPr>
           <a:xfrm rot="5400000">
-            <a:off x="14813782" y="7290209"/>
-            <a:ext cx="952668" cy="830226"/>
+            <a:off x="15090324" y="7566751"/>
+            <a:ext cx="399584" cy="830226"/>
           </a:xfrm>
           <a:prstGeom prst="bentConnector3">
             <a:avLst/>
@@ -6632,8 +7547,8 @@
         </p:nvCxnSpPr>
         <p:spPr>
           <a:xfrm rot="16200000" flipH="1">
-            <a:off x="15701234" y="7232983"/>
-            <a:ext cx="949960" cy="941970"/>
+            <a:off x="15977776" y="7509525"/>
+            <a:ext cx="396876" cy="941970"/>
           </a:xfrm>
           <a:prstGeom prst="bentConnector3">
             <a:avLst>
@@ -6791,8 +7706,8 @@
         </p:nvCxnSpPr>
         <p:spPr>
           <a:xfrm rot="16200000" flipH="1">
-            <a:off x="15933373" y="2826514"/>
-            <a:ext cx="711201" cy="1167489"/>
+            <a:off x="16149316" y="3042458"/>
+            <a:ext cx="279314" cy="1167489"/>
           </a:xfrm>
           <a:prstGeom prst="bentConnector3">
             <a:avLst>

</xml_diff>

<commit_message>
Updates to the RogueSpriteRenderer, RoguelikeObject, Player, Unit, and PickupDrop.
The RogueSpriteRenderer now has a CopyValues function that copies the values from another RogueSpriteRenderer and a ClearValues function that resets the values.
RoguelikeObjects now have the following functions: TakeDamage(), AttemptDodge(), Dodge().
</commit_message>
<xml_diff>
--- a/Class Diagram.pptx
+++ b/Class Diagram.pptx
@@ -2988,7 +2988,7 @@
         <p:spPr bwMode="auto">
           <a:xfrm>
             <a:off x="1691639" y="2743832"/>
-            <a:ext cx="4854005" cy="6719481"/>
+            <a:ext cx="4854005" cy="7555200"/>
           </a:xfrm>
           <a:prstGeom prst="rect">
             <a:avLst/>
@@ -3940,6 +3940,46 @@
               </a:spcAft>
             </a:pPr>
             <a:r>
+              <a:rPr lang="en-US" altLang="en-US" sz="1100" dirty="0">
+                <a:cs typeface="Times New Roman" panose="02020603050405020304" pitchFamily="18" charset="0"/>
+              </a:rPr>
+              <a:t>+ </a:t>
+            </a:r>
+            <a:r>
+              <a:rPr lang="en-US" altLang="en-US" sz="1100" dirty="0" err="1">
+                <a:cs typeface="Times New Roman" panose="02020603050405020304" pitchFamily="18" charset="0"/>
+              </a:rPr>
+              <a:t>TakeDamage</a:t>
+            </a:r>
+            <a:r>
+              <a:rPr lang="en-US" altLang="en-US" sz="1100" dirty="0">
+                <a:cs typeface="Times New Roman" panose="02020603050405020304" pitchFamily="18" charset="0"/>
+              </a:rPr>
+              <a:t>(</a:t>
+            </a:r>
+            <a:r>
+              <a:rPr lang="en-US" altLang="en-US" sz="1100" dirty="0" err="1">
+                <a:cs typeface="Times New Roman" panose="02020603050405020304" pitchFamily="18" charset="0"/>
+              </a:rPr>
+              <a:t>RoguelikeObject</a:t>
+            </a:r>
+            <a:r>
+              <a:rPr lang="en-US" altLang="en-US" sz="1100" dirty="0">
+                <a:cs typeface="Times New Roman" panose="02020603050405020304" pitchFamily="18" charset="0"/>
+              </a:rPr>
+              <a:t>, int)</a:t>
+            </a:r>
+          </a:p>
+          <a:p>
+            <a:pPr defTabSz="914400" eaLnBrk="0" fontAlgn="base" hangingPunct="0">
+              <a:spcBef>
+                <a:spcPct val="0"/>
+              </a:spcBef>
+              <a:spcAft>
+                <a:spcPct val="0"/>
+              </a:spcAft>
+            </a:pPr>
+            <a:r>
               <a:rPr lang="en-US" altLang="en-US" sz="1100" i="1" dirty="0">
                 <a:ea typeface="Calibri" panose="020F0502020204030204" pitchFamily="34" charset="0"/>
                 <a:cs typeface="Times New Roman" panose="02020603050405020304" pitchFamily="18" charset="0"/>
@@ -4039,6 +4079,76 @@
                 <a:cs typeface="Times New Roman" panose="02020603050405020304" pitchFamily="18" charset="0"/>
               </a:rPr>
               <a:t>+ Die() : void</a:t>
+            </a:r>
+          </a:p>
+          <a:p>
+            <a:pPr defTabSz="914400" eaLnBrk="0" fontAlgn="base" hangingPunct="0">
+              <a:spcBef>
+                <a:spcPct val="0"/>
+              </a:spcBef>
+              <a:spcAft>
+                <a:spcPct val="0"/>
+              </a:spcAft>
+            </a:pPr>
+            <a:r>
+              <a:rPr lang="en-US" altLang="en-US" sz="1100" i="1" dirty="0">
+                <a:ea typeface="Calibri" panose="020F0502020204030204" pitchFamily="34" charset="0"/>
+                <a:cs typeface="Times New Roman" panose="02020603050405020304" pitchFamily="18" charset="0"/>
+              </a:rPr>
+              <a:t>+ </a:t>
+            </a:r>
+            <a:r>
+              <a:rPr lang="en-US" altLang="en-US" sz="1100" i="1" dirty="0" err="1">
+                <a:ea typeface="Calibri" panose="020F0502020204030204" pitchFamily="34" charset="0"/>
+                <a:cs typeface="Times New Roman" panose="02020603050405020304" pitchFamily="18" charset="0"/>
+              </a:rPr>
+              <a:t>AttemptDodge</a:t>
+            </a:r>
+            <a:r>
+              <a:rPr lang="en-US" altLang="en-US" sz="1100" i="1" dirty="0">
+                <a:ea typeface="Calibri" panose="020F0502020204030204" pitchFamily="34" charset="0"/>
+                <a:cs typeface="Times New Roman" panose="02020603050405020304" pitchFamily="18" charset="0"/>
+              </a:rPr>
+              <a:t>(</a:t>
+            </a:r>
+            <a:r>
+              <a:rPr lang="en-US" altLang="en-US" sz="1100" dirty="0" err="1"/>
+              <a:t>RoguelikeObject</a:t>
+            </a:r>
+            <a:r>
+              <a:rPr lang="en-US" altLang="en-US" sz="1100" i="1" dirty="0">
+                <a:ea typeface="Calibri" panose="020F0502020204030204" pitchFamily="34" charset="0"/>
+                <a:cs typeface="Times New Roman" panose="02020603050405020304" pitchFamily="18" charset="0"/>
+              </a:rPr>
+              <a:t>) : bool</a:t>
+            </a:r>
+          </a:p>
+          <a:p>
+            <a:pPr defTabSz="914400" eaLnBrk="0" fontAlgn="base" hangingPunct="0">
+              <a:spcBef>
+                <a:spcPct val="0"/>
+              </a:spcBef>
+              <a:spcAft>
+                <a:spcPct val="0"/>
+              </a:spcAft>
+            </a:pPr>
+            <a:r>
+              <a:rPr lang="en-US" altLang="en-US" sz="1100" i="1" dirty="0">
+                <a:ea typeface="Calibri" panose="020F0502020204030204" pitchFamily="34" charset="0"/>
+                <a:cs typeface="Times New Roman" panose="02020603050405020304" pitchFamily="18" charset="0"/>
+              </a:rPr>
+              <a:t>+ Dodge(</a:t>
+            </a:r>
+            <a:r>
+              <a:rPr lang="en-US" altLang="en-US" sz="1100" dirty="0" err="1"/>
+              <a:t>RoguelikeObject</a:t>
+            </a:r>
+            <a:r>
+              <a:rPr lang="en-US" altLang="en-US" sz="1100" i="1" dirty="0">
+                <a:ea typeface="Calibri" panose="020F0502020204030204" pitchFamily="34" charset="0"/>
+                <a:cs typeface="Times New Roman" panose="02020603050405020304" pitchFamily="18" charset="0"/>
+              </a:rPr>
+              <a:t>) : bool</a:t>
             </a:r>
           </a:p>
           <a:p>
@@ -5194,7 +5304,7 @@
         </p:nvSpPr>
         <p:spPr bwMode="auto">
           <a:xfrm>
-            <a:off x="669042" y="9981548"/>
+            <a:off x="572254" y="11752405"/>
             <a:ext cx="745958" cy="600075"/>
           </a:xfrm>
           <a:prstGeom prst="rect">
@@ -5270,7 +5380,7 @@
         <p:spPr bwMode="auto">
           <a:xfrm>
             <a:off x="8535553" y="6540262"/>
-            <a:ext cx="3976821" cy="3436541"/>
+            <a:ext cx="3976821" cy="3841587"/>
           </a:xfrm>
           <a:prstGeom prst="rect">
             <a:avLst/>
@@ -5624,6 +5734,36 @@
               </a:spcAft>
             </a:pPr>
             <a:r>
+              <a:rPr lang="en-US" altLang="en-US" sz="1100" dirty="0"/>
+              <a:t>+ </a:t>
+            </a:r>
+            <a:r>
+              <a:rPr lang="en-US" altLang="en-US" sz="1100" dirty="0" err="1"/>
+              <a:t>AttempDodge</a:t>
+            </a:r>
+            <a:r>
+              <a:rPr lang="en-US" altLang="en-US" sz="1100" dirty="0"/>
+              <a:t>(</a:t>
+            </a:r>
+            <a:r>
+              <a:rPr lang="en-US" altLang="en-US" sz="1100" dirty="0" err="1"/>
+              <a:t>RoguelikeObject</a:t>
+            </a:r>
+            <a:r>
+              <a:rPr lang="en-US" altLang="en-US" sz="1100" dirty="0"/>
+              <a:t>) : bool &lt;&lt;override&gt;&gt;</a:t>
+            </a:r>
+          </a:p>
+          <a:p>
+            <a:pPr defTabSz="914400" eaLnBrk="0" fontAlgn="base" hangingPunct="0">
+              <a:spcBef>
+                <a:spcPct val="0"/>
+              </a:spcBef>
+              <a:spcAft>
+                <a:spcPct val="0"/>
+              </a:spcAft>
+            </a:pPr>
+            <a:r>
               <a:rPr lang="en-US" altLang="en-US" sz="1100" dirty="0">
                 <a:cs typeface="Times New Roman" panose="02020603050405020304" pitchFamily="18" charset="0"/>
               </a:rPr>
@@ -5775,7 +5915,7 @@
         <p:spPr>
           <a:xfrm flipV="1">
             <a:off x="6545644" y="4319984"/>
-            <a:ext cx="2383952" cy="1783589"/>
+            <a:ext cx="2383952" cy="2201448"/>
           </a:xfrm>
           <a:prstGeom prst="bentConnector3">
             <a:avLst/>
@@ -5950,7 +6090,7 @@
         </p:nvSpPr>
         <p:spPr bwMode="auto">
           <a:xfrm>
-            <a:off x="1787979" y="9976804"/>
+            <a:off x="1691191" y="11747661"/>
             <a:ext cx="745958" cy="600075"/>
           </a:xfrm>
           <a:prstGeom prst="rect">
@@ -6025,7 +6165,7 @@
         </p:nvSpPr>
         <p:spPr bwMode="auto">
           <a:xfrm>
-            <a:off x="2848642" y="9976803"/>
+            <a:off x="2751854" y="11747660"/>
             <a:ext cx="2599658" cy="2846251"/>
           </a:xfrm>
           <a:prstGeom prst="rect">
@@ -6339,8 +6479,8 @@
         </p:nvCxnSpPr>
         <p:spPr>
           <a:xfrm rot="5400000">
-            <a:off x="2321215" y="8184120"/>
-            <a:ext cx="518235" cy="3076621"/>
+            <a:off x="1805252" y="9439014"/>
+            <a:ext cx="1453373" cy="3173409"/>
           </a:xfrm>
           <a:prstGeom prst="bentConnector3">
             <a:avLst>
@@ -6384,8 +6524,8 @@
         </p:nvCxnSpPr>
         <p:spPr>
           <a:xfrm rot="5400000">
-            <a:off x="2883055" y="8741216"/>
-            <a:ext cx="513491" cy="1957684"/>
+            <a:off x="2367092" y="9996110"/>
+            <a:ext cx="1448629" cy="2054472"/>
           </a:xfrm>
           <a:prstGeom prst="bentConnector3">
             <a:avLst>
@@ -6428,9 +6568,9 @@
           <p:nvPr/>
         </p:nvCxnSpPr>
         <p:spPr>
-          <a:xfrm rot="16200000" flipH="1">
-            <a:off x="3876811" y="9705143"/>
-            <a:ext cx="513490" cy="29829"/>
+          <a:xfrm rot="5400000">
+            <a:off x="3360849" y="10989867"/>
+            <a:ext cx="1448628" cy="66959"/>
           </a:xfrm>
           <a:prstGeom prst="bentConnector3">
             <a:avLst>
@@ -7910,7 +8050,7 @@
         </p:nvSpPr>
         <p:spPr bwMode="auto">
           <a:xfrm>
-            <a:off x="5745065" y="9976804"/>
+            <a:off x="5648277" y="11747661"/>
             <a:ext cx="745958" cy="600075"/>
           </a:xfrm>
           <a:prstGeom prst="rect">
@@ -7986,8 +8126,8 @@
         </p:nvCxnSpPr>
         <p:spPr>
           <a:xfrm rot="16200000" flipH="1">
-            <a:off x="4861598" y="8720357"/>
-            <a:ext cx="513491" cy="1999402"/>
+            <a:off x="4345635" y="10072039"/>
+            <a:ext cx="1448629" cy="1902614"/>
           </a:xfrm>
           <a:prstGeom prst="bentConnector3">
             <a:avLst>
@@ -8258,8 +8398,8 @@
         </p:nvCxnSpPr>
         <p:spPr>
           <a:xfrm rot="16200000" flipH="1">
-            <a:off x="-712594" y="3699339"/>
-            <a:ext cx="4611995" cy="196471"/>
+            <a:off x="-921524" y="3908269"/>
+            <a:ext cx="5029854" cy="196471"/>
           </a:xfrm>
           <a:prstGeom prst="bentConnector2">
             <a:avLst/>
@@ -8384,8 +8524,8 @@
         </p:nvSpPr>
         <p:spPr bwMode="auto">
           <a:xfrm>
-            <a:off x="8319652" y="10819982"/>
-            <a:ext cx="3976821" cy="1651028"/>
+            <a:off x="8319653" y="11747660"/>
+            <a:ext cx="3976821" cy="1942940"/>
           </a:xfrm>
           <a:prstGeom prst="rect">
             <a:avLst/>
@@ -8573,6 +8713,28 @@
                 <a:spcPct val="0"/>
               </a:spcAft>
             </a:pPr>
+            <a:r>
+              <a:rPr lang="en-US" altLang="en-US" sz="1100" dirty="0"/>
+              <a:t>+ </a:t>
+            </a:r>
+            <a:r>
+              <a:rPr lang="en-US" altLang="en-US" sz="1100" dirty="0" err="1"/>
+              <a:t>GetFullName</a:t>
+            </a:r>
+            <a:r>
+              <a:rPr lang="en-US" altLang="en-US" sz="1100" dirty="0"/>
+              <a:t>() : string &lt;&lt;override&gt;&gt;</a:t>
+            </a:r>
+          </a:p>
+          <a:p>
+            <a:pPr defTabSz="914400" eaLnBrk="0" fontAlgn="base" hangingPunct="0">
+              <a:spcBef>
+                <a:spcPct val="0"/>
+              </a:spcBef>
+              <a:spcAft>
+                <a:spcPct val="0"/>
+              </a:spcAft>
+            </a:pPr>
             <a:endParaRPr lang="en-US" altLang="en-US" sz="1100" i="1" dirty="0"/>
           </a:p>
         </p:txBody>
@@ -8587,6 +8749,7 @@
             </a:extLst>
           </p:cNvPr>
           <p:cNvCxnSpPr>
+            <a:cxnSpLocks/>
             <a:stCxn id="9" idx="2"/>
             <a:endCxn id="104" idx="0"/>
           </p:cNvCxnSpPr>
@@ -8594,8 +8757,8 @@
         </p:nvCxnSpPr>
         <p:spPr>
           <a:xfrm rot="5400000">
-            <a:off x="9994425" y="10290442"/>
-            <a:ext cx="843179" cy="215901"/>
+            <a:off x="9733109" y="10956804"/>
+            <a:ext cx="1365811" cy="215900"/>
           </a:xfrm>
           <a:prstGeom prst="bentConnector3">
             <a:avLst/>

</xml_diff>

<commit_message>
Tons of GUI work. MouseInteractions and MouseInputController have been added. ContextMenus and Interactive has been added. There is now a grid of world spaces on top of the playable area.
</commit_message>
<xml_diff>
--- a/Class Diagram.pptx
+++ b/Class Diagram.pptx
@@ -3828,34 +3828,6 @@
               <a:rPr lang="en-US" altLang="en-US" sz="1100" dirty="0" err="1">
                 <a:cs typeface="Times New Roman" panose="02020603050405020304" pitchFamily="18" charset="0"/>
               </a:rPr>
-              <a:t>UpdateRogueSpriteRenderer</a:t>
-            </a:r>
-            <a:r>
-              <a:rPr lang="en-US" altLang="en-US" sz="1100" dirty="0">
-                <a:cs typeface="Times New Roman" panose="02020603050405020304" pitchFamily="18" charset="0"/>
-              </a:rPr>
-              <a:t>() : void</a:t>
-            </a:r>
-          </a:p>
-          <a:p>
-            <a:pPr defTabSz="914400" eaLnBrk="0" fontAlgn="base" hangingPunct="0">
-              <a:spcBef>
-                <a:spcPct val="0"/>
-              </a:spcBef>
-              <a:spcAft>
-                <a:spcPct val="0"/>
-              </a:spcAft>
-            </a:pPr>
-            <a:r>
-              <a:rPr lang="en-US" altLang="en-US" sz="1100" dirty="0">
-                <a:cs typeface="Times New Roman" panose="02020603050405020304" pitchFamily="18" charset="0"/>
-              </a:rPr>
-              <a:t>+ </a:t>
-            </a:r>
-            <a:r>
-              <a:rPr lang="en-US" altLang="en-US" sz="1100" dirty="0" err="1">
-                <a:cs typeface="Times New Roman" panose="02020603050405020304" pitchFamily="18" charset="0"/>
-              </a:rPr>
               <a:t>ToggleRogulikeObjectSprites</a:t>
             </a:r>
             <a:r>
@@ -3986,6 +3958,38 @@
               </a:rPr>
               <a:t>+ Initialize() : void</a:t>
             </a:r>
+          </a:p>
+          <a:p>
+            <a:pPr defTabSz="914400" eaLnBrk="0" fontAlgn="base" hangingPunct="0">
+              <a:spcBef>
+                <a:spcPct val="0"/>
+              </a:spcBef>
+              <a:spcAft>
+                <a:spcPct val="0"/>
+              </a:spcAft>
+            </a:pPr>
+            <a:r>
+              <a:rPr lang="en-US" altLang="en-US" sz="1100" i="1" dirty="0">
+                <a:cs typeface="Times New Roman" panose="02020603050405020304" pitchFamily="18" charset="0"/>
+              </a:rPr>
+              <a:t>+ </a:t>
+            </a:r>
+            <a:r>
+              <a:rPr lang="en-US" altLang="en-US" sz="1100" i="1" dirty="0" err="1">
+                <a:cs typeface="Times New Roman" panose="02020603050405020304" pitchFamily="18" charset="0"/>
+              </a:rPr>
+              <a:t>UpdateRogueSpriteRenderer</a:t>
+            </a:r>
+            <a:r>
+              <a:rPr lang="en-US" altLang="en-US" sz="1100" i="1" dirty="0">
+                <a:cs typeface="Times New Roman" panose="02020603050405020304" pitchFamily="18" charset="0"/>
+              </a:rPr>
+              <a:t>() : void</a:t>
+            </a:r>
+            <a:endParaRPr lang="en-US" altLang="en-US" sz="1100" i="1" dirty="0">
+              <a:ea typeface="Calibri" panose="020F0502020204030204" pitchFamily="34" charset="0"/>
+              <a:cs typeface="Times New Roman" panose="02020603050405020304" pitchFamily="18" charset="0"/>
+            </a:endParaRPr>
           </a:p>
           <a:p>
             <a:pPr defTabSz="914400" eaLnBrk="0" fontAlgn="base" hangingPunct="0">
@@ -4231,7 +4235,7 @@
         </p:nvSpPr>
         <p:spPr bwMode="auto">
           <a:xfrm>
-            <a:off x="8929596" y="2556668"/>
+            <a:off x="8122156" y="2556668"/>
             <a:ext cx="3619734" cy="3526631"/>
           </a:xfrm>
           <a:prstGeom prst="rect">
@@ -5379,7 +5383,7 @@
         </p:nvSpPr>
         <p:spPr bwMode="auto">
           <a:xfrm>
-            <a:off x="8535553" y="6540262"/>
+            <a:off x="7943612" y="6637423"/>
             <a:ext cx="3976821" cy="3841587"/>
           </a:xfrm>
           <a:prstGeom prst="rect">
@@ -5721,6 +5725,28 @@
             </a:pPr>
             <a:r>
               <a:rPr lang="en-US" altLang="en-US" sz="1100" dirty="0"/>
+              <a:t> + </a:t>
+            </a:r>
+            <a:r>
+              <a:rPr lang="en-US" altLang="en-US" sz="1100" dirty="0" err="1"/>
+              <a:t>UpdateRogueSpriteRenderer</a:t>
+            </a:r>
+            <a:r>
+              <a:rPr lang="en-US" altLang="en-US" sz="1100" dirty="0"/>
+              <a:t>() : void &lt;&lt;override&gt;&gt;</a:t>
+            </a:r>
+          </a:p>
+          <a:p>
+            <a:pPr defTabSz="914400" eaLnBrk="0" fontAlgn="base" hangingPunct="0">
+              <a:spcBef>
+                <a:spcPct val="0"/>
+              </a:spcBef>
+              <a:spcAft>
+                <a:spcPct val="0"/>
+              </a:spcAft>
+            </a:pPr>
+            <a:r>
+              <a:rPr lang="en-US" altLang="en-US" sz="1100" dirty="0"/>
               <a:t>+ Step() : void &lt;&lt;override&gt;&gt;</a:t>
             </a:r>
           </a:p>
@@ -5915,7 +5941,7 @@
         <p:spPr>
           <a:xfrm flipV="1">
             <a:off x="6545644" y="4319984"/>
-            <a:ext cx="2383952" cy="2201448"/>
+            <a:ext cx="1576512" cy="2201448"/>
           </a:xfrm>
           <a:prstGeom prst="bentConnector3">
             <a:avLst/>
@@ -5957,12 +5983,12 @@
         </p:nvCxnSpPr>
         <p:spPr>
           <a:xfrm>
-            <a:off x="12549330" y="4319984"/>
-            <a:ext cx="1054800" cy="5521664"/>
+            <a:off x="11741890" y="4319984"/>
+            <a:ext cx="1862240" cy="5521664"/>
           </a:xfrm>
           <a:prstGeom prst="bentConnector3">
             <a:avLst>
-              <a:gd name="adj1" fmla="val 30736"/>
+              <a:gd name="adj1" fmla="val 50000"/>
             </a:avLst>
           </a:prstGeom>
           <a:ln>
@@ -6002,12 +6028,12 @@
         </p:nvCxnSpPr>
         <p:spPr>
           <a:xfrm flipV="1">
-            <a:off x="12549330" y="2682121"/>
-            <a:ext cx="1167488" cy="1637863"/>
+            <a:off x="11741890" y="2682121"/>
+            <a:ext cx="1974928" cy="1637863"/>
           </a:xfrm>
           <a:prstGeom prst="bentConnector3">
             <a:avLst>
-              <a:gd name="adj1" fmla="val 28244"/>
+              <a:gd name="adj1" fmla="val 46751"/>
             </a:avLst>
           </a:prstGeom>
           <a:ln>
@@ -6047,8 +6073,8 @@
         </p:nvCxnSpPr>
         <p:spPr>
           <a:xfrm rot="5400000">
-            <a:off x="10403233" y="6204031"/>
-            <a:ext cx="456963" cy="215499"/>
+            <a:off x="9654961" y="6360361"/>
+            <a:ext cx="554124" cy="12700"/>
           </a:xfrm>
           <a:prstGeom prst="bentConnector3">
             <a:avLst>
@@ -8756,9 +8782,9 @@
           <p:nvPr/>
         </p:nvCxnSpPr>
         <p:spPr>
-          <a:xfrm rot="5400000">
-            <a:off x="9733109" y="10956804"/>
-            <a:ext cx="1365811" cy="215900"/>
+          <a:xfrm rot="16200000" flipH="1">
+            <a:off x="9485718" y="10925314"/>
+            <a:ext cx="1268650" cy="376041"/>
           </a:xfrm>
           <a:prstGeom prst="bentConnector3">
             <a:avLst/>

</xml_diff>

<commit_message>
Class diagram updated and comments added.
</commit_message>
<xml_diff>
--- a/Class Diagram.pptx
+++ b/Class Diagram.pptx
@@ -243,7 +243,7 @@
           <a:p>
             <a:fld id="{DFA429E4-E4A0-4FCB-B57B-5790209CB571}" type="datetimeFigureOut">
               <a:rPr lang="en-US" smtClean="0"/>
-              <a:t>8/18/2019</a:t>
+              <a:t>9/5/2019</a:t>
             </a:fld>
             <a:endParaRPr lang="en-US"/>
           </a:p>
@@ -413,7 +413,7 @@
           <a:p>
             <a:fld id="{DFA429E4-E4A0-4FCB-B57B-5790209CB571}" type="datetimeFigureOut">
               <a:rPr lang="en-US" smtClean="0"/>
-              <a:t>8/18/2019</a:t>
+              <a:t>9/5/2019</a:t>
             </a:fld>
             <a:endParaRPr lang="en-US"/>
           </a:p>
@@ -593,7 +593,7 @@
           <a:p>
             <a:fld id="{DFA429E4-E4A0-4FCB-B57B-5790209CB571}" type="datetimeFigureOut">
               <a:rPr lang="en-US" smtClean="0"/>
-              <a:t>8/18/2019</a:t>
+              <a:t>9/5/2019</a:t>
             </a:fld>
             <a:endParaRPr lang="en-US"/>
           </a:p>
@@ -763,7 +763,7 @@
           <a:p>
             <a:fld id="{DFA429E4-E4A0-4FCB-B57B-5790209CB571}" type="datetimeFigureOut">
               <a:rPr lang="en-US" smtClean="0"/>
-              <a:t>8/18/2019</a:t>
+              <a:t>9/5/2019</a:t>
             </a:fld>
             <a:endParaRPr lang="en-US"/>
           </a:p>
@@ -1007,7 +1007,7 @@
           <a:p>
             <a:fld id="{DFA429E4-E4A0-4FCB-B57B-5790209CB571}" type="datetimeFigureOut">
               <a:rPr lang="en-US" smtClean="0"/>
-              <a:t>8/18/2019</a:t>
+              <a:t>9/5/2019</a:t>
             </a:fld>
             <a:endParaRPr lang="en-US"/>
           </a:p>
@@ -1239,7 +1239,7 @@
           <a:p>
             <a:fld id="{DFA429E4-E4A0-4FCB-B57B-5790209CB571}" type="datetimeFigureOut">
               <a:rPr lang="en-US" smtClean="0"/>
-              <a:t>8/18/2019</a:t>
+              <a:t>9/5/2019</a:t>
             </a:fld>
             <a:endParaRPr lang="en-US"/>
           </a:p>
@@ -1606,7 +1606,7 @@
           <a:p>
             <a:fld id="{DFA429E4-E4A0-4FCB-B57B-5790209CB571}" type="datetimeFigureOut">
               <a:rPr lang="en-US" smtClean="0"/>
-              <a:t>8/18/2019</a:t>
+              <a:t>9/5/2019</a:t>
             </a:fld>
             <a:endParaRPr lang="en-US"/>
           </a:p>
@@ -1724,7 +1724,7 @@
           <a:p>
             <a:fld id="{DFA429E4-E4A0-4FCB-B57B-5790209CB571}" type="datetimeFigureOut">
               <a:rPr lang="en-US" smtClean="0"/>
-              <a:t>8/18/2019</a:t>
+              <a:t>9/5/2019</a:t>
             </a:fld>
             <a:endParaRPr lang="en-US"/>
           </a:p>
@@ -1819,7 +1819,7 @@
           <a:p>
             <a:fld id="{DFA429E4-E4A0-4FCB-B57B-5790209CB571}" type="datetimeFigureOut">
               <a:rPr lang="en-US" smtClean="0"/>
-              <a:t>8/18/2019</a:t>
+              <a:t>9/5/2019</a:t>
             </a:fld>
             <a:endParaRPr lang="en-US"/>
           </a:p>
@@ -2096,7 +2096,7 @@
           <a:p>
             <a:fld id="{DFA429E4-E4A0-4FCB-B57B-5790209CB571}" type="datetimeFigureOut">
               <a:rPr lang="en-US" smtClean="0"/>
-              <a:t>8/18/2019</a:t>
+              <a:t>9/5/2019</a:t>
             </a:fld>
             <a:endParaRPr lang="en-US"/>
           </a:p>
@@ -2353,7 +2353,7 @@
           <a:p>
             <a:fld id="{DFA429E4-E4A0-4FCB-B57B-5790209CB571}" type="datetimeFigureOut">
               <a:rPr lang="en-US" smtClean="0"/>
-              <a:t>8/18/2019</a:t>
+              <a:t>9/5/2019</a:t>
             </a:fld>
             <a:endParaRPr lang="en-US"/>
           </a:p>
@@ -2566,7 +2566,7 @@
           <a:p>
             <a:fld id="{DFA429E4-E4A0-4FCB-B57B-5790209CB571}" type="datetimeFigureOut">
               <a:rPr lang="en-US" smtClean="0"/>
-              <a:t>8/18/2019</a:t>
+              <a:t>9/5/2019</a:t>
             </a:fld>
             <a:endParaRPr lang="en-US"/>
           </a:p>
@@ -2987,8 +2987,8 @@
         </p:nvSpPr>
         <p:spPr bwMode="auto">
           <a:xfrm>
-            <a:off x="1691639" y="2743832"/>
-            <a:ext cx="4854005" cy="7555200"/>
+            <a:off x="2545340" y="5868031"/>
+            <a:ext cx="4854005" cy="7735177"/>
           </a:xfrm>
           <a:prstGeom prst="rect">
             <a:avLst/>
@@ -3939,7 +3939,35 @@
               <a:rPr lang="en-US" altLang="en-US" sz="1100" dirty="0">
                 <a:cs typeface="Times New Roman" panose="02020603050405020304" pitchFamily="18" charset="0"/>
               </a:rPr>
-              <a:t>, int)</a:t>
+              <a:t>, int) : bool</a:t>
+            </a:r>
+          </a:p>
+          <a:p>
+            <a:pPr defTabSz="914400" eaLnBrk="0" fontAlgn="base" hangingPunct="0">
+              <a:spcBef>
+                <a:spcPct val="0"/>
+              </a:spcBef>
+              <a:spcAft>
+                <a:spcPct val="0"/>
+              </a:spcAft>
+            </a:pPr>
+            <a:r>
+              <a:rPr lang="en-US" altLang="en-US" sz="1100" i="1" dirty="0">
+                <a:cs typeface="Times New Roman" panose="02020603050405020304" pitchFamily="18" charset="0"/>
+              </a:rPr>
+              <a:t>+ </a:t>
+            </a:r>
+            <a:r>
+              <a:rPr lang="en-US" altLang="en-US" sz="1100" i="1" dirty="0" err="1">
+                <a:cs typeface="Times New Roman" panose="02020603050405020304" pitchFamily="18" charset="0"/>
+              </a:rPr>
+              <a:t>OpenInventory</a:t>
+            </a:r>
+            <a:r>
+              <a:rPr lang="en-US" altLang="en-US" sz="1100" i="1" dirty="0">
+                <a:cs typeface="Times New Roman" panose="02020603050405020304" pitchFamily="18" charset="0"/>
+              </a:rPr>
+              <a:t>() : void</a:t>
             </a:r>
           </a:p>
           <a:p>
@@ -4213,9 +4241,62 @@
               </a:rPr>
               <a:t>() : bool</a:t>
             </a:r>
-            <a:endParaRPr lang="en-US" altLang="en-US" sz="1100" dirty="0">
-              <a:cs typeface="Times New Roman" panose="02020603050405020304" pitchFamily="18" charset="0"/>
-            </a:endParaRPr>
+          </a:p>
+          <a:p>
+            <a:pPr defTabSz="914400" eaLnBrk="0" fontAlgn="base" hangingPunct="0">
+              <a:spcBef>
+                <a:spcPct val="0"/>
+              </a:spcBef>
+              <a:spcAft>
+                <a:spcPct val="0"/>
+              </a:spcAft>
+            </a:pPr>
+            <a:r>
+              <a:rPr lang="en-US" altLang="en-US" sz="1100" dirty="0">
+                <a:cs typeface="Times New Roman" panose="02020603050405020304" pitchFamily="18" charset="0"/>
+              </a:rPr>
+              <a:t>+ </a:t>
+            </a:r>
+            <a:r>
+              <a:rPr lang="en-US" altLang="en-US" sz="1100" dirty="0" err="1">
+                <a:cs typeface="Times New Roman" panose="02020603050405020304" pitchFamily="18" charset="0"/>
+              </a:rPr>
+              <a:t>GetInteractions</a:t>
+            </a:r>
+            <a:r>
+              <a:rPr lang="en-US" altLang="en-US" sz="1100" dirty="0">
+                <a:cs typeface="Times New Roman" panose="02020603050405020304" pitchFamily="18" charset="0"/>
+              </a:rPr>
+              <a:t>() : List&lt;Interactions&gt; &lt;&lt;override&gt;&gt;</a:t>
+            </a:r>
+          </a:p>
+          <a:p>
+            <a:pPr defTabSz="914400" eaLnBrk="0" fontAlgn="base" hangingPunct="0">
+              <a:spcBef>
+                <a:spcPct val="0"/>
+              </a:spcBef>
+              <a:spcAft>
+                <a:spcPct val="0"/>
+              </a:spcAft>
+            </a:pPr>
+            <a:r>
+              <a:rPr lang="en-US" altLang="en-US" sz="1100" dirty="0">
+                <a:cs typeface="Times New Roman" panose="02020603050405020304" pitchFamily="18" charset="0"/>
+              </a:rPr>
+              <a:t>+ </a:t>
+            </a:r>
+            <a:r>
+              <a:rPr lang="en-US" altLang="en-US" sz="1100" dirty="0" err="1">
+                <a:cs typeface="Times New Roman" panose="02020603050405020304" pitchFamily="18" charset="0"/>
+              </a:rPr>
+              <a:t>GetInteractiveName</a:t>
+            </a:r>
+            <a:r>
+              <a:rPr lang="en-US" altLang="en-US" sz="1100" dirty="0">
+                <a:cs typeface="Times New Roman" panose="02020603050405020304" pitchFamily="18" charset="0"/>
+              </a:rPr>
+              <a:t>() : string &lt;&lt;override&gt;&gt;</a:t>
+            </a:r>
           </a:p>
         </p:txBody>
       </p:sp>
@@ -4235,7 +4316,7 @@
         </p:nvSpPr>
         <p:spPr bwMode="auto">
           <a:xfrm>
-            <a:off x="8122156" y="2556668"/>
+            <a:off x="8099557" y="5680868"/>
             <a:ext cx="3619734" cy="3526631"/>
           </a:xfrm>
           <a:prstGeom prst="rect">
@@ -4823,7 +4904,7 @@
         </p:nvSpPr>
         <p:spPr bwMode="auto">
           <a:xfrm>
-            <a:off x="13716818" y="1877696"/>
+            <a:off x="13694219" y="5001896"/>
             <a:ext cx="3976822" cy="1608850"/>
           </a:xfrm>
           <a:prstGeom prst="rect">
@@ -5084,7 +5165,7 @@
         </p:nvSpPr>
         <p:spPr bwMode="auto">
           <a:xfrm>
-            <a:off x="13604130" y="9131815"/>
+            <a:off x="13581531" y="12256015"/>
             <a:ext cx="3976822" cy="1419665"/>
           </a:xfrm>
           <a:prstGeom prst="rect">
@@ -5308,7 +5389,7 @@
         </p:nvSpPr>
         <p:spPr bwMode="auto">
           <a:xfrm>
-            <a:off x="572254" y="11752405"/>
+            <a:off x="549655" y="14876605"/>
             <a:ext cx="745958" cy="600075"/>
           </a:xfrm>
           <a:prstGeom prst="rect">
@@ -5383,7 +5464,7 @@
         </p:nvSpPr>
         <p:spPr bwMode="auto">
           <a:xfrm>
-            <a:off x="7943612" y="6637423"/>
+            <a:off x="7921013" y="9761623"/>
             <a:ext cx="3976821" cy="3841587"/>
           </a:xfrm>
           <a:prstGeom prst="rect">
@@ -5940,8 +6021,8 @@
         </p:nvCxnSpPr>
         <p:spPr>
           <a:xfrm flipV="1">
-            <a:off x="6545644" y="4319984"/>
-            <a:ext cx="1576512" cy="2201448"/>
+            <a:off x="7399345" y="7444184"/>
+            <a:ext cx="700212" cy="2291436"/>
           </a:xfrm>
           <a:prstGeom prst="bentConnector3">
             <a:avLst/>
@@ -5983,7 +6064,7 @@
         </p:nvCxnSpPr>
         <p:spPr>
           <a:xfrm>
-            <a:off x="11741890" y="4319984"/>
+            <a:off x="11719291" y="7444184"/>
             <a:ext cx="1862240" cy="5521664"/>
           </a:xfrm>
           <a:prstGeom prst="bentConnector3">
@@ -6028,12 +6109,12 @@
         </p:nvCxnSpPr>
         <p:spPr>
           <a:xfrm flipV="1">
-            <a:off x="11741890" y="2682121"/>
+            <a:off x="11719291" y="5806321"/>
             <a:ext cx="1974928" cy="1637863"/>
           </a:xfrm>
           <a:prstGeom prst="bentConnector3">
             <a:avLst>
-              <a:gd name="adj1" fmla="val 46751"/>
+              <a:gd name="adj1" fmla="val 50000"/>
             </a:avLst>
           </a:prstGeom>
           <a:ln>
@@ -6073,7 +6154,7 @@
         </p:nvCxnSpPr>
         <p:spPr>
           <a:xfrm rot="5400000">
-            <a:off x="9654961" y="6360361"/>
+            <a:off x="9632362" y="9484561"/>
             <a:ext cx="554124" cy="12700"/>
           </a:xfrm>
           <a:prstGeom prst="bentConnector3">
@@ -6116,7 +6197,7 @@
         </p:nvSpPr>
         <p:spPr bwMode="auto">
           <a:xfrm>
-            <a:off x="1691191" y="11747661"/>
+            <a:off x="1668592" y="14871861"/>
             <a:ext cx="745958" cy="600075"/>
           </a:xfrm>
           <a:prstGeom prst="rect">
@@ -6191,7 +6272,7 @@
         </p:nvSpPr>
         <p:spPr bwMode="auto">
           <a:xfrm>
-            <a:off x="2751854" y="11747660"/>
+            <a:off x="2729255" y="14871860"/>
             <a:ext cx="2599658" cy="2846251"/>
           </a:xfrm>
           <a:prstGeom prst="rect">
@@ -6505,8 +6586,8 @@
         </p:nvCxnSpPr>
         <p:spPr>
           <a:xfrm rot="5400000">
-            <a:off x="1805252" y="9439014"/>
-            <a:ext cx="1453373" cy="3173409"/>
+            <a:off x="2310791" y="12215052"/>
+            <a:ext cx="1273397" cy="4049709"/>
           </a:xfrm>
           <a:prstGeom prst="bentConnector3">
             <a:avLst>
@@ -6550,8 +6631,8 @@
         </p:nvCxnSpPr>
         <p:spPr>
           <a:xfrm rot="5400000">
-            <a:off x="2367092" y="9996110"/>
-            <a:ext cx="1448629" cy="2054472"/>
+            <a:off x="2872631" y="12772148"/>
+            <a:ext cx="1268653" cy="2930772"/>
           </a:xfrm>
           <a:prstGeom prst="bentConnector3">
             <a:avLst>
@@ -6595,8 +6676,8 @@
         </p:nvCxnSpPr>
         <p:spPr>
           <a:xfrm rot="5400000">
-            <a:off x="3360849" y="10989867"/>
-            <a:ext cx="1448628" cy="66959"/>
+            <a:off x="3866388" y="13765905"/>
+            <a:ext cx="1268652" cy="943259"/>
           </a:xfrm>
           <a:prstGeom prst="bentConnector3">
             <a:avLst>
@@ -6777,7 +6858,7 @@
         </p:nvSpPr>
         <p:spPr bwMode="auto">
           <a:xfrm>
-            <a:off x="13042900" y="3765860"/>
+            <a:off x="13020301" y="6890060"/>
             <a:ext cx="2549641" cy="2965140"/>
           </a:xfrm>
           <a:prstGeom prst="rect">
@@ -7271,7 +7352,7 @@
         </p:nvCxnSpPr>
         <p:spPr>
           <a:xfrm rot="5400000">
-            <a:off x="14871818" y="2932449"/>
+            <a:off x="14849219" y="6056649"/>
             <a:ext cx="279314" cy="1387508"/>
           </a:xfrm>
           <a:prstGeom prst="bentConnector3">
@@ -7314,7 +7395,7 @@
         </p:nvSpPr>
         <p:spPr bwMode="auto">
           <a:xfrm>
-            <a:off x="12839701" y="11087736"/>
+            <a:off x="12817102" y="14211936"/>
             <a:ext cx="2540000" cy="3434404"/>
           </a:xfrm>
           <a:prstGeom prst="rect">
@@ -7607,7 +7688,7 @@
         </p:nvCxnSpPr>
         <p:spPr>
           <a:xfrm rot="5400000">
-            <a:off x="14582993" y="10078188"/>
+            <a:off x="14560394" y="13202388"/>
             <a:ext cx="536256" cy="1482840"/>
           </a:xfrm>
           <a:prstGeom prst="bentConnector3">
@@ -7650,7 +7731,7 @@
         </p:nvSpPr>
         <p:spPr bwMode="auto">
           <a:xfrm>
-            <a:off x="15494000" y="11085028"/>
+            <a:off x="15471401" y="14209228"/>
             <a:ext cx="2540000" cy="2605572"/>
           </a:xfrm>
           <a:prstGeom prst="rect">
@@ -7874,7 +7955,7 @@
         </p:nvCxnSpPr>
         <p:spPr>
           <a:xfrm rot="16200000" flipH="1">
-            <a:off x="15911496" y="10232524"/>
+            <a:off x="15888897" y="13356724"/>
             <a:ext cx="533548" cy="1171459"/>
           </a:xfrm>
           <a:prstGeom prst="bentConnector3">
@@ -7917,7 +7998,7 @@
         </p:nvSpPr>
         <p:spPr bwMode="auto">
           <a:xfrm>
-            <a:off x="15706726" y="3765860"/>
+            <a:off x="15684127" y="6890060"/>
             <a:ext cx="2331984" cy="988380"/>
           </a:xfrm>
           <a:prstGeom prst="rect">
@@ -8033,7 +8114,7 @@
         </p:nvCxnSpPr>
         <p:spPr>
           <a:xfrm rot="16200000" flipH="1">
-            <a:off x="16149316" y="3042458"/>
+            <a:off x="16126717" y="6166658"/>
             <a:ext cx="279314" cy="1167489"/>
           </a:xfrm>
           <a:prstGeom prst="bentConnector3">
@@ -8076,7 +8157,7 @@
         </p:nvSpPr>
         <p:spPr bwMode="auto">
           <a:xfrm>
-            <a:off x="5648277" y="11747661"/>
+            <a:off x="5625678" y="14871861"/>
             <a:ext cx="745958" cy="600075"/>
           </a:xfrm>
           <a:prstGeom prst="rect">
@@ -8152,8 +8233,8 @@
         </p:nvCxnSpPr>
         <p:spPr>
           <a:xfrm rot="16200000" flipH="1">
-            <a:off x="4345635" y="10072039"/>
-            <a:ext cx="1448629" cy="1902614"/>
+            <a:off x="4851174" y="13724377"/>
+            <a:ext cx="1268653" cy="1026314"/>
           </a:xfrm>
           <a:prstGeom prst="bentConnector3">
             <a:avLst>
@@ -8195,7 +8276,7 @@
         </p:nvSpPr>
         <p:spPr bwMode="auto">
           <a:xfrm>
-            <a:off x="138856" y="139084"/>
+            <a:off x="58843" y="4188521"/>
             <a:ext cx="2712623" cy="1352494"/>
           </a:xfrm>
           <a:prstGeom prst="rect">
@@ -8424,8 +8505,8 @@
         </p:nvCxnSpPr>
         <p:spPr>
           <a:xfrm rot="16200000" flipH="1">
-            <a:off x="-921524" y="3908269"/>
-            <a:ext cx="5029854" cy="196471"/>
+            <a:off x="-117055" y="7073224"/>
+            <a:ext cx="4194605" cy="1130185"/>
           </a:xfrm>
           <a:prstGeom prst="bentConnector2">
             <a:avLst/>
@@ -8550,7 +8631,7 @@
         </p:nvSpPr>
         <p:spPr bwMode="auto">
           <a:xfrm>
-            <a:off x="8319653" y="11747660"/>
+            <a:off x="8297054" y="14871860"/>
             <a:ext cx="3976821" cy="1942940"/>
           </a:xfrm>
           <a:prstGeom prst="rect">
@@ -8783,8 +8864,214 @@
         </p:nvCxnSpPr>
         <p:spPr>
           <a:xfrm rot="16200000" flipH="1">
-            <a:off x="9485718" y="10925314"/>
+            <a:off x="9463119" y="14049514"/>
             <a:ext cx="1268650" cy="376041"/>
+          </a:xfrm>
+          <a:prstGeom prst="bentConnector3">
+            <a:avLst/>
+          </a:prstGeom>
+          <a:ln>
+            <a:tailEnd type="triangle"/>
+          </a:ln>
+        </p:spPr>
+        <p:style>
+          <a:lnRef idx="1">
+            <a:schemeClr val="accent1"/>
+          </a:lnRef>
+          <a:fillRef idx="0">
+            <a:schemeClr val="accent1"/>
+          </a:fillRef>
+          <a:effectRef idx="0">
+            <a:schemeClr val="accent1"/>
+          </a:effectRef>
+          <a:fontRef idx="minor">
+            <a:schemeClr val="tx1"/>
+          </a:fontRef>
+        </p:style>
+      </p:cxnSp>
+      <p:sp>
+        <p:nvSpPr>
+          <p:cNvPr id="45" name="Text Box 10">
+            <a:extLst>
+              <a:ext uri="{FF2B5EF4-FFF2-40B4-BE49-F238E27FC236}">
+                <a16:creationId xmlns:a16="http://schemas.microsoft.com/office/drawing/2014/main" id="{A9D818C4-799B-415A-A501-A3CBE3B9F5BE}"/>
+              </a:ext>
+            </a:extLst>
+          </p:cNvPr>
+          <p:cNvSpPr txBox="1">
+            <a:spLocks noChangeArrowheads="1"/>
+          </p:cNvSpPr>
+          <p:nvPr/>
+        </p:nvSpPr>
+        <p:spPr bwMode="auto">
+          <a:xfrm>
+            <a:off x="3435730" y="4417292"/>
+            <a:ext cx="3073225" cy="894951"/>
+          </a:xfrm>
+          <a:prstGeom prst="rect">
+            <a:avLst/>
+          </a:prstGeom>
+          <a:solidFill>
+            <a:srgbClr val="FFFFFF"/>
+          </a:solidFill>
+          <a:ln w="9525">
+            <a:solidFill>
+              <a:srgbClr val="000000"/>
+            </a:solidFill>
+            <a:miter lim="800000"/>
+            <a:headEnd/>
+            <a:tailEnd/>
+          </a:ln>
+        </p:spPr>
+        <p:txBody>
+          <a:bodyPr vert="horz" wrap="square" lIns="91440" tIns="45720" rIns="91440" bIns="45720" numCol="1" anchor="t" anchorCtr="0" compatLnSpc="1">
+            <a:prstTxWarp prst="textNoShape">
+              <a:avLst/>
+            </a:prstTxWarp>
+          </a:bodyPr>
+          <a:lstStyle/>
+          <a:p>
+            <a:pPr defTabSz="914400" eaLnBrk="0" fontAlgn="base" hangingPunct="0">
+              <a:spcBef>
+                <a:spcPct val="0"/>
+              </a:spcBef>
+              <a:spcAft>
+                <a:spcPct val="0"/>
+              </a:spcAft>
+            </a:pPr>
+            <a:r>
+              <a:rPr lang="en-US" altLang="en-US" sz="1100" i="1" dirty="0">
+                <a:ea typeface="Calibri" panose="020F0502020204030204" pitchFamily="34" charset="0"/>
+                <a:cs typeface="Times New Roman" panose="02020603050405020304" pitchFamily="18" charset="0"/>
+              </a:rPr>
+              <a:t>Interactive</a:t>
+            </a:r>
+          </a:p>
+          <a:p>
+            <a:pPr defTabSz="914400" eaLnBrk="0" fontAlgn="base" hangingPunct="0">
+              <a:spcBef>
+                <a:spcPct val="0"/>
+              </a:spcBef>
+              <a:spcAft>
+                <a:spcPct val="0"/>
+              </a:spcAft>
+            </a:pPr>
+            <a:r>
+              <a:rPr lang="en-US" altLang="en-US" sz="1100" i="1" dirty="0">
+                <a:ea typeface="Calibri" panose="020F0502020204030204" pitchFamily="34" charset="0"/>
+                <a:cs typeface="Times New Roman" panose="02020603050405020304" pitchFamily="18" charset="0"/>
+              </a:rPr>
+              <a:t>-----------------------------------------------------------------</a:t>
+            </a:r>
+          </a:p>
+          <a:p>
+            <a:pPr defTabSz="914400" eaLnBrk="0" fontAlgn="base" hangingPunct="0">
+              <a:spcBef>
+                <a:spcPct val="0"/>
+              </a:spcBef>
+              <a:spcAft>
+                <a:spcPct val="0"/>
+              </a:spcAft>
+            </a:pPr>
+            <a:r>
+              <a:rPr lang="en-US" altLang="en-US" sz="1100" i="1" dirty="0">
+                <a:cs typeface="Times New Roman" panose="02020603050405020304" pitchFamily="18" charset="0"/>
+              </a:rPr>
+              <a:t>+ </a:t>
+            </a:r>
+            <a:r>
+              <a:rPr lang="en-US" altLang="en-US" sz="1100" i="1" dirty="0" err="1">
+                <a:cs typeface="Times New Roman" panose="02020603050405020304" pitchFamily="18" charset="0"/>
+              </a:rPr>
+              <a:t>GetInteractions</a:t>
+            </a:r>
+            <a:r>
+              <a:rPr lang="en-US" altLang="en-US" sz="1100" i="1" dirty="0">
+                <a:cs typeface="Times New Roman" panose="02020603050405020304" pitchFamily="18" charset="0"/>
+              </a:rPr>
+              <a:t>() : List&lt;Interactions&gt;</a:t>
+            </a:r>
+          </a:p>
+          <a:p>
+            <a:pPr defTabSz="914400" eaLnBrk="0" fontAlgn="base" hangingPunct="0">
+              <a:spcBef>
+                <a:spcPct val="0"/>
+              </a:spcBef>
+              <a:spcAft>
+                <a:spcPct val="0"/>
+              </a:spcAft>
+            </a:pPr>
+            <a:r>
+              <a:rPr lang="en-US" altLang="en-US" sz="1100" i="1" dirty="0">
+                <a:cs typeface="Times New Roman" panose="02020603050405020304" pitchFamily="18" charset="0"/>
+              </a:rPr>
+              <a:t>+ </a:t>
+            </a:r>
+            <a:r>
+              <a:rPr lang="en-US" altLang="en-US" sz="1100" i="1" dirty="0" err="1">
+                <a:cs typeface="Times New Roman" panose="02020603050405020304" pitchFamily="18" charset="0"/>
+              </a:rPr>
+              <a:t>GetInteractiveName</a:t>
+            </a:r>
+            <a:r>
+              <a:rPr lang="en-US" altLang="en-US" sz="1100" i="1" dirty="0">
+                <a:cs typeface="Times New Roman" panose="02020603050405020304" pitchFamily="18" charset="0"/>
+              </a:rPr>
+              <a:t>() : string</a:t>
+            </a:r>
+            <a:endParaRPr lang="en-US" altLang="en-US" sz="1100" i="1" dirty="0">
+              <a:highlight>
+                <a:srgbClr val="00FF00"/>
+              </a:highlight>
+              <a:cs typeface="Times New Roman" panose="02020603050405020304" pitchFamily="18" charset="0"/>
+            </a:endParaRPr>
+          </a:p>
+          <a:p>
+            <a:pPr defTabSz="914400" eaLnBrk="0" fontAlgn="base" hangingPunct="0">
+              <a:spcBef>
+                <a:spcPct val="0"/>
+              </a:spcBef>
+              <a:spcAft>
+                <a:spcPct val="0"/>
+              </a:spcAft>
+            </a:pPr>
+            <a:endParaRPr lang="en-US" altLang="en-US" sz="1100" dirty="0">
+              <a:cs typeface="Times New Roman" panose="02020603050405020304" pitchFamily="18" charset="0"/>
+            </a:endParaRPr>
+          </a:p>
+          <a:p>
+            <a:pPr defTabSz="914400" eaLnBrk="0" fontAlgn="base" hangingPunct="0">
+              <a:spcBef>
+                <a:spcPct val="0"/>
+              </a:spcBef>
+              <a:spcAft>
+                <a:spcPct val="0"/>
+              </a:spcAft>
+            </a:pPr>
+            <a:endParaRPr lang="en-US" altLang="en-US" sz="1100" dirty="0"/>
+          </a:p>
+        </p:txBody>
+      </p:sp>
+      <p:cxnSp>
+        <p:nvCxnSpPr>
+          <p:cNvPr id="36" name="Connector: Elbow 35">
+            <a:extLst>
+              <a:ext uri="{FF2B5EF4-FFF2-40B4-BE49-F238E27FC236}">
+                <a16:creationId xmlns:a16="http://schemas.microsoft.com/office/drawing/2014/main" id="{41D913F8-41D4-4DA7-BF62-FA99BA7203E3}"/>
+              </a:ext>
+            </a:extLst>
+          </p:cNvPr>
+          <p:cNvCxnSpPr>
+            <a:cxnSpLocks/>
+            <a:stCxn id="45" idx="2"/>
+            <a:endCxn id="4" idx="0"/>
+          </p:cNvCxnSpPr>
+          <p:nvPr/>
+        </p:nvCxnSpPr>
+        <p:spPr>
+          <a:xfrm rot="5400000">
+            <a:off x="4694449" y="5590137"/>
+            <a:ext cx="555788" cy="12700"/>
           </a:xfrm>
           <a:prstGeom prst="bentConnector3">
             <a:avLst/>

</xml_diff>